<commit_message>
Tópicos para a "brief description" da introdução
</commit_message>
<xml_diff>
--- a/Apresentação.pptx
+++ b/Apresentação.pptx
@@ -5,16 +5,17 @@
     <p:sldMasterId id="2147483701" r:id="rId1"/>
   </p:sldMasterIdLst>
   <p:notesMasterIdLst>
-    <p:notesMasterId r:id="rId6"/>
+    <p:notesMasterId r:id="rId7"/>
   </p:notesMasterIdLst>
   <p:handoutMasterIdLst>
-    <p:handoutMasterId r:id="rId7"/>
+    <p:handoutMasterId r:id="rId8"/>
   </p:handoutMasterIdLst>
   <p:sldIdLst>
     <p:sldId id="260" r:id="rId2"/>
     <p:sldId id="263" r:id="rId3"/>
-    <p:sldId id="264" r:id="rId4"/>
-    <p:sldId id="274" r:id="rId5"/>
+    <p:sldId id="276" r:id="rId4"/>
+    <p:sldId id="264" r:id="rId5"/>
+    <p:sldId id="274" r:id="rId6"/>
   </p:sldIdLst>
   <p:sldSz cx="12192000" cy="6858000"/>
   <p:notesSz cx="7559675" cy="10691813"/>
@@ -9597,7 +9598,7 @@
               <a:defRPr sz="1400"/>
             </a:pPr>
             <a:fld id="{E99A13E1-6AFB-4ACA-970D-2D1F5FE1AB8B}" type="slidenum">
-              <a:t>‹nº›</a:t>
+              <a:t>‹#›</a:t>
             </a:fld>
             <a:endParaRPr lang="pt-PT" sz="1400" b="0" i="0" u="none" strike="noStrike" kern="1200">
               <a:ln>
@@ -9908,7 +9909,7 @@
           <a:p>
             <a:pPr lvl="0"/>
             <a:fld id="{C80227EA-FB27-4C76-80DA-072C02B2B6B1}" type="slidenum">
-              <a:t>‹nº›</a:t>
+              <a:t>‹#›</a:t>
             </a:fld>
             <a:endParaRPr lang="pt-PT"/>
           </a:p>
@@ -10217,6 +10218,96 @@
       </p:grpSpPr>
       <p:sp>
         <p:nvSpPr>
+          <p:cNvPr id="2" name="Slide Image Placeholder 1"/>
+          <p:cNvSpPr>
+            <a:spLocks noGrp="1" noRot="1" noChangeAspect="1"/>
+          </p:cNvSpPr>
+          <p:nvPr>
+            <p:ph type="sldImg"/>
+          </p:nvPr>
+        </p:nvSpPr>
+        <p:spPr>
+          <a:xfrm>
+            <a:off x="217488" y="812800"/>
+            <a:ext cx="7123112" cy="4008438"/>
+          </a:xfrm>
+        </p:spPr>
+      </p:sp>
+      <p:sp>
+        <p:nvSpPr>
+          <p:cNvPr id="3" name="Notes Placeholder 2"/>
+          <p:cNvSpPr>
+            <a:spLocks noGrp="1"/>
+          </p:cNvSpPr>
+          <p:nvPr>
+            <p:ph type="body" idx="1"/>
+          </p:nvPr>
+        </p:nvSpPr>
+        <p:spPr/>
+        <p:txBody>
+          <a:bodyPr/>
+          <a:lstStyle/>
+          <a:p>
+            <a:endParaRPr lang="en-US" dirty="0"/>
+          </a:p>
+        </p:txBody>
+      </p:sp>
+      <p:sp>
+        <p:nvSpPr>
+          <p:cNvPr id="4" name="Slide Number Placeholder 3"/>
+          <p:cNvSpPr>
+            <a:spLocks noGrp="1"/>
+          </p:cNvSpPr>
+          <p:nvPr>
+            <p:ph type="sldNum" sz="quarter" idx="5"/>
+          </p:nvPr>
+        </p:nvSpPr>
+        <p:spPr/>
+        <p:txBody>
+          <a:bodyPr/>
+          <a:lstStyle/>
+          <a:p>
+            <a:pPr lvl="0"/>
+            <a:fld id="{C80227EA-FB27-4C76-80DA-072C02B2B6B1}" type="slidenum">
+              <a:rPr lang="en-US" smtClean="0"/>
+              <a:t>3</a:t>
+            </a:fld>
+            <a:endParaRPr lang="en-US"/>
+          </a:p>
+        </p:txBody>
+      </p:sp>
+    </p:spTree>
+    <p:extLst>
+      <p:ext uri="{BB962C8B-B14F-4D97-AF65-F5344CB8AC3E}">
+        <p14:creationId xmlns:p14="http://schemas.microsoft.com/office/powerpoint/2010/main" val="2145086110"/>
+      </p:ext>
+    </p:extLst>
+  </p:cSld>
+  <p:clrMapOvr>
+    <a:masterClrMapping/>
+  </p:clrMapOvr>
+</p:notes>
+</file>
+
+<file path=ppt/notesSlides/notesSlide4.xml><?xml version="1.0" encoding="utf-8"?>
+<p:notes xmlns:a="http://schemas.openxmlformats.org/drawingml/2006/main" xmlns:r="http://schemas.openxmlformats.org/officeDocument/2006/relationships" xmlns:p="http://schemas.openxmlformats.org/presentationml/2006/main">
+  <p:cSld>
+    <p:spTree>
+      <p:nvGrpSpPr>
+        <p:cNvPr id="1" name=""/>
+        <p:cNvGrpSpPr/>
+        <p:nvPr/>
+      </p:nvGrpSpPr>
+      <p:grpSpPr>
+        <a:xfrm>
+          <a:off x="0" y="0"/>
+          <a:ext cx="0" cy="0"/>
+          <a:chOff x="0" y="0"/>
+          <a:chExt cx="0" cy="0"/>
+        </a:xfrm>
+      </p:grpSpPr>
+      <p:sp>
+        <p:nvSpPr>
           <p:cNvPr id="2" name="Marcador de Posição da Imagem do Diapositivo 1"/>
           <p:cNvSpPr>
             <a:spLocks noGrp="1" noRot="1" noChangeAspect="1"/>
@@ -10269,7 +10360,7 @@
             <a:pPr lvl="0"/>
             <a:fld id="{C80227EA-FB27-4C76-80DA-072C02B2B6B1}" type="slidenum">
               <a:rPr lang="pt-PT" smtClean="0"/>
-              <a:t>3</a:t>
+              <a:t>4</a:t>
             </a:fld>
             <a:endParaRPr lang="pt-PT"/>
           </a:p>
@@ -11035,7 +11126,7 @@
             <a:fld id="{F5A39829-0E07-418E-823C-101154A9FFCB}" type="datetime1">
               <a:rPr lang="pt-PT" smtClean="0"/>
               <a:pPr lvl="0"/>
-              <a:t>20/03/2022</a:t>
+              <a:t>21/03/2022</a:t>
             </a:fld>
             <a:endParaRPr lang="pt-PT"/>
           </a:p>
@@ -11079,7 +11170,7 @@
             <a:pPr lvl="0"/>
             <a:fld id="{EE1E6D06-5030-4673-A58B-FF53CBDB10C1}" type="slidenum">
               <a:rPr lang="pt-PT" smtClean="0"/>
-              <a:t>‹nº›</a:t>
+              <a:t>‹#›</a:t>
             </a:fld>
             <a:endParaRPr lang="pt-PT"/>
           </a:p>
@@ -11290,7 +11381,7 @@
             <a:fld id="{F5A39829-0E07-418E-823C-101154A9FFCB}" type="datetime1">
               <a:rPr lang="pt-PT" smtClean="0"/>
               <a:pPr lvl="0"/>
-              <a:t>20/03/2022</a:t>
+              <a:t>21/03/2022</a:t>
             </a:fld>
             <a:endParaRPr lang="pt-PT"/>
           </a:p>
@@ -11334,7 +11425,7 @@
             <a:pPr lvl="0"/>
             <a:fld id="{EE1E6D06-5030-4673-A58B-FF53CBDB10C1}" type="slidenum">
               <a:rPr lang="pt-PT" smtClean="0"/>
-              <a:t>‹nº›</a:t>
+              <a:t>‹#›</a:t>
             </a:fld>
             <a:endParaRPr lang="pt-PT"/>
           </a:p>
@@ -11608,7 +11699,7 @@
             <a:fld id="{F5A39829-0E07-418E-823C-101154A9FFCB}" type="datetime1">
               <a:rPr lang="pt-PT" smtClean="0"/>
               <a:pPr lvl="0"/>
-              <a:t>20/03/2022</a:t>
+              <a:t>21/03/2022</a:t>
             </a:fld>
             <a:endParaRPr lang="pt-PT"/>
           </a:p>
@@ -11652,7 +11743,7 @@
             <a:pPr lvl="0"/>
             <a:fld id="{EE1E6D06-5030-4673-A58B-FF53CBDB10C1}" type="slidenum">
               <a:rPr lang="pt-PT" smtClean="0"/>
-              <a:t>‹nº›</a:t>
+              <a:t>‹#›</a:t>
             </a:fld>
             <a:endParaRPr lang="pt-PT"/>
           </a:p>
@@ -11945,7 +12036,7 @@
             <a:fld id="{F5A39829-0E07-418E-823C-101154A9FFCB}" type="datetime1">
               <a:rPr lang="pt-PT" smtClean="0"/>
               <a:pPr lvl="0"/>
-              <a:t>20/03/2022</a:t>
+              <a:t>21/03/2022</a:t>
             </a:fld>
             <a:endParaRPr lang="pt-PT"/>
           </a:p>
@@ -11989,7 +12080,7 @@
             <a:pPr lvl="0"/>
             <a:fld id="{EE1E6D06-5030-4673-A58B-FF53CBDB10C1}" type="slidenum">
               <a:rPr lang="pt-PT" smtClean="0"/>
-              <a:t>‹nº›</a:t>
+              <a:t>‹#›</a:t>
             </a:fld>
             <a:endParaRPr lang="pt-PT"/>
           </a:p>
@@ -12263,7 +12354,7 @@
             <a:fld id="{F5A39829-0E07-418E-823C-101154A9FFCB}" type="datetime1">
               <a:rPr lang="pt-PT" smtClean="0"/>
               <a:pPr lvl="0"/>
-              <a:t>20/03/2022</a:t>
+              <a:t>21/03/2022</a:t>
             </a:fld>
             <a:endParaRPr lang="pt-PT"/>
           </a:p>
@@ -12307,7 +12398,7 @@
             <a:pPr lvl="0"/>
             <a:fld id="{EE1E6D06-5030-4673-A58B-FF53CBDB10C1}" type="slidenum">
               <a:rPr lang="pt-PT" smtClean="0"/>
-              <a:t>‹nº›</a:t>
+              <a:t>‹#›</a:t>
             </a:fld>
             <a:endParaRPr lang="pt-PT"/>
           </a:p>
@@ -12660,7 +12751,7 @@
             <a:fld id="{F5A39829-0E07-418E-823C-101154A9FFCB}" type="datetime1">
               <a:rPr lang="pt-PT" smtClean="0"/>
               <a:pPr lvl="0"/>
-              <a:t>20/03/2022</a:t>
+              <a:t>21/03/2022</a:t>
             </a:fld>
             <a:endParaRPr lang="pt-PT"/>
           </a:p>
@@ -12704,7 +12795,7 @@
             <a:pPr lvl="0"/>
             <a:fld id="{EE1E6D06-5030-4673-A58B-FF53CBDB10C1}" type="slidenum">
               <a:rPr lang="pt-PT" smtClean="0"/>
-              <a:t>‹nº›</a:t>
+              <a:t>‹#›</a:t>
             </a:fld>
             <a:endParaRPr lang="pt-PT"/>
           </a:p>
@@ -12834,7 +12925,7 @@
             <a:fld id="{F5A39829-0E07-418E-823C-101154A9FFCB}" type="datetime1">
               <a:rPr lang="pt-PT" smtClean="0"/>
               <a:pPr lvl="0"/>
-              <a:t>20/03/2022</a:t>
+              <a:t>21/03/2022</a:t>
             </a:fld>
             <a:endParaRPr lang="pt-PT"/>
           </a:p>
@@ -12878,7 +12969,7 @@
             <a:pPr lvl="0"/>
             <a:fld id="{EE1E6D06-5030-4673-A58B-FF53CBDB10C1}" type="slidenum">
               <a:rPr lang="pt-PT" smtClean="0"/>
-              <a:t>‹nº›</a:t>
+              <a:t>‹#›</a:t>
             </a:fld>
             <a:endParaRPr lang="pt-PT"/>
           </a:p>
@@ -13018,7 +13109,7 @@
             <a:fld id="{F5A39829-0E07-418E-823C-101154A9FFCB}" type="datetime1">
               <a:rPr lang="pt-PT" smtClean="0"/>
               <a:pPr lvl="0"/>
-              <a:t>20/03/2022</a:t>
+              <a:t>21/03/2022</a:t>
             </a:fld>
             <a:endParaRPr lang="pt-PT"/>
           </a:p>
@@ -13062,7 +13153,7 @@
             <a:pPr lvl="0"/>
             <a:fld id="{EE1E6D06-5030-4673-A58B-FF53CBDB10C1}" type="slidenum">
               <a:rPr lang="pt-PT" smtClean="0"/>
-              <a:t>‹nº›</a:t>
+              <a:t>‹#›</a:t>
             </a:fld>
             <a:endParaRPr lang="pt-PT"/>
           </a:p>
@@ -13192,7 +13283,7 @@
             <a:fld id="{F5A39829-0E07-418E-823C-101154A9FFCB}" type="datetime1">
               <a:rPr lang="pt-PT" smtClean="0"/>
               <a:pPr lvl="0"/>
-              <a:t>20/03/2022</a:t>
+              <a:t>21/03/2022</a:t>
             </a:fld>
             <a:endParaRPr lang="pt-PT"/>
           </a:p>
@@ -13236,7 +13327,7 @@
             <a:pPr lvl="0"/>
             <a:fld id="{EE1E6D06-5030-4673-A58B-FF53CBDB10C1}" type="slidenum">
               <a:rPr lang="pt-PT" smtClean="0"/>
-              <a:t>‹nº›</a:t>
+              <a:t>‹#›</a:t>
             </a:fld>
             <a:endParaRPr lang="pt-PT"/>
           </a:p>
@@ -13443,7 +13534,7 @@
             <a:fld id="{F5A39829-0E07-418E-823C-101154A9FFCB}" type="datetime1">
               <a:rPr lang="pt-PT" smtClean="0"/>
               <a:pPr lvl="0"/>
-              <a:t>20/03/2022</a:t>
+              <a:t>21/03/2022</a:t>
             </a:fld>
             <a:endParaRPr lang="pt-PT"/>
           </a:p>
@@ -13487,7 +13578,7 @@
             <a:pPr lvl="0"/>
             <a:fld id="{EE1E6D06-5030-4673-A58B-FF53CBDB10C1}" type="slidenum">
               <a:rPr lang="pt-PT" smtClean="0"/>
-              <a:t>‹nº›</a:t>
+              <a:t>‹#›</a:t>
             </a:fld>
             <a:endParaRPr lang="pt-PT"/>
           </a:p>
@@ -13679,7 +13770,7 @@
             <a:fld id="{F5A39829-0E07-418E-823C-101154A9FFCB}" type="datetime1">
               <a:rPr lang="pt-PT" smtClean="0"/>
               <a:pPr lvl="0"/>
-              <a:t>20/03/2022</a:t>
+              <a:t>21/03/2022</a:t>
             </a:fld>
             <a:endParaRPr lang="pt-PT"/>
           </a:p>
@@ -13723,7 +13814,7 @@
             <a:pPr lvl="0"/>
             <a:fld id="{EE1E6D06-5030-4673-A58B-FF53CBDB10C1}" type="slidenum">
               <a:rPr lang="pt-PT" smtClean="0"/>
-              <a:t>‹nº›</a:t>
+              <a:t>‹#›</a:t>
             </a:fld>
             <a:endParaRPr lang="pt-PT"/>
           </a:p>
@@ -14057,7 +14148,7 @@
             <a:fld id="{F5A39829-0E07-418E-823C-101154A9FFCB}" type="datetime1">
               <a:rPr lang="pt-PT" smtClean="0"/>
               <a:pPr lvl="0"/>
-              <a:t>20/03/2022</a:t>
+              <a:t>21/03/2022</a:t>
             </a:fld>
             <a:endParaRPr lang="pt-PT"/>
           </a:p>
@@ -14101,7 +14192,7 @@
             <a:pPr lvl="0"/>
             <a:fld id="{EE1E6D06-5030-4673-A58B-FF53CBDB10C1}" type="slidenum">
               <a:rPr lang="pt-PT" smtClean="0"/>
-              <a:t>‹nº›</a:t>
+              <a:t>‹#›</a:t>
             </a:fld>
             <a:endParaRPr lang="pt-PT"/>
           </a:p>
@@ -14184,7 +14275,7 @@
             <a:fld id="{F5A39829-0E07-418E-823C-101154A9FFCB}" type="datetime1">
               <a:rPr lang="pt-PT" smtClean="0"/>
               <a:pPr lvl="0"/>
-              <a:t>20/03/2022</a:t>
+              <a:t>21/03/2022</a:t>
             </a:fld>
             <a:endParaRPr lang="pt-PT"/>
           </a:p>
@@ -14228,7 +14319,7 @@
             <a:pPr lvl="0"/>
             <a:fld id="{EE1E6D06-5030-4673-A58B-FF53CBDB10C1}" type="slidenum">
               <a:rPr lang="pt-PT" smtClean="0"/>
-              <a:t>‹nº›</a:t>
+              <a:t>‹#›</a:t>
             </a:fld>
             <a:endParaRPr lang="pt-PT"/>
           </a:p>
@@ -14283,7 +14374,7 @@
             <a:fld id="{F5A39829-0E07-418E-823C-101154A9FFCB}" type="datetime1">
               <a:rPr lang="pt-PT" smtClean="0"/>
               <a:pPr lvl="0"/>
-              <a:t>20/03/2022</a:t>
+              <a:t>21/03/2022</a:t>
             </a:fld>
             <a:endParaRPr lang="pt-PT"/>
           </a:p>
@@ -14327,7 +14418,7 @@
             <a:pPr lvl="0"/>
             <a:fld id="{EE1E6D06-5030-4673-A58B-FF53CBDB10C1}" type="slidenum">
               <a:rPr lang="pt-PT" smtClean="0"/>
-              <a:t>‹nº›</a:t>
+              <a:t>‹#›</a:t>
             </a:fld>
             <a:endParaRPr lang="pt-PT"/>
           </a:p>
@@ -14542,7 +14633,7 @@
             <a:fld id="{F5A39829-0E07-418E-823C-101154A9FFCB}" type="datetime1">
               <a:rPr lang="pt-PT" smtClean="0"/>
               <a:pPr lvl="0"/>
-              <a:t>20/03/2022</a:t>
+              <a:t>21/03/2022</a:t>
             </a:fld>
             <a:endParaRPr lang="pt-PT"/>
           </a:p>
@@ -14586,7 +14677,7 @@
             <a:pPr lvl="0"/>
             <a:fld id="{EE1E6D06-5030-4673-A58B-FF53CBDB10C1}" type="slidenum">
               <a:rPr lang="pt-PT" smtClean="0"/>
-              <a:t>‹nº›</a:t>
+              <a:t>‹#›</a:t>
             </a:fld>
             <a:endParaRPr lang="pt-PT"/>
           </a:p>
@@ -14828,7 +14919,7 @@
             <a:pPr lvl="0"/>
             <a:fld id="{EE1E6D06-5030-4673-A58B-FF53CBDB10C1}" type="slidenum">
               <a:rPr lang="pt-PT" smtClean="0"/>
-              <a:t>‹nº›</a:t>
+              <a:t>‹#›</a:t>
             </a:fld>
             <a:endParaRPr lang="pt-PT"/>
           </a:p>
@@ -14853,7 +14944,7 @@
             <a:fld id="{F5A39829-0E07-418E-823C-101154A9FFCB}" type="datetime1">
               <a:rPr lang="pt-PT" smtClean="0"/>
               <a:pPr lvl="0"/>
-              <a:t>20/03/2022</a:t>
+              <a:t>21/03/2022</a:t>
             </a:fld>
             <a:endParaRPr lang="pt-PT"/>
           </a:p>
@@ -15557,7 +15648,7 @@
             <a:fld id="{F5A39829-0E07-418E-823C-101154A9FFCB}" type="datetime1">
               <a:rPr lang="pt-PT" smtClean="0"/>
               <a:pPr lvl="0"/>
-              <a:t>20/03/2022</a:t>
+              <a:t>21/03/2022</a:t>
             </a:fld>
             <a:endParaRPr lang="pt-PT"/>
           </a:p>
@@ -15635,7 +15726,7 @@
             <a:pPr lvl="0"/>
             <a:fld id="{EE1E6D06-5030-4673-A58B-FF53CBDB10C1}" type="slidenum">
               <a:rPr lang="pt-PT" smtClean="0"/>
-              <a:t>‹nº›</a:t>
+              <a:t>‹#›</a:t>
             </a:fld>
             <a:endParaRPr lang="pt-PT"/>
           </a:p>
@@ -17715,7 +17806,7 @@
         </p:nvSpPr>
         <p:spPr>
           <a:xfrm>
-            <a:off x="457201" y="1730827"/>
+            <a:off x="665545" y="1795251"/>
             <a:ext cx="10101944" cy="3267498"/>
           </a:xfrm>
           <a:prstGeom prst="rect">
@@ -17872,6 +17963,315 @@
       </p:grpSpPr>
       <p:sp>
         <p:nvSpPr>
+          <p:cNvPr id="4" name="CaixaDeTexto 3">
+            <a:extLst>
+              <a:ext uri="{FF2B5EF4-FFF2-40B4-BE49-F238E27FC236}">
+                <a16:creationId xmlns:a16="http://schemas.microsoft.com/office/drawing/2014/main" id="{7C38E510-A5B6-4E52-BDF7-108E4B220321}"/>
+              </a:ext>
+            </a:extLst>
+          </p:cNvPr>
+          <p:cNvSpPr txBox="1"/>
+          <p:nvPr/>
+        </p:nvSpPr>
+        <p:spPr>
+          <a:xfrm>
+            <a:off x="0" y="524663"/>
+            <a:ext cx="10961914" cy="584775"/>
+          </a:xfrm>
+          <a:prstGeom prst="rect">
+            <a:avLst/>
+          </a:prstGeom>
+          <a:noFill/>
+        </p:spPr>
+        <p:txBody>
+          <a:bodyPr wrap="square">
+            <a:spAutoFit/>
+          </a:bodyPr>
+          <a:lstStyle/>
+          <a:p>
+            <a:pPr algn="ctr"/>
+            <a:r>
+              <a:rPr lang="pt-PT" sz="3200" b="1" dirty="0">
+                <a:solidFill>
+                  <a:srgbClr val="0071A4"/>
+                </a:solidFill>
+                <a:latin typeface="+mj-lt"/>
+                <a:ea typeface="SimSun" panose="02010600030101010101" pitchFamily="2" charset="-122"/>
+              </a:rPr>
+              <a:t>Introdução </a:t>
+            </a:r>
+            <a:r>
+              <a:rPr lang="pt-PT" sz="3200" b="1" dirty="0">
+                <a:solidFill>
+                  <a:srgbClr val="FF0000"/>
+                </a:solidFill>
+                <a:latin typeface="+mj-lt"/>
+                <a:ea typeface="SimSun" panose="02010600030101010101" pitchFamily="2" charset="-122"/>
+              </a:rPr>
+              <a:t>(TÓPICOS)</a:t>
+            </a:r>
+            <a:endParaRPr lang="pt-PT" sz="3200" b="1" dirty="0">
+              <a:solidFill>
+                <a:srgbClr val="FF0000"/>
+              </a:solidFill>
+              <a:latin typeface="+mj-lt"/>
+            </a:endParaRPr>
+          </a:p>
+        </p:txBody>
+      </p:sp>
+      <p:sp>
+        <p:nvSpPr>
+          <p:cNvPr id="5" name="CaixaDeTexto 4">
+            <a:extLst>
+              <a:ext uri="{FF2B5EF4-FFF2-40B4-BE49-F238E27FC236}">
+                <a16:creationId xmlns:a16="http://schemas.microsoft.com/office/drawing/2014/main" id="{CDA88A9F-3B51-4A59-9FAB-D80C9DA31784}"/>
+              </a:ext>
+            </a:extLst>
+          </p:cNvPr>
+          <p:cNvSpPr txBox="1"/>
+          <p:nvPr/>
+        </p:nvSpPr>
+        <p:spPr>
+          <a:xfrm>
+            <a:off x="1045028" y="1230755"/>
+            <a:ext cx="10101944" cy="5442965"/>
+          </a:xfrm>
+          <a:prstGeom prst="rect">
+            <a:avLst/>
+          </a:prstGeom>
+          <a:noFill/>
+        </p:spPr>
+        <p:txBody>
+          <a:bodyPr wrap="square" rtlCol="0">
+            <a:spAutoFit/>
+          </a:bodyPr>
+          <a:lstStyle/>
+          <a:p>
+            <a:pPr marL="342900" indent="-342900" algn="just">
+              <a:lnSpc>
+                <a:spcPct val="150000"/>
+              </a:lnSpc>
+              <a:buFont typeface="Symbol" panose="05050102010706020507" pitchFamily="18" charset="2"/>
+              <a:buChar char="·"/>
+            </a:pPr>
+            <a:r>
+              <a:rPr lang="pt-BR" dirty="0"/>
+              <a:t>Sistema simplificado de venda de produtos eletrónicos online</a:t>
+            </a:r>
+          </a:p>
+          <a:p>
+            <a:pPr marL="342900" indent="-342900" algn="just">
+              <a:lnSpc>
+                <a:spcPct val="150000"/>
+              </a:lnSpc>
+              <a:buFont typeface="Symbol" panose="05050102010706020507" pitchFamily="18" charset="2"/>
+              <a:buChar char="·"/>
+            </a:pPr>
+            <a:r>
+              <a:rPr lang="pt-BR" dirty="0"/>
+              <a:t>Funcionalidade de autenticação</a:t>
+            </a:r>
+          </a:p>
+          <a:p>
+            <a:pPr marL="342900" indent="-342900" algn="just">
+              <a:lnSpc>
+                <a:spcPct val="150000"/>
+              </a:lnSpc>
+              <a:buFont typeface="Symbol" panose="05050102010706020507" pitchFamily="18" charset="2"/>
+              <a:buChar char="·"/>
+            </a:pPr>
+            <a:r>
+              <a:rPr lang="pt-BR" dirty="0"/>
+              <a:t>Administradores:</a:t>
+            </a:r>
+          </a:p>
+          <a:p>
+            <a:pPr marL="800100" lvl="1" indent="-342900" algn="just">
+              <a:lnSpc>
+                <a:spcPct val="150000"/>
+              </a:lnSpc>
+              <a:buFont typeface="Symbol" panose="05050102010706020507" pitchFamily="18" charset="2"/>
+              <a:buChar char="·"/>
+            </a:pPr>
+            <a:r>
+              <a:rPr lang="pt-BR" dirty="0"/>
+              <a:t>Moderação e gestão da plataforma</a:t>
+            </a:r>
+          </a:p>
+          <a:p>
+            <a:pPr marL="342900" indent="-342900" algn="just">
+              <a:lnSpc>
+                <a:spcPct val="150000"/>
+              </a:lnSpc>
+              <a:buFont typeface="Symbol" panose="05050102010706020507" pitchFamily="18" charset="2"/>
+              <a:buChar char="·"/>
+            </a:pPr>
+            <a:r>
+              <a:rPr lang="pt-BR" dirty="0"/>
+              <a:t>Vendedores:</a:t>
+            </a:r>
+          </a:p>
+          <a:p>
+            <a:pPr marL="800100" lvl="1" indent="-342900" algn="just">
+              <a:lnSpc>
+                <a:spcPct val="150000"/>
+              </a:lnSpc>
+              <a:buFont typeface="Symbol" panose="05050102010706020507" pitchFamily="18" charset="2"/>
+              <a:buChar char="·"/>
+            </a:pPr>
+            <a:r>
+              <a:rPr lang="pt-BR" dirty="0"/>
+              <a:t>Venda de produtos</a:t>
+            </a:r>
+          </a:p>
+          <a:p>
+            <a:pPr marL="800100" lvl="1" indent="-342900" algn="just">
+              <a:lnSpc>
+                <a:spcPct val="150000"/>
+              </a:lnSpc>
+              <a:buFont typeface="Symbol" panose="05050102010706020507" pitchFamily="18" charset="2"/>
+              <a:buChar char="·"/>
+            </a:pPr>
+            <a:r>
+              <a:rPr lang="pt-BR" dirty="0"/>
+              <a:t>Resposta a comentários sobre produtos em </a:t>
+            </a:r>
+            <a:r>
+              <a:rPr lang="pt-BR" i="1" dirty="0"/>
+              <a:t>threads</a:t>
+            </a:r>
+          </a:p>
+          <a:p>
+            <a:pPr marL="800100" lvl="1" indent="-342900" algn="just">
+              <a:lnSpc>
+                <a:spcPct val="150000"/>
+              </a:lnSpc>
+              <a:buFont typeface="Symbol" panose="05050102010706020507" pitchFamily="18" charset="2"/>
+              <a:buChar char="·"/>
+            </a:pPr>
+            <a:r>
+              <a:rPr lang="pt-BR" dirty="0"/>
+              <a:t>Criação de campanhas promocionais</a:t>
+            </a:r>
+          </a:p>
+          <a:p>
+            <a:pPr marL="342900" indent="-342900" algn="just">
+              <a:lnSpc>
+                <a:spcPct val="150000"/>
+              </a:lnSpc>
+              <a:buFont typeface="Symbol" panose="05050102010706020507" pitchFamily="18" charset="2"/>
+              <a:buChar char="·"/>
+            </a:pPr>
+            <a:r>
+              <a:rPr lang="pt-BR" dirty="0"/>
+              <a:t>Compradores:</a:t>
+            </a:r>
+          </a:p>
+          <a:p>
+            <a:pPr marL="800100" lvl="1" indent="-342900" algn="just">
+              <a:lnSpc>
+                <a:spcPct val="150000"/>
+              </a:lnSpc>
+              <a:buFont typeface="Symbol" panose="05050102010706020507" pitchFamily="18" charset="2"/>
+              <a:buChar char="·"/>
+            </a:pPr>
+            <a:r>
+              <a:rPr lang="pt-PT" dirty="0"/>
+              <a:t>Realização de encomendas</a:t>
+            </a:r>
+          </a:p>
+          <a:p>
+            <a:pPr marL="800100" lvl="1" indent="-342900" algn="just">
+              <a:lnSpc>
+                <a:spcPct val="150000"/>
+              </a:lnSpc>
+              <a:buFont typeface="Symbol" panose="05050102010706020507" pitchFamily="18" charset="2"/>
+              <a:buChar char="·"/>
+            </a:pPr>
+            <a:r>
+              <a:rPr lang="pt-PT" dirty="0"/>
+              <a:t>Classificação de produtos</a:t>
+            </a:r>
+          </a:p>
+          <a:p>
+            <a:pPr marL="800100" lvl="1" indent="-342900" algn="just">
+              <a:lnSpc>
+                <a:spcPct val="150000"/>
+              </a:lnSpc>
+              <a:buFont typeface="Symbol" panose="05050102010706020507" pitchFamily="18" charset="2"/>
+              <a:buChar char="·"/>
+            </a:pPr>
+            <a:r>
+              <a:rPr lang="pt-PT" dirty="0"/>
+              <a:t>Publicação de comentários sobre produtos em </a:t>
+            </a:r>
+            <a:r>
+              <a:rPr lang="pt-PT" i="1" dirty="0" err="1"/>
+              <a:t>threads</a:t>
+            </a:r>
+            <a:endParaRPr lang="pt-PT" i="1" dirty="0"/>
+          </a:p>
+          <a:p>
+            <a:pPr marL="800100" lvl="1" indent="-342900" algn="just">
+              <a:lnSpc>
+                <a:spcPct val="150000"/>
+              </a:lnSpc>
+              <a:buFont typeface="Symbol" panose="05050102010706020507" pitchFamily="18" charset="2"/>
+              <a:buChar char="·"/>
+            </a:pPr>
+            <a:r>
+              <a:rPr lang="pt-PT" dirty="0"/>
+              <a:t>Participação em campanhas promocionais</a:t>
+            </a:r>
+          </a:p>
+        </p:txBody>
+      </p:sp>
+    </p:spTree>
+    <p:extLst>
+      <p:ext uri="{BB962C8B-B14F-4D97-AF65-F5344CB8AC3E}">
+        <p14:creationId xmlns:p14="http://schemas.microsoft.com/office/powerpoint/2010/main" val="1456460978"/>
+      </p:ext>
+    </p:extLst>
+  </p:cSld>
+  <p:clrMapOvr>
+    <a:masterClrMapping/>
+  </p:clrMapOvr>
+</p:sld>
+</file>
+
+<file path=ppt/slides/slide4.xml><?xml version="1.0" encoding="utf-8"?>
+<p:sld xmlns:a="http://schemas.openxmlformats.org/drawingml/2006/main" xmlns:r="http://schemas.openxmlformats.org/officeDocument/2006/relationships" xmlns:p="http://schemas.openxmlformats.org/presentationml/2006/main" showMasterSp="0">
+  <p:cSld>
+    <p:bg>
+      <p:bgPr>
+        <a:blipFill dpi="0" rotWithShape="1">
+          <a:blip r:embed="rId3">
+            <a:lum/>
+          </a:blip>
+          <a:srcRect/>
+          <a:stretch>
+            <a:fillRect/>
+          </a:stretch>
+        </a:blipFill>
+        <a:effectLst/>
+      </p:bgPr>
+    </p:bg>
+    <p:spTree>
+      <p:nvGrpSpPr>
+        <p:cNvPr id="1" name=""/>
+        <p:cNvGrpSpPr/>
+        <p:nvPr/>
+      </p:nvGrpSpPr>
+      <p:grpSpPr>
+        <a:xfrm>
+          <a:off x="0" y="0"/>
+          <a:ext cx="0" cy="0"/>
+          <a:chOff x="0" y="0"/>
+          <a:chExt cx="0" cy="0"/>
+        </a:xfrm>
+      </p:grpSpPr>
+      <p:sp>
+        <p:nvSpPr>
           <p:cNvPr id="23" name="CaixaDeTexto 22">
             <a:extLst>
               <a:ext uri="{FF2B5EF4-FFF2-40B4-BE49-F238E27FC236}">
@@ -17959,7 +18359,7 @@
 </p:sld>
 </file>
 
-<file path=ppt/slides/slide4.xml><?xml version="1.0" encoding="utf-8"?>
+<file path=ppt/slides/slide5.xml><?xml version="1.0" encoding="utf-8"?>
 <p:sld xmlns:a="http://schemas.openxmlformats.org/drawingml/2006/main" xmlns:r="http://schemas.openxmlformats.org/officeDocument/2006/relationships" xmlns:p="http://schemas.openxmlformats.org/presentationml/2006/main" showMasterSp="0">
   <p:cSld>
     <p:bg>

</xml_diff>

<commit_message>
Cronograma e alterações na apresentação
Draft do cronograma com exemplo de codificação de cores; algum conteúdo do PowerPoint
</commit_message>
<xml_diff>
--- a/Apresentação.pptx
+++ b/Apresentação.pptx
@@ -5,17 +5,22 @@
     <p:sldMasterId id="2147483701" r:id="rId1"/>
   </p:sldMasterIdLst>
   <p:notesMasterIdLst>
-    <p:notesMasterId r:id="rId7"/>
+    <p:notesMasterId r:id="rId12"/>
   </p:notesMasterIdLst>
   <p:handoutMasterIdLst>
-    <p:handoutMasterId r:id="rId8"/>
+    <p:handoutMasterId r:id="rId13"/>
   </p:handoutMasterIdLst>
   <p:sldIdLst>
     <p:sldId id="260" r:id="rId2"/>
     <p:sldId id="263" r:id="rId3"/>
     <p:sldId id="276" r:id="rId4"/>
     <p:sldId id="264" r:id="rId5"/>
-    <p:sldId id="274" r:id="rId6"/>
+    <p:sldId id="277" r:id="rId6"/>
+    <p:sldId id="278" r:id="rId7"/>
+    <p:sldId id="279" r:id="rId8"/>
+    <p:sldId id="280" r:id="rId9"/>
+    <p:sldId id="281" r:id="rId10"/>
+    <p:sldId id="274" r:id="rId11"/>
   </p:sldIdLst>
   <p:sldSz cx="12192000" cy="6858000"/>
   <p:notesSz cx="7559675" cy="10691813"/>
@@ -3489,8 +3494,8 @@
         <a:lstStyle/>
         <a:p>
           <a:r>
-            <a:rPr lang="en-CA" dirty="0"/>
-            <a:t>content</a:t>
+            <a:rPr lang="pt-PT" dirty="0"/>
+            <a:t>Administradores</a:t>
           </a:r>
           <a:endParaRPr lang="en-US" dirty="0"/>
         </a:p>
@@ -3526,8 +3531,8 @@
         <a:lstStyle/>
         <a:p>
           <a:r>
-            <a:rPr lang="en-CA" dirty="0"/>
-            <a:t>content</a:t>
+            <a:rPr lang="pt-PT" dirty="0"/>
+            <a:t>Moderação e gestão da plataforma</a:t>
           </a:r>
           <a:endParaRPr lang="en-US" dirty="0"/>
         </a:p>
@@ -3563,8 +3568,8 @@
         <a:lstStyle/>
         <a:p>
           <a:r>
-            <a:rPr lang="en-CA" dirty="0"/>
-            <a:t>content</a:t>
+            <a:rPr lang="pt-PT"/>
+            <a:t>Vendedores</a:t>
           </a:r>
           <a:endParaRPr lang="en-US" dirty="0"/>
         </a:p>
@@ -3592,22 +3597,26 @@
         </a:p>
       </dgm:t>
     </dgm:pt>
-    <dgm:pt modelId="{83A1D220-073C-4F3C-AEE5-296175FD9B94}">
+    <dgm:pt modelId="{BF69016F-4EAC-4DCA-868D-93B17B5D0CFA}">
       <dgm:prSet phldrT="[Text]"/>
       <dgm:spPr/>
       <dgm:t>
         <a:bodyPr/>
         <a:lstStyle/>
         <a:p>
+          <a:pPr>
+            <a:buFont typeface="Symbol" panose="05050102010706020507" pitchFamily="18" charset="2"/>
+            <a:buChar char="·"/>
+          </a:pPr>
           <a:r>
-            <a:rPr lang="en-CA" dirty="0"/>
-            <a:t>content</a:t>
+            <a:rPr lang="pt-PT" dirty="0"/>
+            <a:t>Criação de campanhas promocionais</a:t>
           </a:r>
           <a:endParaRPr lang="en-US" dirty="0"/>
         </a:p>
       </dgm:t>
     </dgm:pt>
-    <dgm:pt modelId="{1560965D-3578-4BCE-BEC3-B9CE512FAFB5}" type="parTrans" cxnId="{578B98FB-3746-4908-AC82-584BFA65D5BD}">
+    <dgm:pt modelId="{9CC8C846-47B5-4224-A5E6-CB2105FD6917}" type="parTrans" cxnId="{CE55A79A-371D-40A2-AA5B-2609C9B425CB}">
       <dgm:prSet/>
       <dgm:spPr/>
       <dgm:t>
@@ -3618,7 +3627,7 @@
         </a:p>
       </dgm:t>
     </dgm:pt>
-    <dgm:pt modelId="{C3833DBA-D672-449E-84A8-E289CB386A5B}" type="sibTrans" cxnId="{578B98FB-3746-4908-AC82-584BFA65D5BD}">
+    <dgm:pt modelId="{6D32FA40-8CE8-4CA2-B106-66AD1F5354E9}" type="sibTrans" cxnId="{CE55A79A-371D-40A2-AA5B-2609C9B425CB}">
       <dgm:prSet/>
       <dgm:spPr/>
       <dgm:t>
@@ -3629,22 +3638,21 @@
         </a:p>
       </dgm:t>
     </dgm:pt>
-    <dgm:pt modelId="{34B168C8-0FBB-42A7-9EA0-4CF734F7E1D4}">
-      <dgm:prSet phldrT="[Text]"/>
+    <dgm:pt modelId="{7A9A831D-CD01-4AC5-BFAB-E1325E1A375C}">
+      <dgm:prSet/>
       <dgm:spPr/>
       <dgm:t>
         <a:bodyPr/>
         <a:lstStyle/>
         <a:p>
           <a:r>
-            <a:rPr lang="en-CA" dirty="0"/>
-            <a:t>content</a:t>
+            <a:rPr lang="pt-PT" dirty="0"/>
+            <a:t>Venda de produtos</a:t>
           </a:r>
-          <a:endParaRPr lang="en-US" dirty="0"/>
         </a:p>
       </dgm:t>
     </dgm:pt>
-    <dgm:pt modelId="{1B539C4D-9262-486E-8723-711B783718B7}" type="parTrans" cxnId="{22EABBD7-BE7E-4D1F-8B20-0E333290B8B8}">
+    <dgm:pt modelId="{C6BD032F-B5AD-451A-8B35-0C9F261AB70C}" type="parTrans" cxnId="{12DD2C3E-F135-44B2-A062-8C0627559432}">
       <dgm:prSet/>
       <dgm:spPr/>
       <dgm:t>
@@ -3655,7 +3663,7 @@
         </a:p>
       </dgm:t>
     </dgm:pt>
-    <dgm:pt modelId="{970D48C9-88E8-4BEA-BF79-B3A82DC73771}" type="sibTrans" cxnId="{22EABBD7-BE7E-4D1F-8B20-0E333290B8B8}">
+    <dgm:pt modelId="{FBD8368F-1449-4B4D-98CF-C5AA2D655C2F}" type="sibTrans" cxnId="{12DD2C3E-F135-44B2-A062-8C0627559432}">
       <dgm:prSet/>
       <dgm:spPr/>
       <dgm:t>
@@ -3666,22 +3674,26 @@
         </a:p>
       </dgm:t>
     </dgm:pt>
-    <dgm:pt modelId="{463AB51D-12C1-4ADE-ABFE-AD7C1918CFDD}">
-      <dgm:prSet phldrT="[Text]"/>
+    <dgm:pt modelId="{5E94C752-50AB-4C5B-BB61-447CBA78D74A}">
+      <dgm:prSet/>
       <dgm:spPr/>
       <dgm:t>
         <a:bodyPr/>
         <a:lstStyle/>
         <a:p>
+          <a:pPr algn="ctr"/>
           <a:r>
-            <a:rPr lang="en-CA" dirty="0"/>
-            <a:t>content</a:t>
+            <a:rPr lang="pt-PT" dirty="0"/>
+            <a:t>Resposta a comentários sobre produtos em </a:t>
           </a:r>
-          <a:endParaRPr lang="en-US" dirty="0"/>
+          <a:r>
+            <a:rPr lang="en-US" i="1" dirty="0"/>
+            <a:t>threads</a:t>
+          </a:r>
         </a:p>
       </dgm:t>
     </dgm:pt>
-    <dgm:pt modelId="{94063A75-D51F-40AC-B288-CD100666A5A2}" type="parTrans" cxnId="{7453E752-03F8-4596-8CF6-291973F25743}">
+    <dgm:pt modelId="{42B88018-AD62-401C-B96F-E0900F681684}" type="parTrans" cxnId="{C2402997-641F-4F34-BAD1-0339B45783D8}">
       <dgm:prSet/>
       <dgm:spPr/>
       <dgm:t>
@@ -3692,7 +3704,7 @@
         </a:p>
       </dgm:t>
     </dgm:pt>
-    <dgm:pt modelId="{A4211907-4D84-413F-9BC9-9803C141BE29}" type="sibTrans" cxnId="{7453E752-03F8-4596-8CF6-291973F25743}">
+    <dgm:pt modelId="{998E5E67-20AE-4DFA-97BA-559A0FF99423}" type="sibTrans" cxnId="{C2402997-641F-4F34-BAD1-0339B45783D8}">
       <dgm:prSet/>
       <dgm:spPr/>
       <dgm:t>
@@ -3703,22 +3715,21 @@
         </a:p>
       </dgm:t>
     </dgm:pt>
-    <dgm:pt modelId="{F2FF6C68-D24C-43F0-9D44-692D6BDF2EFF}">
-      <dgm:prSet phldrT="[Text]"/>
+    <dgm:pt modelId="{429A8E1D-41CA-4269-80E5-5932D6C8C480}">
+      <dgm:prSet/>
       <dgm:spPr/>
       <dgm:t>
         <a:bodyPr/>
         <a:lstStyle/>
         <a:p>
           <a:r>
-            <a:rPr lang="en-CA" dirty="0"/>
-            <a:t>content</a:t>
+            <a:rPr lang="pt-PT" dirty="0"/>
+            <a:t>Compradores</a:t>
           </a:r>
-          <a:endParaRPr lang="en-US" dirty="0"/>
         </a:p>
       </dgm:t>
     </dgm:pt>
-    <dgm:pt modelId="{8E6CA364-0675-428F-AC08-FC280CAF809B}" type="parTrans" cxnId="{2C334FD8-03E3-40CF-BFD7-46B58535148C}">
+    <dgm:pt modelId="{7D8AA24D-23AB-4C97-84EF-9153257454EF}" type="parTrans" cxnId="{7861C75A-80EA-474B-9611-5D8617BA1239}">
       <dgm:prSet/>
       <dgm:spPr/>
       <dgm:t>
@@ -3729,7 +3740,7 @@
         </a:p>
       </dgm:t>
     </dgm:pt>
-    <dgm:pt modelId="{178F9D68-9C6A-411D-8106-37D850A7F191}" type="sibTrans" cxnId="{2C334FD8-03E3-40CF-BFD7-46B58535148C}">
+    <dgm:pt modelId="{0BF7604B-F0CE-48A6-87DA-860E4FDC491F}" type="sibTrans" cxnId="{7861C75A-80EA-474B-9611-5D8617BA1239}">
       <dgm:prSet/>
       <dgm:spPr/>
       <dgm:t>
@@ -3740,22 +3751,21 @@
         </a:p>
       </dgm:t>
     </dgm:pt>
-    <dgm:pt modelId="{B618ABDB-6ACD-4218-9A58-8E5B14DEF71B}">
-      <dgm:prSet phldrT="[Text]"/>
+    <dgm:pt modelId="{5D89450D-D6C9-47DF-B3A7-21413984ACDA}">
+      <dgm:prSet/>
       <dgm:spPr/>
       <dgm:t>
         <a:bodyPr/>
         <a:lstStyle/>
         <a:p>
           <a:r>
-            <a:rPr lang="en-CA" dirty="0"/>
-            <a:t>content</a:t>
+            <a:rPr lang="pt-PT" dirty="0"/>
+            <a:t>Realização de encomendas</a:t>
           </a:r>
-          <a:endParaRPr lang="en-US" dirty="0"/>
         </a:p>
       </dgm:t>
     </dgm:pt>
-    <dgm:pt modelId="{CEE82012-B781-4358-BE08-10871B43B973}" type="parTrans" cxnId="{0E465D43-3609-4451-869D-A0A707F486CE}">
+    <dgm:pt modelId="{C29703F6-7E6E-413F-A92A-6FA284BD7664}" type="parTrans" cxnId="{E0A5FE64-322E-43C8-9DB2-45925F226BD2}">
       <dgm:prSet/>
       <dgm:spPr/>
       <dgm:t>
@@ -3766,7 +3776,7 @@
         </a:p>
       </dgm:t>
     </dgm:pt>
-    <dgm:pt modelId="{E092E454-2A8C-4770-B36B-AEA81BBD57D9}" type="sibTrans" cxnId="{0E465D43-3609-4451-869D-A0A707F486CE}">
+    <dgm:pt modelId="{3AF286AB-A9E4-4235-8010-8A9CDCFD3ECB}" type="sibTrans" cxnId="{E0A5FE64-322E-43C8-9DB2-45925F226BD2}">
       <dgm:prSet/>
       <dgm:spPr/>
       <dgm:t>
@@ -3777,22 +3787,21 @@
         </a:p>
       </dgm:t>
     </dgm:pt>
-    <dgm:pt modelId="{F06AD897-EF3A-40F2-AB1C-E114D5EAA9BB}">
-      <dgm:prSet phldrT="[Text]"/>
+    <dgm:pt modelId="{FCF91796-6F65-489A-81F0-952565DA7898}">
+      <dgm:prSet/>
       <dgm:spPr/>
       <dgm:t>
         <a:bodyPr/>
         <a:lstStyle/>
         <a:p>
           <a:r>
-            <a:rPr lang="en-CA" dirty="0"/>
-            <a:t>content</a:t>
+            <a:rPr lang="pt-PT" dirty="0"/>
+            <a:t>Classificação de produtos</a:t>
           </a:r>
-          <a:endParaRPr lang="en-US" dirty="0"/>
         </a:p>
       </dgm:t>
     </dgm:pt>
-    <dgm:pt modelId="{52E1F3D5-85B7-4198-93E2-269D369A21DA}" type="parTrans" cxnId="{ABC03424-3B0C-4A80-A5DC-7C1133E5CA74}">
+    <dgm:pt modelId="{19FDFF0D-C58A-4248-947E-B13438B630B7}" type="parTrans" cxnId="{04A8BE44-FE0A-46AB-8AA8-1B05E6C4A4B8}">
       <dgm:prSet/>
       <dgm:spPr/>
       <dgm:t>
@@ -3803,7 +3812,7 @@
         </a:p>
       </dgm:t>
     </dgm:pt>
-    <dgm:pt modelId="{0755C263-E9CB-4866-9143-261813E64D58}" type="sibTrans" cxnId="{ABC03424-3B0C-4A80-A5DC-7C1133E5CA74}">
+    <dgm:pt modelId="{219D3BC3-F5E1-47D1-8E9F-84D779F68B29}" type="sibTrans" cxnId="{04A8BE44-FE0A-46AB-8AA8-1B05E6C4A4B8}">
       <dgm:prSet/>
       <dgm:spPr/>
       <dgm:t>
@@ -3814,22 +3823,25 @@
         </a:p>
       </dgm:t>
     </dgm:pt>
-    <dgm:pt modelId="{AB0F0765-05E9-4B1C-A0D4-E6DFC3B7BC40}">
-      <dgm:prSet phldrT="[Text]"/>
+    <dgm:pt modelId="{2200F8CE-C5FE-48D5-B30F-E90E2197E68D}">
+      <dgm:prSet/>
       <dgm:spPr/>
       <dgm:t>
         <a:bodyPr/>
         <a:lstStyle/>
         <a:p>
           <a:r>
-            <a:rPr lang="en-CA" dirty="0"/>
-            <a:t>content</a:t>
+            <a:rPr lang="pt-PT" dirty="0"/>
+            <a:t>Publicação de comentários sobre produtos em </a:t>
           </a:r>
-          <a:endParaRPr lang="en-US" dirty="0"/>
+          <a:r>
+            <a:rPr lang="en-US" i="1" dirty="0"/>
+            <a:t>threads</a:t>
+          </a:r>
         </a:p>
       </dgm:t>
     </dgm:pt>
-    <dgm:pt modelId="{7C6F2C7B-1B8D-4564-B738-10EAF9F2799C}" type="parTrans" cxnId="{5295A25B-98B2-4011-8E68-B1915757E829}">
+    <dgm:pt modelId="{F0E8BBAC-C7B4-4EF2-AB73-2130052773CF}" type="parTrans" cxnId="{F6680518-1962-49F5-8A28-BE03AB06FA86}">
       <dgm:prSet/>
       <dgm:spPr/>
       <dgm:t>
@@ -3840,7 +3852,7 @@
         </a:p>
       </dgm:t>
     </dgm:pt>
-    <dgm:pt modelId="{5663580C-8527-483B-8EBE-48CEC9DDBD60}" type="sibTrans" cxnId="{5295A25B-98B2-4011-8E68-B1915757E829}">
+    <dgm:pt modelId="{68AE3F52-AF72-4F5B-B338-BE464FF87B28}" type="sibTrans" cxnId="{F6680518-1962-49F5-8A28-BE03AB06FA86}">
       <dgm:prSet/>
       <dgm:spPr/>
       <dgm:t>
@@ -3851,22 +3863,21 @@
         </a:p>
       </dgm:t>
     </dgm:pt>
-    <dgm:pt modelId="{3EC6D9D0-A7A2-4F7F-A6A2-BFEBB558F4EF}">
-      <dgm:prSet phldrT="[Text]"/>
+    <dgm:pt modelId="{8B797A31-F429-4C6F-826D-70F9A48EA190}">
+      <dgm:prSet/>
       <dgm:spPr/>
       <dgm:t>
         <a:bodyPr/>
         <a:lstStyle/>
         <a:p>
           <a:r>
-            <a:rPr lang="en-CA" dirty="0"/>
-            <a:t>content</a:t>
+            <a:rPr lang="pt-PT" dirty="0"/>
+            <a:t>Participação em campanhas promocionais</a:t>
           </a:r>
-          <a:endParaRPr lang="en-US" dirty="0"/>
         </a:p>
       </dgm:t>
     </dgm:pt>
-    <dgm:pt modelId="{208740FA-7021-4E3A-A97D-9D0343319D10}" type="sibTrans" cxnId="{E9C9629B-F9D5-4E38-80FD-131260879F4F}">
+    <dgm:pt modelId="{BC357F20-B14E-4600-AF24-55F4B524D4F3}" type="parTrans" cxnId="{CCEA5F6B-6E55-45F4-9B59-22B5376BB86B}">
       <dgm:prSet/>
       <dgm:spPr/>
       <dgm:t>
@@ -3877,7 +3888,7 @@
         </a:p>
       </dgm:t>
     </dgm:pt>
-    <dgm:pt modelId="{BB67CC9B-1315-4E95-8A33-03D5B47384DA}" type="parTrans" cxnId="{E9C9629B-F9D5-4E38-80FD-131260879F4F}">
+    <dgm:pt modelId="{11949B2B-4D1C-4DD2-A4EE-B0133627DE93}" type="sibTrans" cxnId="{CCEA5F6B-6E55-45F4-9B59-22B5376BB86B}">
       <dgm:prSet/>
       <dgm:spPr/>
       <dgm:t>
@@ -3885,191 +3896,6 @@
         <a:lstStyle/>
         <a:p>
           <a:endParaRPr lang="en-US"/>
-        </a:p>
-      </dgm:t>
-    </dgm:pt>
-    <dgm:pt modelId="{53BF934F-8B35-47F8-8AFA-652F12E3DFAB}">
-      <dgm:prSet phldrT="[Text]"/>
-      <dgm:spPr/>
-      <dgm:t>
-        <a:bodyPr/>
-        <a:lstStyle/>
-        <a:p>
-          <a:r>
-            <a:rPr lang="en-CA" i="1" dirty="0"/>
-            <a:t>Content</a:t>
-          </a:r>
-          <a:endParaRPr lang="en-US" i="1" dirty="0"/>
-        </a:p>
-      </dgm:t>
-    </dgm:pt>
-    <dgm:pt modelId="{A59165AB-2F6B-42FB-8E4B-94DC7115D96B}" type="sibTrans" cxnId="{75A5B305-28AD-4DD5-9C89-1E77F9AAD83A}">
-      <dgm:prSet/>
-      <dgm:spPr/>
-      <dgm:t>
-        <a:bodyPr/>
-        <a:lstStyle/>
-        <a:p>
-          <a:endParaRPr lang="en-US"/>
-        </a:p>
-      </dgm:t>
-    </dgm:pt>
-    <dgm:pt modelId="{9CC3DB64-37AE-4673-9D4A-02C46ED3C5AD}" type="parTrans" cxnId="{75A5B305-28AD-4DD5-9C89-1E77F9AAD83A}">
-      <dgm:prSet/>
-      <dgm:spPr/>
-      <dgm:t>
-        <a:bodyPr/>
-        <a:lstStyle/>
-        <a:p>
-          <a:endParaRPr lang="en-US"/>
-        </a:p>
-      </dgm:t>
-    </dgm:pt>
-    <dgm:pt modelId="{9E18935A-23A6-4A2D-8799-95E69C2B6A18}">
-      <dgm:prSet/>
-      <dgm:spPr/>
-      <dgm:t>
-        <a:bodyPr/>
-        <a:lstStyle/>
-        <a:p>
-          <a:r>
-            <a:rPr lang="en-CA"/>
-            <a:t>content</a:t>
-          </a:r>
-          <a:endParaRPr lang="en-US"/>
-        </a:p>
-      </dgm:t>
-    </dgm:pt>
-    <dgm:pt modelId="{92BBC6A6-C9DD-4417-A492-A88EF48D373C}" type="parTrans" cxnId="{2528DFC2-A3B9-4CB1-B2BA-634C940458BE}">
-      <dgm:prSet/>
-      <dgm:spPr/>
-      <dgm:t>
-        <a:bodyPr/>
-        <a:lstStyle/>
-        <a:p>
-          <a:endParaRPr lang="en-US"/>
-        </a:p>
-      </dgm:t>
-    </dgm:pt>
-    <dgm:pt modelId="{D6F69830-B588-44F8-9402-D6D182B01A54}" type="sibTrans" cxnId="{2528DFC2-A3B9-4CB1-B2BA-634C940458BE}">
-      <dgm:prSet/>
-      <dgm:spPr/>
-      <dgm:t>
-        <a:bodyPr/>
-        <a:lstStyle/>
-        <a:p>
-          <a:endParaRPr lang="en-US"/>
-        </a:p>
-      </dgm:t>
-    </dgm:pt>
-    <dgm:pt modelId="{FA3ADEBB-1187-452F-B728-FA6A4C3A8398}">
-      <dgm:prSet/>
-      <dgm:spPr/>
-      <dgm:t>
-        <a:bodyPr/>
-        <a:lstStyle/>
-        <a:p>
-          <a:r>
-            <a:rPr lang="en-CA"/>
-            <a:t>content</a:t>
-          </a:r>
-          <a:endParaRPr lang="en-US"/>
-        </a:p>
-      </dgm:t>
-    </dgm:pt>
-    <dgm:pt modelId="{B646B2BE-3B87-4955-B541-48079F648CD9}" type="parTrans" cxnId="{B0CAD052-20F6-4059-B9C6-4560D8972731}">
-      <dgm:prSet/>
-      <dgm:spPr/>
-      <dgm:t>
-        <a:bodyPr/>
-        <a:lstStyle/>
-        <a:p>
-          <a:endParaRPr lang="en-US"/>
-        </a:p>
-      </dgm:t>
-    </dgm:pt>
-    <dgm:pt modelId="{554F0EB7-EF51-4775-BF0B-23C9F0855FB5}" type="sibTrans" cxnId="{B0CAD052-20F6-4059-B9C6-4560D8972731}">
-      <dgm:prSet/>
-      <dgm:spPr/>
-      <dgm:t>
-        <a:bodyPr/>
-        <a:lstStyle/>
-        <a:p>
-          <a:endParaRPr lang="en-US"/>
-        </a:p>
-      </dgm:t>
-    </dgm:pt>
-    <dgm:pt modelId="{10DBA9BF-510D-4D15-9473-09ED6CA5B8E1}">
-      <dgm:prSet phldrT="[Text]"/>
-      <dgm:spPr/>
-      <dgm:t>
-        <a:bodyPr/>
-        <a:lstStyle/>
-        <a:p>
-          <a:r>
-            <a:rPr lang="en-CA" i="1" dirty="0"/>
-            <a:t>Content</a:t>
-          </a:r>
-          <a:endParaRPr lang="en-US" i="1" dirty="0"/>
-        </a:p>
-      </dgm:t>
-    </dgm:pt>
-    <dgm:pt modelId="{941C5743-2C6A-462C-8830-0EBFFFF89E65}" type="parTrans" cxnId="{E702DA45-3B89-4A7A-8A14-3D0C1FF650E9}">
-      <dgm:prSet/>
-      <dgm:spPr/>
-      <dgm:t>
-        <a:bodyPr/>
-        <a:lstStyle/>
-        <a:p>
-          <a:endParaRPr lang="pt-PT"/>
-        </a:p>
-      </dgm:t>
-    </dgm:pt>
-    <dgm:pt modelId="{88C128A3-4F46-488D-89A1-420A3760254C}" type="sibTrans" cxnId="{E702DA45-3B89-4A7A-8A14-3D0C1FF650E9}">
-      <dgm:prSet/>
-      <dgm:spPr/>
-      <dgm:t>
-        <a:bodyPr/>
-        <a:lstStyle/>
-        <a:p>
-          <a:endParaRPr lang="pt-PT"/>
-        </a:p>
-      </dgm:t>
-    </dgm:pt>
-    <dgm:pt modelId="{49EFB7F5-62DF-498D-BD2F-FCFA6A52770A}">
-      <dgm:prSet phldrT="[Text]"/>
-      <dgm:spPr/>
-      <dgm:t>
-        <a:bodyPr/>
-        <a:lstStyle/>
-        <a:p>
-          <a:r>
-            <a:rPr lang="en-CA" i="1" dirty="0"/>
-            <a:t>content</a:t>
-          </a:r>
-          <a:endParaRPr lang="en-US" i="1" dirty="0"/>
-        </a:p>
-      </dgm:t>
-    </dgm:pt>
-    <dgm:pt modelId="{AE937E9F-C48C-4189-A862-BAE29476C64F}" type="parTrans" cxnId="{8C2678C8-7A2E-4204-B8BA-D5047F4F421D}">
-      <dgm:prSet/>
-      <dgm:spPr/>
-      <dgm:t>
-        <a:bodyPr/>
-        <a:lstStyle/>
-        <a:p>
-          <a:endParaRPr lang="pt-PT"/>
-        </a:p>
-      </dgm:t>
-    </dgm:pt>
-    <dgm:pt modelId="{32FA5992-78E9-499F-96B2-6A31E1D507C8}" type="sibTrans" cxnId="{8C2678C8-7A2E-4204-B8BA-D5047F4F421D}">
-      <dgm:prSet/>
-      <dgm:spPr/>
-      <dgm:t>
-        <a:bodyPr/>
-        <a:lstStyle/>
-        <a:p>
-          <a:endParaRPr lang="pt-PT"/>
         </a:p>
       </dgm:t>
     </dgm:pt>
@@ -4094,11 +3920,11 @@
       <dgm:spPr/>
     </dgm:pt>
     <dgm:pt modelId="{1605BDF2-69AD-41A7-84BE-5A9A691BE61A}" type="pres">
-      <dgm:prSet presAssocID="{8ACDD044-E61A-48FD-A01B-6DE1D8EBF2C8}" presName="rootText" presStyleLbl="node1" presStyleIdx="0" presStyleCnt="4"/>
+      <dgm:prSet presAssocID="{8ACDD044-E61A-48FD-A01B-6DE1D8EBF2C8}" presName="rootText" presStyleLbl="node1" presStyleIdx="0" presStyleCnt="3"/>
       <dgm:spPr/>
     </dgm:pt>
     <dgm:pt modelId="{C36929F4-EA53-40DE-8D52-2336DBF11DCC}" type="pres">
-      <dgm:prSet presAssocID="{8ACDD044-E61A-48FD-A01B-6DE1D8EBF2C8}" presName="rootConnector" presStyleLbl="node1" presStyleIdx="0" presStyleCnt="4"/>
+      <dgm:prSet presAssocID="{8ACDD044-E61A-48FD-A01B-6DE1D8EBF2C8}" presName="rootConnector" presStyleLbl="node1" presStyleIdx="0" presStyleCnt="3"/>
       <dgm:spPr/>
     </dgm:pt>
     <dgm:pt modelId="{210FF07E-EEAF-4B4E-BFCB-A7BDDB2D6A95}" type="pres">
@@ -4106,23 +3932,23 @@
       <dgm:spPr/>
     </dgm:pt>
     <dgm:pt modelId="{E5EF051C-60C4-466C-918A-9A8965F9275F}" type="pres">
-      <dgm:prSet presAssocID="{DBF53B33-C12A-4610-8452-269CC9BE3733}" presName="Name13" presStyleLbl="parChTrans1D2" presStyleIdx="0" presStyleCnt="9"/>
+      <dgm:prSet presAssocID="{DBF53B33-C12A-4610-8452-269CC9BE3733}" presName="Name13" presStyleLbl="parChTrans1D2" presStyleIdx="0" presStyleCnt="8"/>
       <dgm:spPr/>
     </dgm:pt>
     <dgm:pt modelId="{723B9B5A-DDED-4A18-91FD-D2B863B2B9D2}" type="pres">
-      <dgm:prSet presAssocID="{1D80A1C1-DB05-49C3-93C0-7399B5E39831}" presName="childText" presStyleLbl="bgAcc1" presStyleIdx="0" presStyleCnt="9" custScaleX="156402" custScaleY="151311">
+      <dgm:prSet presAssocID="{1D80A1C1-DB05-49C3-93C0-7399B5E39831}" presName="childText" presStyleLbl="bgAcc1" presStyleIdx="0" presStyleCnt="8" custScaleX="205747" custScaleY="99948">
         <dgm:presLayoutVars>
           <dgm:bulletEnabled val="1"/>
         </dgm:presLayoutVars>
       </dgm:prSet>
       <dgm:spPr/>
     </dgm:pt>
-    <dgm:pt modelId="{65FC3DF6-B5F9-47DD-9ACB-BDA16815EFF3}" type="pres">
-      <dgm:prSet presAssocID="{1560965D-3578-4BCE-BEC3-B9CE512FAFB5}" presName="Name13" presStyleLbl="parChTrans1D2" presStyleIdx="1" presStyleCnt="9"/>
+    <dgm:pt modelId="{7520E9DE-6600-4317-BFF9-7515AB7BFFA5}" type="pres">
+      <dgm:prSet presAssocID="{9CC8C846-47B5-4224-A5E6-CB2105FD6917}" presName="Name13" presStyleLbl="parChTrans1D2" presStyleIdx="1" presStyleCnt="8"/>
       <dgm:spPr/>
     </dgm:pt>
-    <dgm:pt modelId="{5C64FD53-80A5-429C-A13E-0684D2C7E4F4}" type="pres">
-      <dgm:prSet presAssocID="{83A1D220-073C-4F3C-AEE5-296175FD9B94}" presName="childText" presStyleLbl="bgAcc1" presStyleIdx="1" presStyleCnt="9" custScaleX="140826" custScaleY="87256">
+    <dgm:pt modelId="{4B7DDA1B-E77F-4F2A-BD5A-AC67C257877D}" type="pres">
+      <dgm:prSet presAssocID="{BF69016F-4EAC-4DCA-868D-93B17B5D0CFA}" presName="childText" presStyleLbl="bgAcc1" presStyleIdx="1" presStyleCnt="8" custScaleX="205747">
         <dgm:presLayoutVars>
           <dgm:bulletEnabled val="1"/>
         </dgm:presLayoutVars>
@@ -4138,135 +3964,103 @@
       <dgm:spPr/>
     </dgm:pt>
     <dgm:pt modelId="{EF30944E-B1FC-431A-9CC9-0BE1F17CA7AA}" type="pres">
-      <dgm:prSet presAssocID="{862FEC19-6E6E-4E5F-ADFA-CEFF6AE4884C}" presName="rootText" presStyleLbl="node1" presStyleIdx="1" presStyleCnt="4"/>
+      <dgm:prSet presAssocID="{862FEC19-6E6E-4E5F-ADFA-CEFF6AE4884C}" presName="rootText" presStyleLbl="node1" presStyleIdx="1" presStyleCnt="3"/>
       <dgm:spPr/>
     </dgm:pt>
     <dgm:pt modelId="{B0AA77AA-3AC9-40D1-88EB-6E387763E09F}" type="pres">
-      <dgm:prSet presAssocID="{862FEC19-6E6E-4E5F-ADFA-CEFF6AE4884C}" presName="rootConnector" presStyleLbl="node1" presStyleIdx="1" presStyleCnt="4"/>
+      <dgm:prSet presAssocID="{862FEC19-6E6E-4E5F-ADFA-CEFF6AE4884C}" presName="rootConnector" presStyleLbl="node1" presStyleIdx="1" presStyleCnt="3"/>
       <dgm:spPr/>
     </dgm:pt>
     <dgm:pt modelId="{74316339-DCE9-45C1-B69F-552E899B36EE}" type="pres">
       <dgm:prSet presAssocID="{862FEC19-6E6E-4E5F-ADFA-CEFF6AE4884C}" presName="childShape" presStyleCnt="0"/>
       <dgm:spPr/>
     </dgm:pt>
-    <dgm:pt modelId="{33D8CCF8-D60C-4D7B-B6F2-38D5A2C764A8}" type="pres">
-      <dgm:prSet presAssocID="{BB67CC9B-1315-4E95-8A33-03D5B47384DA}" presName="Name13" presStyleLbl="parChTrans1D2" presStyleIdx="2" presStyleCnt="9"/>
+    <dgm:pt modelId="{91B35279-7648-4375-B713-9DF3BF94E8D9}" type="pres">
+      <dgm:prSet presAssocID="{C6BD032F-B5AD-451A-8B35-0C9F261AB70C}" presName="Name13" presStyleLbl="parChTrans1D2" presStyleIdx="2" presStyleCnt="8"/>
       <dgm:spPr/>
     </dgm:pt>
-    <dgm:pt modelId="{5DB72798-CBEB-43EB-AEE2-B122F1A06F83}" type="pres">
-      <dgm:prSet presAssocID="{3EC6D9D0-A7A2-4F7F-A6A2-BFEBB558F4EF}" presName="childText" presStyleLbl="bgAcc1" presStyleIdx="2" presStyleCnt="9" custScaleX="140730" custScaleY="87256">
+    <dgm:pt modelId="{A28C8685-A8C1-44F6-9DBC-C4D88A000FD6}" type="pres">
+      <dgm:prSet presAssocID="{7A9A831D-CD01-4AC5-BFAB-E1325E1A375C}" presName="childText" presStyleLbl="bgAcc1" presStyleIdx="2" presStyleCnt="8" custScaleX="205747">
         <dgm:presLayoutVars>
           <dgm:bulletEnabled val="1"/>
         </dgm:presLayoutVars>
       </dgm:prSet>
       <dgm:spPr/>
     </dgm:pt>
-    <dgm:pt modelId="{1230C02A-614B-47F6-94FE-D1470FC2A903}" type="pres">
-      <dgm:prSet presAssocID="{92BBC6A6-C9DD-4417-A492-A88EF48D373C}" presName="Name13" presStyleLbl="parChTrans1D2" presStyleIdx="3" presStyleCnt="9"/>
+    <dgm:pt modelId="{2A33608E-8BBB-4FFC-9D2E-D7202A9CEC62}" type="pres">
+      <dgm:prSet presAssocID="{42B88018-AD62-401C-B96F-E0900F681684}" presName="Name13" presStyleLbl="parChTrans1D2" presStyleIdx="3" presStyleCnt="8"/>
       <dgm:spPr/>
     </dgm:pt>
-    <dgm:pt modelId="{077DF96F-93FD-49D3-89E8-C0E306317D6B}" type="pres">
-      <dgm:prSet presAssocID="{9E18935A-23A6-4A2D-8799-95E69C2B6A18}" presName="childText" presStyleLbl="bgAcc1" presStyleIdx="3" presStyleCnt="9">
+    <dgm:pt modelId="{2D3CA462-1BBD-487F-A208-8A0A0778879E}" type="pres">
+      <dgm:prSet presAssocID="{5E94C752-50AB-4C5B-BB61-447CBA78D74A}" presName="childText" presStyleLbl="bgAcc1" presStyleIdx="3" presStyleCnt="8" custScaleX="205747">
         <dgm:presLayoutVars>
           <dgm:bulletEnabled val="1"/>
         </dgm:presLayoutVars>
       </dgm:prSet>
       <dgm:spPr/>
     </dgm:pt>
-    <dgm:pt modelId="{A5EEBD4C-3554-4D4D-9729-A3B8F8A5A3E8}" type="pres">
-      <dgm:prSet presAssocID="{34B168C8-0FBB-42A7-9EA0-4CF734F7E1D4}" presName="root" presStyleCnt="0"/>
+    <dgm:pt modelId="{75FCB3B9-7508-4C09-8531-81E34882314F}" type="pres">
+      <dgm:prSet presAssocID="{429A8E1D-41CA-4269-80E5-5932D6C8C480}" presName="root" presStyleCnt="0"/>
       <dgm:spPr/>
     </dgm:pt>
-    <dgm:pt modelId="{57E44C3B-8EC2-469D-BC19-107AC761B771}" type="pres">
-      <dgm:prSet presAssocID="{34B168C8-0FBB-42A7-9EA0-4CF734F7E1D4}" presName="rootComposite" presStyleCnt="0"/>
+    <dgm:pt modelId="{461E6D55-C100-4BDF-AE30-9DF2B07C59EA}" type="pres">
+      <dgm:prSet presAssocID="{429A8E1D-41CA-4269-80E5-5932D6C8C480}" presName="rootComposite" presStyleCnt="0"/>
       <dgm:spPr/>
     </dgm:pt>
-    <dgm:pt modelId="{26994A90-1875-4CEC-8F49-DCE6ED2AEC26}" type="pres">
-      <dgm:prSet presAssocID="{34B168C8-0FBB-42A7-9EA0-4CF734F7E1D4}" presName="rootText" presStyleLbl="node1" presStyleIdx="2" presStyleCnt="4"/>
+    <dgm:pt modelId="{BBB6D5B2-0E1A-43FD-AE26-C1637F8578C2}" type="pres">
+      <dgm:prSet presAssocID="{429A8E1D-41CA-4269-80E5-5932D6C8C480}" presName="rootText" presStyleLbl="node1" presStyleIdx="2" presStyleCnt="3"/>
       <dgm:spPr/>
     </dgm:pt>
-    <dgm:pt modelId="{DF3EF058-5790-4CD8-8784-F45B65C36357}" type="pres">
-      <dgm:prSet presAssocID="{34B168C8-0FBB-42A7-9EA0-4CF734F7E1D4}" presName="rootConnector" presStyleLbl="node1" presStyleIdx="2" presStyleCnt="4"/>
+    <dgm:pt modelId="{4D309180-825C-4CF7-ABEF-4FE0C502A521}" type="pres">
+      <dgm:prSet presAssocID="{429A8E1D-41CA-4269-80E5-5932D6C8C480}" presName="rootConnector" presStyleLbl="node1" presStyleIdx="2" presStyleCnt="3"/>
       <dgm:spPr/>
     </dgm:pt>
-    <dgm:pt modelId="{390C23DF-73D1-450C-AB7A-8D0E9D09CA85}" type="pres">
-      <dgm:prSet presAssocID="{34B168C8-0FBB-42A7-9EA0-4CF734F7E1D4}" presName="childShape" presStyleCnt="0"/>
+    <dgm:pt modelId="{202B2392-9D1B-429A-9E3F-256487846A79}" type="pres">
+      <dgm:prSet presAssocID="{429A8E1D-41CA-4269-80E5-5932D6C8C480}" presName="childShape" presStyleCnt="0"/>
       <dgm:spPr/>
     </dgm:pt>
-    <dgm:pt modelId="{382E9C81-3BAB-4543-B0BD-11FE9A067969}" type="pres">
-      <dgm:prSet presAssocID="{B646B2BE-3B87-4955-B541-48079F648CD9}" presName="Name13" presStyleLbl="parChTrans1D2" presStyleIdx="4" presStyleCnt="9"/>
+    <dgm:pt modelId="{789EC290-DFFA-4E2A-B9FE-29B5A9A9B6BF}" type="pres">
+      <dgm:prSet presAssocID="{C29703F6-7E6E-413F-A92A-6FA284BD7664}" presName="Name13" presStyleLbl="parChTrans1D2" presStyleIdx="4" presStyleCnt="8"/>
       <dgm:spPr/>
     </dgm:pt>
-    <dgm:pt modelId="{7C8A1000-99FA-4197-AB9E-91187898F8C3}" type="pres">
-      <dgm:prSet presAssocID="{FA3ADEBB-1187-452F-B728-FA6A4C3A8398}" presName="childText" presStyleLbl="bgAcc1" presStyleIdx="4" presStyleCnt="9">
+    <dgm:pt modelId="{14A74095-9703-4207-92DB-85F3EB6823AD}" type="pres">
+      <dgm:prSet presAssocID="{5D89450D-D6C9-47DF-B3A7-21413984ACDA}" presName="childText" presStyleLbl="bgAcc1" presStyleIdx="4" presStyleCnt="8" custScaleX="205747">
         <dgm:presLayoutVars>
           <dgm:bulletEnabled val="1"/>
         </dgm:presLayoutVars>
       </dgm:prSet>
       <dgm:spPr/>
     </dgm:pt>
-    <dgm:pt modelId="{82334795-1A0D-4C55-84EF-77CEAEAE4344}" type="pres">
-      <dgm:prSet presAssocID="{463AB51D-12C1-4ADE-ABFE-AD7C1918CFDD}" presName="root" presStyleCnt="0"/>
+    <dgm:pt modelId="{02E9A38B-264A-4A28-BE04-09608DB043E5}" type="pres">
+      <dgm:prSet presAssocID="{19FDFF0D-C58A-4248-947E-B13438B630B7}" presName="Name13" presStyleLbl="parChTrans1D2" presStyleIdx="5" presStyleCnt="8"/>
       <dgm:spPr/>
     </dgm:pt>
-    <dgm:pt modelId="{071E9965-0440-4BE8-B2FF-0DDD799C8F54}" type="pres">
-      <dgm:prSet presAssocID="{463AB51D-12C1-4ADE-ABFE-AD7C1918CFDD}" presName="rootComposite" presStyleCnt="0"/>
-      <dgm:spPr/>
-    </dgm:pt>
-    <dgm:pt modelId="{F7723B08-FDF8-4267-8DC3-E233B06F5DC0}" type="pres">
-      <dgm:prSet presAssocID="{463AB51D-12C1-4ADE-ABFE-AD7C1918CFDD}" presName="rootText" presStyleLbl="node1" presStyleIdx="3" presStyleCnt="4"/>
-      <dgm:spPr/>
-    </dgm:pt>
-    <dgm:pt modelId="{1390558A-0D0B-4A4B-A370-6D486DA6FAA7}" type="pres">
-      <dgm:prSet presAssocID="{463AB51D-12C1-4ADE-ABFE-AD7C1918CFDD}" presName="rootConnector" presStyleLbl="node1" presStyleIdx="3" presStyleCnt="4"/>
-      <dgm:spPr/>
-    </dgm:pt>
-    <dgm:pt modelId="{769C2D46-907E-442D-82EA-9C3686CB14F3}" type="pres">
-      <dgm:prSet presAssocID="{463AB51D-12C1-4ADE-ABFE-AD7C1918CFDD}" presName="childShape" presStyleCnt="0"/>
-      <dgm:spPr/>
-    </dgm:pt>
-    <dgm:pt modelId="{3FAB9D14-74F6-4949-86FE-DDFA337CDD9B}" type="pres">
-      <dgm:prSet presAssocID="{8E6CA364-0675-428F-AC08-FC280CAF809B}" presName="Name13" presStyleLbl="parChTrans1D2" presStyleIdx="5" presStyleCnt="9"/>
-      <dgm:spPr/>
-    </dgm:pt>
-    <dgm:pt modelId="{FD5B5B45-8D4F-4FC8-98BD-94634AE50740}" type="pres">
-      <dgm:prSet presAssocID="{F2FF6C68-D24C-43F0-9D44-692D6BDF2EFF}" presName="childText" presStyleLbl="bgAcc1" presStyleIdx="5" presStyleCnt="9" custScaleX="77271" custScaleY="80013">
+    <dgm:pt modelId="{6E625772-9F1A-49D2-9193-C4C7F16E0899}" type="pres">
+      <dgm:prSet presAssocID="{FCF91796-6F65-489A-81F0-952565DA7898}" presName="childText" presStyleLbl="bgAcc1" presStyleIdx="5" presStyleCnt="8" custScaleX="205747">
         <dgm:presLayoutVars>
           <dgm:bulletEnabled val="1"/>
         </dgm:presLayoutVars>
       </dgm:prSet>
       <dgm:spPr/>
     </dgm:pt>
-    <dgm:pt modelId="{AF665868-D1B1-4E79-BB44-3B530F5AB03B}" type="pres">
-      <dgm:prSet presAssocID="{CEE82012-B781-4358-BE08-10871B43B973}" presName="Name13" presStyleLbl="parChTrans1D2" presStyleIdx="6" presStyleCnt="9"/>
+    <dgm:pt modelId="{7B6764B6-163B-468E-B793-3861BACFE459}" type="pres">
+      <dgm:prSet presAssocID="{F0E8BBAC-C7B4-4EF2-AB73-2130052773CF}" presName="Name13" presStyleLbl="parChTrans1D2" presStyleIdx="6" presStyleCnt="8"/>
       <dgm:spPr/>
     </dgm:pt>
-    <dgm:pt modelId="{C67D23C7-4635-4A49-93C0-F8DDA1E06049}" type="pres">
-      <dgm:prSet presAssocID="{B618ABDB-6ACD-4218-9A58-8E5B14DEF71B}" presName="childText" presStyleLbl="bgAcc1" presStyleIdx="6" presStyleCnt="9" custScaleX="77271" custScaleY="80013">
+    <dgm:pt modelId="{B468F478-4533-4A40-9612-9EF806B0E159}" type="pres">
+      <dgm:prSet presAssocID="{2200F8CE-C5FE-48D5-B30F-E90E2197E68D}" presName="childText" presStyleLbl="bgAcc1" presStyleIdx="6" presStyleCnt="8" custScaleX="205717">
         <dgm:presLayoutVars>
           <dgm:bulletEnabled val="1"/>
         </dgm:presLayoutVars>
       </dgm:prSet>
       <dgm:spPr/>
     </dgm:pt>
-    <dgm:pt modelId="{7BD6ADC1-CA47-4FB4-86C1-12120231E138}" type="pres">
-      <dgm:prSet presAssocID="{52E1F3D5-85B7-4198-93E2-269D369A21DA}" presName="Name13" presStyleLbl="parChTrans1D2" presStyleIdx="7" presStyleCnt="9"/>
+    <dgm:pt modelId="{02C31BA6-6F02-4B5E-AB36-7E614F05BDD7}" type="pres">
+      <dgm:prSet presAssocID="{BC357F20-B14E-4600-AF24-55F4B524D4F3}" presName="Name13" presStyleLbl="parChTrans1D2" presStyleIdx="7" presStyleCnt="8"/>
       <dgm:spPr/>
     </dgm:pt>
-    <dgm:pt modelId="{4D9C5689-A3CC-4246-ACE4-2FCD625D2DBD}" type="pres">
-      <dgm:prSet presAssocID="{F06AD897-EF3A-40F2-AB1C-E114D5EAA9BB}" presName="childText" presStyleLbl="bgAcc1" presStyleIdx="7" presStyleCnt="9" custScaleX="77205" custScaleY="79833">
-        <dgm:presLayoutVars>
-          <dgm:bulletEnabled val="1"/>
-        </dgm:presLayoutVars>
-      </dgm:prSet>
-      <dgm:spPr/>
-    </dgm:pt>
-    <dgm:pt modelId="{0C4B42A2-C79A-462B-8997-0C54F8785037}" type="pres">
-      <dgm:prSet presAssocID="{7C6F2C7B-1B8D-4564-B738-10EAF9F2799C}" presName="Name13" presStyleLbl="parChTrans1D2" presStyleIdx="8" presStyleCnt="9"/>
-      <dgm:spPr/>
-    </dgm:pt>
-    <dgm:pt modelId="{9795C372-B1B6-485C-8B73-D30022696272}" type="pres">
-      <dgm:prSet presAssocID="{AB0F0765-05E9-4B1C-A0D4-E6DFC3B7BC40}" presName="childText" presStyleLbl="bgAcc1" presStyleIdx="8" presStyleCnt="9" custScaleX="77271" custScaleY="80013">
+    <dgm:pt modelId="{06C776E6-5E91-47BA-A505-8C4BB019E18D}" type="pres">
+      <dgm:prSet presAssocID="{8B797A31-F429-4C6F-826D-70F9A48EA190}" presName="childText" presStyleLbl="bgAcc1" presStyleIdx="7" presStyleCnt="8" custScaleX="205747">
         <dgm:presLayoutVars>
           <dgm:bulletEnabled val="1"/>
         </dgm:presLayoutVars>
@@ -4275,52 +4069,40 @@
     </dgm:pt>
   </dgm:ptLst>
   <dgm:cxnLst>
-    <dgm:cxn modelId="{75A5B305-28AD-4DD5-9C89-1E77F9AAD83A}" srcId="{1D80A1C1-DB05-49C3-93C0-7399B5E39831}" destId="{53BF934F-8B35-47F8-8AFA-652F12E3DFAB}" srcOrd="0" destOrd="0" parTransId="{9CC3DB64-37AE-4673-9D4A-02C46ED3C5AD}" sibTransId="{A59165AB-2F6B-42FB-8E4B-94DC7115D96B}"/>
+    <dgm:cxn modelId="{72A33A04-C37E-4B63-8AC0-C81AD7A2CE68}" type="presOf" srcId="{BC357F20-B14E-4600-AF24-55F4B524D4F3}" destId="{02C31BA6-6F02-4B5E-AB36-7E614F05BDD7}" srcOrd="0" destOrd="0" presId="urn:microsoft.com/office/officeart/2005/8/layout/hierarchy3"/>
     <dgm:cxn modelId="{0FD41609-91E3-4C27-8D35-AC57D0104883}" srcId="{8ACDD044-E61A-48FD-A01B-6DE1D8EBF2C8}" destId="{1D80A1C1-DB05-49C3-93C0-7399B5E39831}" srcOrd="0" destOrd="0" parTransId="{DBF53B33-C12A-4610-8452-269CC9BE3733}" sibTransId="{C36DCB93-15CB-41FD-A578-DA548A86AC90}"/>
-    <dgm:cxn modelId="{5E8E7E18-7085-414D-9DDC-F81AE464CA5A}" type="presOf" srcId="{F2FF6C68-D24C-43F0-9D44-692D6BDF2EFF}" destId="{FD5B5B45-8D4F-4FC8-98BD-94634AE50740}" srcOrd="0" destOrd="0" presId="urn:microsoft.com/office/officeart/2005/8/layout/hierarchy3"/>
+    <dgm:cxn modelId="{914E230C-7EE5-4A39-A913-293F4899170C}" type="presOf" srcId="{7A9A831D-CD01-4AC5-BFAB-E1325E1A375C}" destId="{A28C8685-A8C1-44F6-9DBC-C4D88A000FD6}" srcOrd="0" destOrd="0" presId="urn:microsoft.com/office/officeart/2005/8/layout/hierarchy3"/>
+    <dgm:cxn modelId="{87F2110D-F023-41F0-AAEE-86715EC495AD}" type="presOf" srcId="{42B88018-AD62-401C-B96F-E0900F681684}" destId="{2A33608E-8BBB-4FFC-9D2E-D7202A9CEC62}" srcOrd="0" destOrd="0" presId="urn:microsoft.com/office/officeart/2005/8/layout/hierarchy3"/>
+    <dgm:cxn modelId="{F6680518-1962-49F5-8A28-BE03AB06FA86}" srcId="{429A8E1D-41CA-4269-80E5-5932D6C8C480}" destId="{2200F8CE-C5FE-48D5-B30F-E90E2197E68D}" srcOrd="2" destOrd="0" parTransId="{F0E8BBAC-C7B4-4EF2-AB73-2130052773CF}" sibTransId="{68AE3F52-AF72-4F5B-B338-BE464FF87B28}"/>
     <dgm:cxn modelId="{F00D9019-6573-4E45-8B14-308D9DE49C43}" type="presOf" srcId="{1F872B68-1953-44E9-ABBD-AA0F4149073B}" destId="{43CC1663-DE1F-42F8-9EFB-1C3916CDAFDA}" srcOrd="0" destOrd="0" presId="urn:microsoft.com/office/officeart/2005/8/layout/hierarchy3"/>
-    <dgm:cxn modelId="{41034E1A-EBF2-4B1A-93A1-1AC82800BF2E}" type="presOf" srcId="{463AB51D-12C1-4ADE-ABFE-AD7C1918CFDD}" destId="{F7723B08-FDF8-4267-8DC3-E233B06F5DC0}" srcOrd="0" destOrd="0" presId="urn:microsoft.com/office/officeart/2005/8/layout/hierarchy3"/>
-    <dgm:cxn modelId="{ABC03424-3B0C-4A80-A5DC-7C1133E5CA74}" srcId="{463AB51D-12C1-4ADE-ABFE-AD7C1918CFDD}" destId="{F06AD897-EF3A-40F2-AB1C-E114D5EAA9BB}" srcOrd="2" destOrd="0" parTransId="{52E1F3D5-85B7-4198-93E2-269D369A21DA}" sibTransId="{0755C263-E9CB-4866-9143-261813E64D58}"/>
-    <dgm:cxn modelId="{E66F4724-CFC1-4AFE-B48E-27474082D1BB}" type="presOf" srcId="{463AB51D-12C1-4ADE-ABFE-AD7C1918CFDD}" destId="{1390558A-0D0B-4A4B-A370-6D486DA6FAA7}" srcOrd="1" destOrd="0" presId="urn:microsoft.com/office/officeart/2005/8/layout/hierarchy3"/>
+    <dgm:cxn modelId="{E161A51E-5A5A-4F65-9147-2F35C8BE7D38}" type="presOf" srcId="{BF69016F-4EAC-4DCA-868D-93B17B5D0CFA}" destId="{4B7DDA1B-E77F-4F2A-BD5A-AC67C257877D}" srcOrd="0" destOrd="0" presId="urn:microsoft.com/office/officeart/2005/8/layout/hierarchy3"/>
+    <dgm:cxn modelId="{128C8824-C3C2-4F00-99D7-D54F0BA83FD5}" type="presOf" srcId="{19FDFF0D-C58A-4248-947E-B13438B630B7}" destId="{02E9A38B-264A-4A28-BE04-09608DB043E5}" srcOrd="0" destOrd="0" presId="urn:microsoft.com/office/officeart/2005/8/layout/hierarchy3"/>
     <dgm:cxn modelId="{F344B224-8F43-4615-BA24-705695ACE94F}" type="presOf" srcId="{1D80A1C1-DB05-49C3-93C0-7399B5E39831}" destId="{723B9B5A-DDED-4A18-91FD-D2B863B2B9D2}" srcOrd="0" destOrd="0" presId="urn:microsoft.com/office/officeart/2005/8/layout/hierarchy3"/>
-    <dgm:cxn modelId="{24A3F233-C970-4C2E-80AC-9DDD86EA7842}" type="presOf" srcId="{BB67CC9B-1315-4E95-8A33-03D5B47384DA}" destId="{33D8CCF8-D60C-4D7B-B6F2-38D5A2C764A8}" srcOrd="0" destOrd="0" presId="urn:microsoft.com/office/officeart/2005/8/layout/hierarchy3"/>
-    <dgm:cxn modelId="{B8B66D35-400F-4A25-B0E6-81F52B0A5619}" type="presOf" srcId="{49EFB7F5-62DF-498D-BD2F-FCFA6A52770A}" destId="{723B9B5A-DDED-4A18-91FD-D2B863B2B9D2}" srcOrd="0" destOrd="3" presId="urn:microsoft.com/office/officeart/2005/8/layout/hierarchy3"/>
+    <dgm:cxn modelId="{12C92634-0F4B-40BF-9856-4758605283C3}" type="presOf" srcId="{8B797A31-F429-4C6F-826D-70F9A48EA190}" destId="{06C776E6-5E91-47BA-A505-8C4BB019E18D}" srcOrd="0" destOrd="0" presId="urn:microsoft.com/office/officeart/2005/8/layout/hierarchy3"/>
+    <dgm:cxn modelId="{B63F463B-D537-4106-B726-6162536B6C7E}" type="presOf" srcId="{429A8E1D-41CA-4269-80E5-5932D6C8C480}" destId="{BBB6D5B2-0E1A-43FD-AE26-C1637F8578C2}" srcOrd="0" destOrd="0" presId="urn:microsoft.com/office/officeart/2005/8/layout/hierarchy3"/>
+    <dgm:cxn modelId="{12DD2C3E-F135-44B2-A062-8C0627559432}" srcId="{862FEC19-6E6E-4E5F-ADFA-CEFF6AE4884C}" destId="{7A9A831D-CD01-4AC5-BFAB-E1325E1A375C}" srcOrd="0" destOrd="0" parTransId="{C6BD032F-B5AD-451A-8B35-0C9F261AB70C}" sibTransId="{FBD8368F-1449-4B4D-98CF-C5AA2D655C2F}"/>
     <dgm:cxn modelId="{1CC7EC3F-599B-4E5B-9FD6-6431FB2EC698}" srcId="{1F872B68-1953-44E9-ABBD-AA0F4149073B}" destId="{862FEC19-6E6E-4E5F-ADFA-CEFF6AE4884C}" srcOrd="1" destOrd="0" parTransId="{A925466B-E6D8-4BCB-BDE4-88308453A7E6}" sibTransId="{562B5DA6-A5D8-482B-91B9-5E4255E9565E}"/>
-    <dgm:cxn modelId="{5295A25B-98B2-4011-8E68-B1915757E829}" srcId="{463AB51D-12C1-4ADE-ABFE-AD7C1918CFDD}" destId="{AB0F0765-05E9-4B1C-A0D4-E6DFC3B7BC40}" srcOrd="3" destOrd="0" parTransId="{7C6F2C7B-1B8D-4564-B738-10EAF9F2799C}" sibTransId="{5663580C-8527-483B-8EBE-48CEC9DDBD60}"/>
     <dgm:cxn modelId="{C155915D-8F75-49D2-A389-C29A1E43E50D}" type="presOf" srcId="{DBF53B33-C12A-4610-8452-269CC9BE3733}" destId="{E5EF051C-60C4-466C-918A-9A8965F9275F}" srcOrd="0" destOrd="0" presId="urn:microsoft.com/office/officeart/2005/8/layout/hierarchy3"/>
-    <dgm:cxn modelId="{841CE25D-034E-4059-B70B-2147CEFA5BD7}" type="presOf" srcId="{52E1F3D5-85B7-4198-93E2-269D369A21DA}" destId="{7BD6ADC1-CA47-4FB4-86C1-12120231E138}" srcOrd="0" destOrd="0" presId="urn:microsoft.com/office/officeart/2005/8/layout/hierarchy3"/>
-    <dgm:cxn modelId="{E2DF3C60-6D98-4AC9-A84F-DD774E6745CE}" type="presOf" srcId="{FA3ADEBB-1187-452F-B728-FA6A4C3A8398}" destId="{7C8A1000-99FA-4197-AB9E-91187898F8C3}" srcOrd="0" destOrd="0" presId="urn:microsoft.com/office/officeart/2005/8/layout/hierarchy3"/>
-    <dgm:cxn modelId="{0E465D43-3609-4451-869D-A0A707F486CE}" srcId="{463AB51D-12C1-4ADE-ABFE-AD7C1918CFDD}" destId="{B618ABDB-6ACD-4218-9A58-8E5B14DEF71B}" srcOrd="1" destOrd="0" parTransId="{CEE82012-B781-4358-BE08-10871B43B973}" sibTransId="{E092E454-2A8C-4770-B36B-AEA81BBD57D9}"/>
-    <dgm:cxn modelId="{E702DA45-3B89-4A7A-8A14-3D0C1FF650E9}" srcId="{1D80A1C1-DB05-49C3-93C0-7399B5E39831}" destId="{10DBA9BF-510D-4D15-9473-09ED6CA5B8E1}" srcOrd="1" destOrd="0" parTransId="{941C5743-2C6A-462C-8830-0EBFFFF89E65}" sibTransId="{88C128A3-4F46-488D-89A1-420A3760254C}"/>
-    <dgm:cxn modelId="{E3EEDE4C-FB7B-4ADC-83E1-90B3E3A66A4C}" type="presOf" srcId="{F06AD897-EF3A-40F2-AB1C-E114D5EAA9BB}" destId="{4D9C5689-A3CC-4246-ACE4-2FCD625D2DBD}" srcOrd="0" destOrd="0" presId="urn:microsoft.com/office/officeart/2005/8/layout/hierarchy3"/>
-    <dgm:cxn modelId="{6440FE4C-FB6D-4756-8457-9DE49BD2494C}" type="presOf" srcId="{10DBA9BF-510D-4D15-9473-09ED6CA5B8E1}" destId="{723B9B5A-DDED-4A18-91FD-D2B863B2B9D2}" srcOrd="0" destOrd="2" presId="urn:microsoft.com/office/officeart/2005/8/layout/hierarchy3"/>
-    <dgm:cxn modelId="{84189F4F-26BF-4317-AAC2-D38DD5312C98}" type="presOf" srcId="{53BF934F-8B35-47F8-8AFA-652F12E3DFAB}" destId="{723B9B5A-DDED-4A18-91FD-D2B863B2B9D2}" srcOrd="0" destOrd="1" presId="urn:microsoft.com/office/officeart/2005/8/layout/hierarchy3"/>
-    <dgm:cxn modelId="{B0CAD052-20F6-4059-B9C6-4560D8972731}" srcId="{34B168C8-0FBB-42A7-9EA0-4CF734F7E1D4}" destId="{FA3ADEBB-1187-452F-B728-FA6A4C3A8398}" srcOrd="0" destOrd="0" parTransId="{B646B2BE-3B87-4955-B541-48079F648CD9}" sibTransId="{554F0EB7-EF51-4775-BF0B-23C9F0855FB5}"/>
-    <dgm:cxn modelId="{7453E752-03F8-4596-8CF6-291973F25743}" srcId="{1F872B68-1953-44E9-ABBD-AA0F4149073B}" destId="{463AB51D-12C1-4ADE-ABFE-AD7C1918CFDD}" srcOrd="3" destOrd="0" parTransId="{94063A75-D51F-40AC-B288-CD100666A5A2}" sibTransId="{A4211907-4D84-413F-9BC9-9803C141BE29}"/>
+    <dgm:cxn modelId="{E3A1BD5E-4443-47AB-AFEB-0D3F6B90C0EC}" type="presOf" srcId="{F0E8BBAC-C7B4-4EF2-AB73-2130052773CF}" destId="{7B6764B6-163B-468E-B793-3861BACFE459}" srcOrd="0" destOrd="0" presId="urn:microsoft.com/office/officeart/2005/8/layout/hierarchy3"/>
+    <dgm:cxn modelId="{3310FF41-4801-4A7B-9E32-CC1C420A110E}" type="presOf" srcId="{C29703F6-7E6E-413F-A92A-6FA284BD7664}" destId="{789EC290-DFFA-4E2A-B9FE-29B5A9A9B6BF}" srcOrd="0" destOrd="0" presId="urn:microsoft.com/office/officeart/2005/8/layout/hierarchy3"/>
+    <dgm:cxn modelId="{04A8BE44-FE0A-46AB-8AA8-1B05E6C4A4B8}" srcId="{429A8E1D-41CA-4269-80E5-5932D6C8C480}" destId="{FCF91796-6F65-489A-81F0-952565DA7898}" srcOrd="1" destOrd="0" parTransId="{19FDFF0D-C58A-4248-947E-B13438B630B7}" sibTransId="{219D3BC3-F5E1-47D1-8E9F-84D779F68B29}"/>
+    <dgm:cxn modelId="{E0A5FE64-322E-43C8-9DB2-45925F226BD2}" srcId="{429A8E1D-41CA-4269-80E5-5932D6C8C480}" destId="{5D89450D-D6C9-47DF-B3A7-21413984ACDA}" srcOrd="0" destOrd="0" parTransId="{C29703F6-7E6E-413F-A92A-6FA284BD7664}" sibTransId="{3AF286AB-A9E4-4235-8010-8A9CDCFD3ECB}"/>
+    <dgm:cxn modelId="{DB4E2B49-D631-4E94-9411-7366E73BF956}" type="presOf" srcId="{5E94C752-50AB-4C5B-BB61-447CBA78D74A}" destId="{2D3CA462-1BBD-487F-A208-8A0A0778879E}" srcOrd="0" destOrd="0" presId="urn:microsoft.com/office/officeart/2005/8/layout/hierarchy3"/>
+    <dgm:cxn modelId="{0743B069-87F2-4C53-A22E-DBEF4680B715}" type="presOf" srcId="{C6BD032F-B5AD-451A-8B35-0C9F261AB70C}" destId="{91B35279-7648-4375-B713-9DF3BF94E8D9}" srcOrd="0" destOrd="0" presId="urn:microsoft.com/office/officeart/2005/8/layout/hierarchy3"/>
+    <dgm:cxn modelId="{CCEA5F6B-6E55-45F4-9B59-22B5376BB86B}" srcId="{429A8E1D-41CA-4269-80E5-5932D6C8C480}" destId="{8B797A31-F429-4C6F-826D-70F9A48EA190}" srcOrd="3" destOrd="0" parTransId="{BC357F20-B14E-4600-AF24-55F4B524D4F3}" sibTransId="{11949B2B-4D1C-4DD2-A4EE-B0133627DE93}"/>
+    <dgm:cxn modelId="{FED7D350-A02A-401C-A006-5D53CDAC32C6}" type="presOf" srcId="{429A8E1D-41CA-4269-80E5-5932D6C8C480}" destId="{4D309180-825C-4CF7-ABEF-4FE0C502A521}" srcOrd="1" destOrd="0" presId="urn:microsoft.com/office/officeart/2005/8/layout/hierarchy3"/>
+    <dgm:cxn modelId="{7861C75A-80EA-474B-9611-5D8617BA1239}" srcId="{1F872B68-1953-44E9-ABBD-AA0F4149073B}" destId="{429A8E1D-41CA-4269-80E5-5932D6C8C480}" srcOrd="2" destOrd="0" parTransId="{7D8AA24D-23AB-4C97-84EF-9153257454EF}" sibTransId="{0BF7604B-F0CE-48A6-87DA-860E4FDC491F}"/>
     <dgm:cxn modelId="{A8270E81-0402-4751-BBB3-DE19F21C9570}" type="presOf" srcId="{8ACDD044-E61A-48FD-A01B-6DE1D8EBF2C8}" destId="{C36929F4-EA53-40DE-8D52-2336DBF11DCC}" srcOrd="1" destOrd="0" presId="urn:microsoft.com/office/officeart/2005/8/layout/hierarchy3"/>
-    <dgm:cxn modelId="{E9196881-D6A5-4C02-AA2C-7D46AC470D3C}" type="presOf" srcId="{9E18935A-23A6-4A2D-8799-95E69C2B6A18}" destId="{077DF96F-93FD-49D3-89E8-C0E306317D6B}" srcOrd="0" destOrd="0" presId="urn:microsoft.com/office/officeart/2005/8/layout/hierarchy3"/>
-    <dgm:cxn modelId="{B7D51084-1A3B-4539-843F-B8CA305D2E64}" type="presOf" srcId="{92BBC6A6-C9DD-4417-A492-A88EF48D373C}" destId="{1230C02A-614B-47F6-94FE-D1470FC2A903}" srcOrd="0" destOrd="0" presId="urn:microsoft.com/office/officeart/2005/8/layout/hierarchy3"/>
-    <dgm:cxn modelId="{7E024084-99E8-4DB7-BCCA-D0501750ADBB}" type="presOf" srcId="{34B168C8-0FBB-42A7-9EA0-4CF734F7E1D4}" destId="{DF3EF058-5790-4CD8-8784-F45B65C36357}" srcOrd="1" destOrd="0" presId="urn:microsoft.com/office/officeart/2005/8/layout/hierarchy3"/>
-    <dgm:cxn modelId="{30276984-7042-49B9-BC54-26CA24EEFA39}" type="presOf" srcId="{3EC6D9D0-A7A2-4F7F-A6A2-BFEBB558F4EF}" destId="{5DB72798-CBEB-43EB-AEE2-B122F1A06F83}" srcOrd="0" destOrd="0" presId="urn:microsoft.com/office/officeart/2005/8/layout/hierarchy3"/>
-    <dgm:cxn modelId="{D6D8578B-FB93-4A74-8616-26C3197C9B62}" type="presOf" srcId="{CEE82012-B781-4358-BE08-10871B43B973}" destId="{AF665868-D1B1-4E79-BB44-3B530F5AB03B}" srcOrd="0" destOrd="0" presId="urn:microsoft.com/office/officeart/2005/8/layout/hierarchy3"/>
-    <dgm:cxn modelId="{3C0E4895-2CA9-4928-93BD-B393845CDC92}" type="presOf" srcId="{B646B2BE-3B87-4955-B541-48079F648CD9}" destId="{382E9C81-3BAB-4543-B0BD-11FE9A067969}" srcOrd="0" destOrd="0" presId="urn:microsoft.com/office/officeart/2005/8/layout/hierarchy3"/>
-    <dgm:cxn modelId="{E9C9629B-F9D5-4E38-80FD-131260879F4F}" srcId="{862FEC19-6E6E-4E5F-ADFA-CEFF6AE4884C}" destId="{3EC6D9D0-A7A2-4F7F-A6A2-BFEBB558F4EF}" srcOrd="0" destOrd="0" parTransId="{BB67CC9B-1315-4E95-8A33-03D5B47384DA}" sibTransId="{208740FA-7021-4E3A-A97D-9D0343319D10}"/>
+    <dgm:cxn modelId="{C2402997-641F-4F34-BAD1-0339B45783D8}" srcId="{862FEC19-6E6E-4E5F-ADFA-CEFF6AE4884C}" destId="{5E94C752-50AB-4C5B-BB61-447CBA78D74A}" srcOrd="1" destOrd="0" parTransId="{42B88018-AD62-401C-B96F-E0900F681684}" sibTransId="{998E5E67-20AE-4DFA-97BA-559A0FF99423}"/>
+    <dgm:cxn modelId="{CE55A79A-371D-40A2-AA5B-2609C9B425CB}" srcId="{8ACDD044-E61A-48FD-A01B-6DE1D8EBF2C8}" destId="{BF69016F-4EAC-4DCA-868D-93B17B5D0CFA}" srcOrd="1" destOrd="0" parTransId="{9CC8C846-47B5-4224-A5E6-CB2105FD6917}" sibTransId="{6D32FA40-8CE8-4CA2-B106-66AD1F5354E9}"/>
     <dgm:cxn modelId="{106B389E-8CF7-4D35-82E4-DFA31EA1C3B8}" type="presOf" srcId="{862FEC19-6E6E-4E5F-ADFA-CEFF6AE4884C}" destId="{EF30944E-B1FC-431A-9CC9-0BE1F17CA7AA}" srcOrd="0" destOrd="0" presId="urn:microsoft.com/office/officeart/2005/8/layout/hierarchy3"/>
-    <dgm:cxn modelId="{704FACA4-C420-4FA2-822F-7B63A31991E0}" type="presOf" srcId="{7C6F2C7B-1B8D-4564-B738-10EAF9F2799C}" destId="{0C4B42A2-C79A-462B-8997-0C54F8785037}" srcOrd="0" destOrd="0" presId="urn:microsoft.com/office/officeart/2005/8/layout/hierarchy3"/>
+    <dgm:cxn modelId="{8A3B6CA4-A827-4580-B31D-0A356206CDA9}" type="presOf" srcId="{5D89450D-D6C9-47DF-B3A7-21413984ACDA}" destId="{14A74095-9703-4207-92DB-85F3EB6823AD}" srcOrd="0" destOrd="0" presId="urn:microsoft.com/office/officeart/2005/8/layout/hierarchy3"/>
     <dgm:cxn modelId="{394938AE-6B4F-4F19-8CBD-051875ABE065}" type="presOf" srcId="{862FEC19-6E6E-4E5F-ADFA-CEFF6AE4884C}" destId="{B0AA77AA-3AC9-40D1-88EB-6E387763E09F}" srcOrd="1" destOrd="0" presId="urn:microsoft.com/office/officeart/2005/8/layout/hierarchy3"/>
+    <dgm:cxn modelId="{6A883FB0-6D28-40EF-BC6D-7403094713A7}" type="presOf" srcId="{FCF91796-6F65-489A-81F0-952565DA7898}" destId="{6E625772-9F1A-49D2-9193-C4C7F16E0899}" srcOrd="0" destOrd="0" presId="urn:microsoft.com/office/officeart/2005/8/layout/hierarchy3"/>
     <dgm:cxn modelId="{CF15F5B1-A3B0-4B2B-805C-EE7456F4B640}" type="presOf" srcId="{8ACDD044-E61A-48FD-A01B-6DE1D8EBF2C8}" destId="{1605BDF2-69AD-41A7-84BE-5A9A691BE61A}" srcOrd="0" destOrd="0" presId="urn:microsoft.com/office/officeart/2005/8/layout/hierarchy3"/>
-    <dgm:cxn modelId="{484F7EBB-A5C6-4C04-B22A-C46DB0DD6917}" type="presOf" srcId="{B618ABDB-6ACD-4218-9A58-8E5B14DEF71B}" destId="{C67D23C7-4635-4A49-93C0-F8DDA1E06049}" srcOrd="0" destOrd="0" presId="urn:microsoft.com/office/officeart/2005/8/layout/hierarchy3"/>
-    <dgm:cxn modelId="{EB5300BC-BC1E-4D6C-A68F-DB5516275618}" type="presOf" srcId="{8E6CA364-0675-428F-AC08-FC280CAF809B}" destId="{3FAB9D14-74F6-4949-86FE-DDFA337CDD9B}" srcOrd="0" destOrd="0" presId="urn:microsoft.com/office/officeart/2005/8/layout/hierarchy3"/>
-    <dgm:cxn modelId="{2528DFC2-A3B9-4CB1-B2BA-634C940458BE}" srcId="{862FEC19-6E6E-4E5F-ADFA-CEFF6AE4884C}" destId="{9E18935A-23A6-4A2D-8799-95E69C2B6A18}" srcOrd="1" destOrd="0" parTransId="{92BBC6A6-C9DD-4417-A492-A88EF48D373C}" sibTransId="{D6F69830-B588-44F8-9402-D6D182B01A54}"/>
-    <dgm:cxn modelId="{8C2678C8-7A2E-4204-B8BA-D5047F4F421D}" srcId="{1D80A1C1-DB05-49C3-93C0-7399B5E39831}" destId="{49EFB7F5-62DF-498D-BD2F-FCFA6A52770A}" srcOrd="2" destOrd="0" parTransId="{AE937E9F-C48C-4189-A862-BAE29476C64F}" sibTransId="{32FA5992-78E9-499F-96B2-6A31E1D507C8}"/>
-    <dgm:cxn modelId="{BD7B5FD3-1961-4C4D-9B8C-8CCCB62FE262}" type="presOf" srcId="{AB0F0765-05E9-4B1C-A0D4-E6DFC3B7BC40}" destId="{9795C372-B1B6-485C-8B73-D30022696272}" srcOrd="0" destOrd="0" presId="urn:microsoft.com/office/officeart/2005/8/layout/hierarchy3"/>
-    <dgm:cxn modelId="{22EABBD7-BE7E-4D1F-8B20-0E333290B8B8}" srcId="{1F872B68-1953-44E9-ABBD-AA0F4149073B}" destId="{34B168C8-0FBB-42A7-9EA0-4CF734F7E1D4}" srcOrd="2" destOrd="0" parTransId="{1B539C4D-9262-486E-8723-711B783718B7}" sibTransId="{970D48C9-88E8-4BEA-BF79-B3A82DC73771}"/>
-    <dgm:cxn modelId="{2C334FD8-03E3-40CF-BFD7-46B58535148C}" srcId="{463AB51D-12C1-4ADE-ABFE-AD7C1918CFDD}" destId="{F2FF6C68-D24C-43F0-9D44-692D6BDF2EFF}" srcOrd="0" destOrd="0" parTransId="{8E6CA364-0675-428F-AC08-FC280CAF809B}" sibTransId="{178F9D68-9C6A-411D-8106-37D850A7F191}"/>
-    <dgm:cxn modelId="{D01DE8E1-392E-4350-86E8-2AFBF9181DD8}" type="presOf" srcId="{34B168C8-0FBB-42A7-9EA0-4CF734F7E1D4}" destId="{26994A90-1875-4CEC-8F49-DCE6ED2AEC26}" srcOrd="0" destOrd="0" presId="urn:microsoft.com/office/officeart/2005/8/layout/hierarchy3"/>
+    <dgm:cxn modelId="{4E9785DE-AB0F-474A-BAD2-72B7B6B670C1}" type="presOf" srcId="{9CC8C846-47B5-4224-A5E6-CB2105FD6917}" destId="{7520E9DE-6600-4317-BFF9-7515AB7BFFA5}" srcOrd="0" destOrd="0" presId="urn:microsoft.com/office/officeart/2005/8/layout/hierarchy3"/>
     <dgm:cxn modelId="{8555BCE2-59A8-4391-9C26-38C54FEB0BB9}" srcId="{1F872B68-1953-44E9-ABBD-AA0F4149073B}" destId="{8ACDD044-E61A-48FD-A01B-6DE1D8EBF2C8}" srcOrd="0" destOrd="0" parTransId="{76B147C7-AA8E-481E-83F6-5CC18CECB44C}" sibTransId="{725D702C-DB3E-4884-A5AE-C955E5826567}"/>
-    <dgm:cxn modelId="{BB4186E5-FE87-4517-8852-B5EB93BC14B4}" type="presOf" srcId="{1560965D-3578-4BCE-BEC3-B9CE512FAFB5}" destId="{65FC3DF6-B5F9-47DD-9ACB-BDA16815EFF3}" srcOrd="0" destOrd="0" presId="urn:microsoft.com/office/officeart/2005/8/layout/hierarchy3"/>
-    <dgm:cxn modelId="{E1A456F2-17D3-4015-8522-31A4EA5C41D0}" type="presOf" srcId="{83A1D220-073C-4F3C-AEE5-296175FD9B94}" destId="{5C64FD53-80A5-429C-A13E-0684D2C7E4F4}" srcOrd="0" destOrd="0" presId="urn:microsoft.com/office/officeart/2005/8/layout/hierarchy3"/>
-    <dgm:cxn modelId="{578B98FB-3746-4908-AC82-584BFA65D5BD}" srcId="{8ACDD044-E61A-48FD-A01B-6DE1D8EBF2C8}" destId="{83A1D220-073C-4F3C-AEE5-296175FD9B94}" srcOrd="1" destOrd="0" parTransId="{1560965D-3578-4BCE-BEC3-B9CE512FAFB5}" sibTransId="{C3833DBA-D672-449E-84A8-E289CB386A5B}"/>
+    <dgm:cxn modelId="{056161FB-5326-45ED-9E10-D183EAE8E9BA}" type="presOf" srcId="{2200F8CE-C5FE-48D5-B30F-E90E2197E68D}" destId="{B468F478-4533-4A40-9612-9EF806B0E159}" srcOrd="0" destOrd="0" presId="urn:microsoft.com/office/officeart/2005/8/layout/hierarchy3"/>
     <dgm:cxn modelId="{92E59A23-D22E-4617-8156-721371D7DE17}" type="presParOf" srcId="{43CC1663-DE1F-42F8-9EFB-1C3916CDAFDA}" destId="{238A1CDF-4BEF-4B9F-B243-0375EBBF1455}" srcOrd="0" destOrd="0" presId="urn:microsoft.com/office/officeart/2005/8/layout/hierarchy3"/>
     <dgm:cxn modelId="{9F2589EB-E568-4E7C-9998-10C84D46C6F4}" type="presParOf" srcId="{238A1CDF-4BEF-4B9F-B243-0375EBBF1455}" destId="{ADA327C4-EBC8-4F2A-AD70-016928855B4C}" srcOrd="0" destOrd="0" presId="urn:microsoft.com/office/officeart/2005/8/layout/hierarchy3"/>
     <dgm:cxn modelId="{36EFEC3F-5651-467E-9B31-1EFD51445267}" type="presParOf" srcId="{ADA327C4-EBC8-4F2A-AD70-016928855B4C}" destId="{1605BDF2-69AD-41A7-84BE-5A9A691BE61A}" srcOrd="0" destOrd="0" presId="urn:microsoft.com/office/officeart/2005/8/layout/hierarchy3"/>
@@ -4328,37 +4110,30 @@
     <dgm:cxn modelId="{40D8A1E0-08BD-4AD7-BA0C-A176BAA265BD}" type="presParOf" srcId="{238A1CDF-4BEF-4B9F-B243-0375EBBF1455}" destId="{210FF07E-EEAF-4B4E-BFCB-A7BDDB2D6A95}" srcOrd="1" destOrd="0" presId="urn:microsoft.com/office/officeart/2005/8/layout/hierarchy3"/>
     <dgm:cxn modelId="{98054B5C-0479-40E9-80C5-81375A4AF5FC}" type="presParOf" srcId="{210FF07E-EEAF-4B4E-BFCB-A7BDDB2D6A95}" destId="{E5EF051C-60C4-466C-918A-9A8965F9275F}" srcOrd="0" destOrd="0" presId="urn:microsoft.com/office/officeart/2005/8/layout/hierarchy3"/>
     <dgm:cxn modelId="{A750F881-0921-49A5-B175-91EFE348ECE2}" type="presParOf" srcId="{210FF07E-EEAF-4B4E-BFCB-A7BDDB2D6A95}" destId="{723B9B5A-DDED-4A18-91FD-D2B863B2B9D2}" srcOrd="1" destOrd="0" presId="urn:microsoft.com/office/officeart/2005/8/layout/hierarchy3"/>
-    <dgm:cxn modelId="{2CD03D4A-E885-4969-8756-38D1B00F6604}" type="presParOf" srcId="{210FF07E-EEAF-4B4E-BFCB-A7BDDB2D6A95}" destId="{65FC3DF6-B5F9-47DD-9ACB-BDA16815EFF3}" srcOrd="2" destOrd="0" presId="urn:microsoft.com/office/officeart/2005/8/layout/hierarchy3"/>
-    <dgm:cxn modelId="{01C7673C-68B5-4F10-A777-A1E6F3BFF130}" type="presParOf" srcId="{210FF07E-EEAF-4B4E-BFCB-A7BDDB2D6A95}" destId="{5C64FD53-80A5-429C-A13E-0684D2C7E4F4}" srcOrd="3" destOrd="0" presId="urn:microsoft.com/office/officeart/2005/8/layout/hierarchy3"/>
+    <dgm:cxn modelId="{DCE3312B-43A5-449E-8365-A64E700C6C92}" type="presParOf" srcId="{210FF07E-EEAF-4B4E-BFCB-A7BDDB2D6A95}" destId="{7520E9DE-6600-4317-BFF9-7515AB7BFFA5}" srcOrd="2" destOrd="0" presId="urn:microsoft.com/office/officeart/2005/8/layout/hierarchy3"/>
+    <dgm:cxn modelId="{55121AD8-298A-464C-ABB4-18279CC466BD}" type="presParOf" srcId="{210FF07E-EEAF-4B4E-BFCB-A7BDDB2D6A95}" destId="{4B7DDA1B-E77F-4F2A-BD5A-AC67C257877D}" srcOrd="3" destOrd="0" presId="urn:microsoft.com/office/officeart/2005/8/layout/hierarchy3"/>
     <dgm:cxn modelId="{DAEE1C14-1292-4B32-80BD-0F87FCB2A576}" type="presParOf" srcId="{43CC1663-DE1F-42F8-9EFB-1C3916CDAFDA}" destId="{4D2A602D-009C-4281-976B-B6A2B600E9E1}" srcOrd="1" destOrd="0" presId="urn:microsoft.com/office/officeart/2005/8/layout/hierarchy3"/>
     <dgm:cxn modelId="{22904F94-BCA8-4DE9-934E-D13294DBB06B}" type="presParOf" srcId="{4D2A602D-009C-4281-976B-B6A2B600E9E1}" destId="{52603050-6A78-494A-BB84-14F7930B0884}" srcOrd="0" destOrd="0" presId="urn:microsoft.com/office/officeart/2005/8/layout/hierarchy3"/>
     <dgm:cxn modelId="{6BE63D51-B455-451B-BC65-E4250000939E}" type="presParOf" srcId="{52603050-6A78-494A-BB84-14F7930B0884}" destId="{EF30944E-B1FC-431A-9CC9-0BE1F17CA7AA}" srcOrd="0" destOrd="0" presId="urn:microsoft.com/office/officeart/2005/8/layout/hierarchy3"/>
     <dgm:cxn modelId="{243AC883-3C49-47E3-8278-F3E52B067C87}" type="presParOf" srcId="{52603050-6A78-494A-BB84-14F7930B0884}" destId="{B0AA77AA-3AC9-40D1-88EB-6E387763E09F}" srcOrd="1" destOrd="0" presId="urn:microsoft.com/office/officeart/2005/8/layout/hierarchy3"/>
     <dgm:cxn modelId="{AE75311B-1C4D-4B7B-A1B7-6BBC7B049056}" type="presParOf" srcId="{4D2A602D-009C-4281-976B-B6A2B600E9E1}" destId="{74316339-DCE9-45C1-B69F-552E899B36EE}" srcOrd="1" destOrd="0" presId="urn:microsoft.com/office/officeart/2005/8/layout/hierarchy3"/>
-    <dgm:cxn modelId="{621A6DFD-8EBC-4E87-AE6A-E5A8220C9A10}" type="presParOf" srcId="{74316339-DCE9-45C1-B69F-552E899B36EE}" destId="{33D8CCF8-D60C-4D7B-B6F2-38D5A2C764A8}" srcOrd="0" destOrd="0" presId="urn:microsoft.com/office/officeart/2005/8/layout/hierarchy3"/>
-    <dgm:cxn modelId="{B6FA0B88-85AD-44FB-91D7-3F66745562CE}" type="presParOf" srcId="{74316339-DCE9-45C1-B69F-552E899B36EE}" destId="{5DB72798-CBEB-43EB-AEE2-B122F1A06F83}" srcOrd="1" destOrd="0" presId="urn:microsoft.com/office/officeart/2005/8/layout/hierarchy3"/>
-    <dgm:cxn modelId="{AE904FDD-5C54-43B5-935E-98689AD2381E}" type="presParOf" srcId="{74316339-DCE9-45C1-B69F-552E899B36EE}" destId="{1230C02A-614B-47F6-94FE-D1470FC2A903}" srcOrd="2" destOrd="0" presId="urn:microsoft.com/office/officeart/2005/8/layout/hierarchy3"/>
-    <dgm:cxn modelId="{2CF9EB35-9F33-4055-93F1-BAE57924EFD4}" type="presParOf" srcId="{74316339-DCE9-45C1-B69F-552E899B36EE}" destId="{077DF96F-93FD-49D3-89E8-C0E306317D6B}" srcOrd="3" destOrd="0" presId="urn:microsoft.com/office/officeart/2005/8/layout/hierarchy3"/>
-    <dgm:cxn modelId="{E504875B-CCCD-46B4-A823-596537D8A0F4}" type="presParOf" srcId="{43CC1663-DE1F-42F8-9EFB-1C3916CDAFDA}" destId="{A5EEBD4C-3554-4D4D-9729-A3B8F8A5A3E8}" srcOrd="2" destOrd="0" presId="urn:microsoft.com/office/officeart/2005/8/layout/hierarchy3"/>
-    <dgm:cxn modelId="{56FAA661-3499-4E29-B6D3-255DD09CD812}" type="presParOf" srcId="{A5EEBD4C-3554-4D4D-9729-A3B8F8A5A3E8}" destId="{57E44C3B-8EC2-469D-BC19-107AC761B771}" srcOrd="0" destOrd="0" presId="urn:microsoft.com/office/officeart/2005/8/layout/hierarchy3"/>
-    <dgm:cxn modelId="{CC597325-D026-4E1F-8D25-7F67A1A4A46A}" type="presParOf" srcId="{57E44C3B-8EC2-469D-BC19-107AC761B771}" destId="{26994A90-1875-4CEC-8F49-DCE6ED2AEC26}" srcOrd="0" destOrd="0" presId="urn:microsoft.com/office/officeart/2005/8/layout/hierarchy3"/>
-    <dgm:cxn modelId="{35F451CD-444F-453A-8337-13BFD221BB2C}" type="presParOf" srcId="{57E44C3B-8EC2-469D-BC19-107AC761B771}" destId="{DF3EF058-5790-4CD8-8784-F45B65C36357}" srcOrd="1" destOrd="0" presId="urn:microsoft.com/office/officeart/2005/8/layout/hierarchy3"/>
-    <dgm:cxn modelId="{CBE84841-523D-4CAE-901F-8DB0B89D1699}" type="presParOf" srcId="{A5EEBD4C-3554-4D4D-9729-A3B8F8A5A3E8}" destId="{390C23DF-73D1-450C-AB7A-8D0E9D09CA85}" srcOrd="1" destOrd="0" presId="urn:microsoft.com/office/officeart/2005/8/layout/hierarchy3"/>
-    <dgm:cxn modelId="{6C354997-DBB0-4E14-B9F1-396B6F5385CC}" type="presParOf" srcId="{390C23DF-73D1-450C-AB7A-8D0E9D09CA85}" destId="{382E9C81-3BAB-4543-B0BD-11FE9A067969}" srcOrd="0" destOrd="0" presId="urn:microsoft.com/office/officeart/2005/8/layout/hierarchy3"/>
-    <dgm:cxn modelId="{12B46270-BCD4-454B-B8F7-65F03AB79883}" type="presParOf" srcId="{390C23DF-73D1-450C-AB7A-8D0E9D09CA85}" destId="{7C8A1000-99FA-4197-AB9E-91187898F8C3}" srcOrd="1" destOrd="0" presId="urn:microsoft.com/office/officeart/2005/8/layout/hierarchy3"/>
-    <dgm:cxn modelId="{1EC9C835-F0F0-44B5-8042-0BFCFE1576AC}" type="presParOf" srcId="{43CC1663-DE1F-42F8-9EFB-1C3916CDAFDA}" destId="{82334795-1A0D-4C55-84EF-77CEAEAE4344}" srcOrd="3" destOrd="0" presId="urn:microsoft.com/office/officeart/2005/8/layout/hierarchy3"/>
-    <dgm:cxn modelId="{CB7E77B2-C033-486B-91FB-CFC2DE451381}" type="presParOf" srcId="{82334795-1A0D-4C55-84EF-77CEAEAE4344}" destId="{071E9965-0440-4BE8-B2FF-0DDD799C8F54}" srcOrd="0" destOrd="0" presId="urn:microsoft.com/office/officeart/2005/8/layout/hierarchy3"/>
-    <dgm:cxn modelId="{15A564C6-D519-434E-B0BD-6160B3D47842}" type="presParOf" srcId="{071E9965-0440-4BE8-B2FF-0DDD799C8F54}" destId="{F7723B08-FDF8-4267-8DC3-E233B06F5DC0}" srcOrd="0" destOrd="0" presId="urn:microsoft.com/office/officeart/2005/8/layout/hierarchy3"/>
-    <dgm:cxn modelId="{50CB53FF-B1F4-4DAC-8D2D-62260BE57717}" type="presParOf" srcId="{071E9965-0440-4BE8-B2FF-0DDD799C8F54}" destId="{1390558A-0D0B-4A4B-A370-6D486DA6FAA7}" srcOrd="1" destOrd="0" presId="urn:microsoft.com/office/officeart/2005/8/layout/hierarchy3"/>
-    <dgm:cxn modelId="{DC861681-615A-4600-B85F-E78C6B020000}" type="presParOf" srcId="{82334795-1A0D-4C55-84EF-77CEAEAE4344}" destId="{769C2D46-907E-442D-82EA-9C3686CB14F3}" srcOrd="1" destOrd="0" presId="urn:microsoft.com/office/officeart/2005/8/layout/hierarchy3"/>
-    <dgm:cxn modelId="{05A877D7-7282-47C0-89CE-E97D42F63440}" type="presParOf" srcId="{769C2D46-907E-442D-82EA-9C3686CB14F3}" destId="{3FAB9D14-74F6-4949-86FE-DDFA337CDD9B}" srcOrd="0" destOrd="0" presId="urn:microsoft.com/office/officeart/2005/8/layout/hierarchy3"/>
-    <dgm:cxn modelId="{028E964A-F57F-48CB-8A4E-FCF41621A581}" type="presParOf" srcId="{769C2D46-907E-442D-82EA-9C3686CB14F3}" destId="{FD5B5B45-8D4F-4FC8-98BD-94634AE50740}" srcOrd="1" destOrd="0" presId="urn:microsoft.com/office/officeart/2005/8/layout/hierarchy3"/>
-    <dgm:cxn modelId="{0EEF7D33-04A9-4135-9437-AAE7453A8F3F}" type="presParOf" srcId="{769C2D46-907E-442D-82EA-9C3686CB14F3}" destId="{AF665868-D1B1-4E79-BB44-3B530F5AB03B}" srcOrd="2" destOrd="0" presId="urn:microsoft.com/office/officeart/2005/8/layout/hierarchy3"/>
-    <dgm:cxn modelId="{5857568D-32D0-43B0-877F-0D2DF9970BE0}" type="presParOf" srcId="{769C2D46-907E-442D-82EA-9C3686CB14F3}" destId="{C67D23C7-4635-4A49-93C0-F8DDA1E06049}" srcOrd="3" destOrd="0" presId="urn:microsoft.com/office/officeart/2005/8/layout/hierarchy3"/>
-    <dgm:cxn modelId="{B21A616F-D300-49C0-B1AE-D8BE7E223FDB}" type="presParOf" srcId="{769C2D46-907E-442D-82EA-9C3686CB14F3}" destId="{7BD6ADC1-CA47-4FB4-86C1-12120231E138}" srcOrd="4" destOrd="0" presId="urn:microsoft.com/office/officeart/2005/8/layout/hierarchy3"/>
-    <dgm:cxn modelId="{6D1138A8-6575-4576-8696-52BE85D3981D}" type="presParOf" srcId="{769C2D46-907E-442D-82EA-9C3686CB14F3}" destId="{4D9C5689-A3CC-4246-ACE4-2FCD625D2DBD}" srcOrd="5" destOrd="0" presId="urn:microsoft.com/office/officeart/2005/8/layout/hierarchy3"/>
-    <dgm:cxn modelId="{EC1CC943-1606-4F25-AA16-6BBB896C1881}" type="presParOf" srcId="{769C2D46-907E-442D-82EA-9C3686CB14F3}" destId="{0C4B42A2-C79A-462B-8997-0C54F8785037}" srcOrd="6" destOrd="0" presId="urn:microsoft.com/office/officeart/2005/8/layout/hierarchy3"/>
-    <dgm:cxn modelId="{6639B4EA-4260-45A6-9DC4-64F1476FAC76}" type="presParOf" srcId="{769C2D46-907E-442D-82EA-9C3686CB14F3}" destId="{9795C372-B1B6-485C-8B73-D30022696272}" srcOrd="7" destOrd="0" presId="urn:microsoft.com/office/officeart/2005/8/layout/hierarchy3"/>
+    <dgm:cxn modelId="{A10FF228-9F13-42E5-9154-7420328946E7}" type="presParOf" srcId="{74316339-DCE9-45C1-B69F-552E899B36EE}" destId="{91B35279-7648-4375-B713-9DF3BF94E8D9}" srcOrd="0" destOrd="0" presId="urn:microsoft.com/office/officeart/2005/8/layout/hierarchy3"/>
+    <dgm:cxn modelId="{23951FF1-C3F9-49C8-8492-FD4D30EF33AF}" type="presParOf" srcId="{74316339-DCE9-45C1-B69F-552E899B36EE}" destId="{A28C8685-A8C1-44F6-9DBC-C4D88A000FD6}" srcOrd="1" destOrd="0" presId="urn:microsoft.com/office/officeart/2005/8/layout/hierarchy3"/>
+    <dgm:cxn modelId="{135A48FA-229D-4793-9EC1-71A3F0619E82}" type="presParOf" srcId="{74316339-DCE9-45C1-B69F-552E899B36EE}" destId="{2A33608E-8BBB-4FFC-9D2E-D7202A9CEC62}" srcOrd="2" destOrd="0" presId="urn:microsoft.com/office/officeart/2005/8/layout/hierarchy3"/>
+    <dgm:cxn modelId="{8DE24588-FCAF-4B08-927B-8C88EE6EC1EC}" type="presParOf" srcId="{74316339-DCE9-45C1-B69F-552E899B36EE}" destId="{2D3CA462-1BBD-487F-A208-8A0A0778879E}" srcOrd="3" destOrd="0" presId="urn:microsoft.com/office/officeart/2005/8/layout/hierarchy3"/>
+    <dgm:cxn modelId="{BE860060-7FA9-4A88-9B62-DFBF97398FCD}" type="presParOf" srcId="{43CC1663-DE1F-42F8-9EFB-1C3916CDAFDA}" destId="{75FCB3B9-7508-4C09-8531-81E34882314F}" srcOrd="2" destOrd="0" presId="urn:microsoft.com/office/officeart/2005/8/layout/hierarchy3"/>
+    <dgm:cxn modelId="{14DD41AE-ACA4-42B6-8830-D0D0ACB9FD88}" type="presParOf" srcId="{75FCB3B9-7508-4C09-8531-81E34882314F}" destId="{461E6D55-C100-4BDF-AE30-9DF2B07C59EA}" srcOrd="0" destOrd="0" presId="urn:microsoft.com/office/officeart/2005/8/layout/hierarchy3"/>
+    <dgm:cxn modelId="{D85B16E8-4C7C-4940-9F59-B63019368499}" type="presParOf" srcId="{461E6D55-C100-4BDF-AE30-9DF2B07C59EA}" destId="{BBB6D5B2-0E1A-43FD-AE26-C1637F8578C2}" srcOrd="0" destOrd="0" presId="urn:microsoft.com/office/officeart/2005/8/layout/hierarchy3"/>
+    <dgm:cxn modelId="{6E6ABA18-FBD2-402B-8742-2418F224E611}" type="presParOf" srcId="{461E6D55-C100-4BDF-AE30-9DF2B07C59EA}" destId="{4D309180-825C-4CF7-ABEF-4FE0C502A521}" srcOrd="1" destOrd="0" presId="urn:microsoft.com/office/officeart/2005/8/layout/hierarchy3"/>
+    <dgm:cxn modelId="{B5C3FCC8-8700-459F-9643-D49D1D73C3DD}" type="presParOf" srcId="{75FCB3B9-7508-4C09-8531-81E34882314F}" destId="{202B2392-9D1B-429A-9E3F-256487846A79}" srcOrd="1" destOrd="0" presId="urn:microsoft.com/office/officeart/2005/8/layout/hierarchy3"/>
+    <dgm:cxn modelId="{EC7C2BCE-1CBD-4552-9B79-F157A34FBA06}" type="presParOf" srcId="{202B2392-9D1B-429A-9E3F-256487846A79}" destId="{789EC290-DFFA-4E2A-B9FE-29B5A9A9B6BF}" srcOrd="0" destOrd="0" presId="urn:microsoft.com/office/officeart/2005/8/layout/hierarchy3"/>
+    <dgm:cxn modelId="{AD7647D5-80F2-4FC3-B5CC-B04637CB070F}" type="presParOf" srcId="{202B2392-9D1B-429A-9E3F-256487846A79}" destId="{14A74095-9703-4207-92DB-85F3EB6823AD}" srcOrd="1" destOrd="0" presId="urn:microsoft.com/office/officeart/2005/8/layout/hierarchy3"/>
+    <dgm:cxn modelId="{65DBD0B2-41BE-42D5-B04E-EB73C539A80C}" type="presParOf" srcId="{202B2392-9D1B-429A-9E3F-256487846A79}" destId="{02E9A38B-264A-4A28-BE04-09608DB043E5}" srcOrd="2" destOrd="0" presId="urn:microsoft.com/office/officeart/2005/8/layout/hierarchy3"/>
+    <dgm:cxn modelId="{BFE57912-63CA-4253-82D7-85296ED5B02E}" type="presParOf" srcId="{202B2392-9D1B-429A-9E3F-256487846A79}" destId="{6E625772-9F1A-49D2-9193-C4C7F16E0899}" srcOrd="3" destOrd="0" presId="urn:microsoft.com/office/officeart/2005/8/layout/hierarchy3"/>
+    <dgm:cxn modelId="{AB150615-FC4E-42B2-8E8E-B5F1B0665FED}" type="presParOf" srcId="{202B2392-9D1B-429A-9E3F-256487846A79}" destId="{7B6764B6-163B-468E-B793-3861BACFE459}" srcOrd="4" destOrd="0" presId="urn:microsoft.com/office/officeart/2005/8/layout/hierarchy3"/>
+    <dgm:cxn modelId="{203B3111-6BC7-4334-BEE1-C354EFBA5538}" type="presParOf" srcId="{202B2392-9D1B-429A-9E3F-256487846A79}" destId="{B468F478-4533-4A40-9612-9EF806B0E159}" srcOrd="5" destOrd="0" presId="urn:microsoft.com/office/officeart/2005/8/layout/hierarchy3"/>
+    <dgm:cxn modelId="{FB09A7C6-6D9B-48F4-AA11-DDCF14F70AC0}" type="presParOf" srcId="{202B2392-9D1B-429A-9E3F-256487846A79}" destId="{02C31BA6-6F02-4B5E-AB36-7E614F05BDD7}" srcOrd="6" destOrd="0" presId="urn:microsoft.com/office/officeart/2005/8/layout/hierarchy3"/>
+    <dgm:cxn modelId="{D786A7F1-4CCF-4881-9022-B9ACF1381D77}" type="presParOf" srcId="{202B2392-9D1B-429A-9E3F-256487846A79}" destId="{06C776E6-5E91-47BA-A505-8C4BB019E18D}" srcOrd="7" destOrd="0" presId="urn:microsoft.com/office/officeart/2005/8/layout/hierarchy3"/>
   </dgm:cxnLst>
   <dgm:bg/>
   <dgm:whole/>
@@ -4517,10 +4292,24 @@
     <dgm:pt modelId="{9D0884AD-FBE2-42D4-AB62-E677EF1BED91}" type="parTrans" cxnId="{FEF1E573-505A-471A-927D-6F3C05AB6D2F}">
       <dgm:prSet/>
       <dgm:spPr/>
+      <dgm:t>
+        <a:bodyPr/>
+        <a:lstStyle/>
+        <a:p>
+          <a:endParaRPr lang="en-US"/>
+        </a:p>
+      </dgm:t>
     </dgm:pt>
     <dgm:pt modelId="{C3B0C595-3C28-47FB-8816-D52C998E0703}" type="sibTrans" cxnId="{FEF1E573-505A-471A-927D-6F3C05AB6D2F}">
       <dgm:prSet/>
       <dgm:spPr/>
+      <dgm:t>
+        <a:bodyPr/>
+        <a:lstStyle/>
+        <a:p>
+          <a:endParaRPr lang="en-US"/>
+        </a:p>
+      </dgm:t>
     </dgm:pt>
     <dgm:pt modelId="{468E7379-5244-4B88-A076-0C0B2352E6AA}">
       <dgm:prSet phldrT="[Text]"/>
@@ -4540,10 +4329,24 @@
     <dgm:pt modelId="{D765A247-FFC3-4A83-9B46-74C81616CA4C}" type="parTrans" cxnId="{EB102518-9E93-40BB-86CF-347A688CDA50}">
       <dgm:prSet/>
       <dgm:spPr/>
+      <dgm:t>
+        <a:bodyPr/>
+        <a:lstStyle/>
+        <a:p>
+          <a:endParaRPr lang="en-US"/>
+        </a:p>
+      </dgm:t>
     </dgm:pt>
     <dgm:pt modelId="{9D352B9A-3B2C-445E-838E-A48292FB64B5}" type="sibTrans" cxnId="{EB102518-9E93-40BB-86CF-347A688CDA50}">
       <dgm:prSet/>
       <dgm:spPr/>
+      <dgm:t>
+        <a:bodyPr/>
+        <a:lstStyle/>
+        <a:p>
+          <a:endParaRPr lang="en-US"/>
+        </a:p>
+      </dgm:t>
     </dgm:pt>
     <dgm:pt modelId="{13BABCAB-8812-46E1-9D8F-7049301F1733}">
       <dgm:prSet phldrT="[Text]"/>
@@ -4563,10 +4366,24 @@
     <dgm:pt modelId="{B3D485D7-A45E-4FCD-9678-B3643C565A71}" type="parTrans" cxnId="{8D5BED61-51CA-47A7-8C67-5E9A8CFD9800}">
       <dgm:prSet/>
       <dgm:spPr/>
+      <dgm:t>
+        <a:bodyPr/>
+        <a:lstStyle/>
+        <a:p>
+          <a:endParaRPr lang="en-US"/>
+        </a:p>
+      </dgm:t>
     </dgm:pt>
     <dgm:pt modelId="{E8F22B98-E90D-4B49-B419-FAFDDCC977E2}" type="sibTrans" cxnId="{8D5BED61-51CA-47A7-8C67-5E9A8CFD9800}">
       <dgm:prSet/>
       <dgm:spPr/>
+      <dgm:t>
+        <a:bodyPr/>
+        <a:lstStyle/>
+        <a:p>
+          <a:endParaRPr lang="en-US"/>
+        </a:p>
+      </dgm:t>
     </dgm:pt>
     <dgm:pt modelId="{F35BBAE0-8D7C-4094-B122-C3315284B107}">
       <dgm:prSet phldrT="[Text]"/>
@@ -4590,10 +4407,24 @@
     <dgm:pt modelId="{5FB307D9-7EF2-48CE-9483-B07803542059}" type="parTrans" cxnId="{5D34DB6E-E740-4984-9954-0C57F9F0595F}">
       <dgm:prSet/>
       <dgm:spPr/>
+      <dgm:t>
+        <a:bodyPr/>
+        <a:lstStyle/>
+        <a:p>
+          <a:endParaRPr lang="en-US"/>
+        </a:p>
+      </dgm:t>
     </dgm:pt>
     <dgm:pt modelId="{F6ABEE0A-9BB4-47A3-8B77-BA978E8CA872}" type="sibTrans" cxnId="{5D34DB6E-E740-4984-9954-0C57F9F0595F}">
       <dgm:prSet/>
       <dgm:spPr/>
+      <dgm:t>
+        <a:bodyPr/>
+        <a:lstStyle/>
+        <a:p>
+          <a:endParaRPr lang="en-US"/>
+        </a:p>
+      </dgm:t>
     </dgm:pt>
     <dgm:pt modelId="{E5BD8358-A067-4A24-85F2-F86E81B66D9A}">
       <dgm:prSet phldrT="[Text]"/>
@@ -4617,10 +4448,24 @@
     <dgm:pt modelId="{23987287-82DC-439C-BD74-61D9A6D2902F}" type="parTrans" cxnId="{0513BFC1-7977-4F4D-B807-FE7DA5B2BA01}">
       <dgm:prSet/>
       <dgm:spPr/>
+      <dgm:t>
+        <a:bodyPr/>
+        <a:lstStyle/>
+        <a:p>
+          <a:endParaRPr lang="en-US"/>
+        </a:p>
+      </dgm:t>
     </dgm:pt>
     <dgm:pt modelId="{297CB050-ABD6-458C-8657-180EBF4D415F}" type="sibTrans" cxnId="{0513BFC1-7977-4F4D-B807-FE7DA5B2BA01}">
       <dgm:prSet/>
       <dgm:spPr/>
+      <dgm:t>
+        <a:bodyPr/>
+        <a:lstStyle/>
+        <a:p>
+          <a:endParaRPr lang="en-US"/>
+        </a:p>
+      </dgm:t>
     </dgm:pt>
     <dgm:pt modelId="{12C6760E-4761-499B-BAF0-A4E4F028083C}" type="pres">
       <dgm:prSet presAssocID="{03F15A40-EBA8-4C2F-8620-43299CD86436}" presName="linear" presStyleCnt="0">
@@ -4752,8 +4597,8 @@
       </dsp:nvSpPr>
       <dsp:spPr>
         <a:xfrm>
-          <a:off x="5985" y="30209"/>
-          <a:ext cx="2072446" cy="1036223"/>
+          <a:off x="201386" y="718"/>
+          <a:ext cx="1815338" cy="907669"/>
         </a:xfrm>
         <a:prstGeom prst="roundRect">
           <a:avLst>
@@ -4796,12 +4641,12 @@
         </a:fontRef>
       </dsp:style>
       <dsp:txBody>
-        <a:bodyPr spcFirstLastPara="0" vert="horz" wrap="square" lIns="80010" tIns="53340" rIns="80010" bIns="53340" numCol="1" spcCol="1270" anchor="ctr" anchorCtr="0">
+        <a:bodyPr spcFirstLastPara="0" vert="horz" wrap="square" lIns="34290" tIns="22860" rIns="34290" bIns="22860" numCol="1" spcCol="1270" anchor="ctr" anchorCtr="0">
           <a:noAutofit/>
         </a:bodyPr>
         <a:lstStyle/>
         <a:p>
-          <a:pPr marL="0" lvl="0" indent="0" algn="ctr" defTabSz="1866900">
+          <a:pPr marL="0" lvl="0" indent="0" algn="ctr" defTabSz="800100">
             <a:lnSpc>
               <a:spcPct val="90000"/>
             </a:lnSpc>
@@ -4814,15 +4659,15 @@
             <a:buNone/>
           </a:pPr>
           <a:r>
-            <a:rPr lang="en-CA" sz="4200" kern="1200" dirty="0"/>
-            <a:t>content</a:t>
+            <a:rPr lang="pt-PT" sz="1800" kern="1200" dirty="0"/>
+            <a:t>Administradores</a:t>
           </a:r>
-          <a:endParaRPr lang="en-US" sz="4200" kern="1200" dirty="0"/>
+          <a:endParaRPr lang="en-US" sz="1800" kern="1200" dirty="0"/>
         </a:p>
       </dsp:txBody>
       <dsp:txXfrm>
-        <a:off x="36335" y="60559"/>
-        <a:ext cx="2011746" cy="975523"/>
+        <a:off x="227971" y="27303"/>
+        <a:ext cx="1762168" cy="854499"/>
       </dsp:txXfrm>
     </dsp:sp>
     <dsp:sp modelId="{E5EF051C-60C4-466C-918A-9A8965F9275F}">
@@ -4832,8 +4677,8 @@
       </dsp:nvSpPr>
       <dsp:spPr>
         <a:xfrm>
-          <a:off x="213229" y="1066432"/>
-          <a:ext cx="207244" cy="1043015"/>
+          <a:off x="382919" y="908388"/>
+          <a:ext cx="181533" cy="680515"/>
         </a:xfrm>
         <a:custGeom>
           <a:avLst/>
@@ -4847,10 +4692,10 @@
                 <a:pt x="0" y="0"/>
               </a:moveTo>
               <a:lnTo>
-                <a:pt x="0" y="1043015"/>
+                <a:pt x="0" y="680515"/>
               </a:lnTo>
               <a:lnTo>
-                <a:pt x="207244" y="1043015"/>
+                <a:pt x="181533" y="680515"/>
               </a:lnTo>
             </a:path>
           </a:pathLst>
@@ -4890,8 +4735,8 @@
       </dsp:nvSpPr>
       <dsp:spPr>
         <a:xfrm>
-          <a:off x="420474" y="1325488"/>
-          <a:ext cx="2593078" cy="1567919"/>
+          <a:off x="564453" y="1135305"/>
+          <a:ext cx="2988003" cy="907197"/>
         </a:xfrm>
         <a:prstGeom prst="roundRect">
           <a:avLst>
@@ -4933,12 +4778,12 @@
         <a:fontRef idx="minor"/>
       </dsp:style>
       <dsp:txBody>
-        <a:bodyPr spcFirstLastPara="0" vert="horz" wrap="square" lIns="47625" tIns="31750" rIns="47625" bIns="31750" numCol="1" spcCol="1270" anchor="t" anchorCtr="0">
+        <a:bodyPr spcFirstLastPara="0" vert="horz" wrap="square" lIns="38100" tIns="25400" rIns="38100" bIns="25400" numCol="1" spcCol="1270" anchor="ctr" anchorCtr="0">
           <a:noAutofit/>
         </a:bodyPr>
         <a:lstStyle/>
         <a:p>
-          <a:pPr marL="0" lvl="0" indent="0" algn="l" defTabSz="1111250">
+          <a:pPr marL="0" lvl="0" indent="0" algn="ctr" defTabSz="889000">
             <a:lnSpc>
               <a:spcPct val="90000"/>
             </a:lnSpc>
@@ -4951,83 +4796,26 @@
             <a:buNone/>
           </a:pPr>
           <a:r>
-            <a:rPr lang="en-CA" sz="2500" kern="1200" dirty="0"/>
-            <a:t>content</a:t>
+            <a:rPr lang="pt-PT" sz="2000" kern="1200" dirty="0"/>
+            <a:t>Moderação e gestão da plataforma</a:t>
           </a:r>
-          <a:endParaRPr lang="en-US" sz="2500" kern="1200" dirty="0"/>
-        </a:p>
-        <a:p>
-          <a:pPr marL="228600" lvl="1" indent="-228600" algn="l" defTabSz="889000">
-            <a:lnSpc>
-              <a:spcPct val="90000"/>
-            </a:lnSpc>
-            <a:spcBef>
-              <a:spcPct val="0"/>
-            </a:spcBef>
-            <a:spcAft>
-              <a:spcPct val="15000"/>
-            </a:spcAft>
-            <a:buChar char="•"/>
-          </a:pPr>
-          <a:r>
-            <a:rPr lang="en-CA" sz="2000" i="1" kern="1200" dirty="0"/>
-            <a:t>Content</a:t>
-          </a:r>
-          <a:endParaRPr lang="en-US" sz="2000" i="1" kern="1200" dirty="0"/>
-        </a:p>
-        <a:p>
-          <a:pPr marL="228600" lvl="1" indent="-228600" algn="l" defTabSz="889000">
-            <a:lnSpc>
-              <a:spcPct val="90000"/>
-            </a:lnSpc>
-            <a:spcBef>
-              <a:spcPct val="0"/>
-            </a:spcBef>
-            <a:spcAft>
-              <a:spcPct val="15000"/>
-            </a:spcAft>
-            <a:buChar char="•"/>
-          </a:pPr>
-          <a:r>
-            <a:rPr lang="en-CA" sz="2000" i="1" kern="1200" dirty="0"/>
-            <a:t>Content</a:t>
-          </a:r>
-          <a:endParaRPr lang="en-US" sz="2000" i="1" kern="1200" dirty="0"/>
-        </a:p>
-        <a:p>
-          <a:pPr marL="228600" lvl="1" indent="-228600" algn="l" defTabSz="889000">
-            <a:lnSpc>
-              <a:spcPct val="90000"/>
-            </a:lnSpc>
-            <a:spcBef>
-              <a:spcPct val="0"/>
-            </a:spcBef>
-            <a:spcAft>
-              <a:spcPct val="15000"/>
-            </a:spcAft>
-            <a:buChar char="•"/>
-          </a:pPr>
-          <a:r>
-            <a:rPr lang="en-CA" sz="2000" i="1" kern="1200" dirty="0"/>
-            <a:t>content</a:t>
-          </a:r>
-          <a:endParaRPr lang="en-US" sz="2000" i="1" kern="1200" dirty="0"/>
+          <a:endParaRPr lang="en-US" sz="2000" kern="1200" dirty="0"/>
         </a:p>
       </dsp:txBody>
       <dsp:txXfrm>
-        <a:off x="466397" y="1371411"/>
-        <a:ext cx="2501232" cy="1476073"/>
+        <a:off x="591024" y="1161876"/>
+        <a:ext cx="2934861" cy="854055"/>
       </dsp:txXfrm>
     </dsp:sp>
-    <dsp:sp modelId="{65FC3DF6-B5F9-47DD-9ACB-BDA16815EFF3}">
+    <dsp:sp modelId="{7520E9DE-6600-4317-BFF9-7515AB7BFFA5}">
       <dsp:nvSpPr>
         <dsp:cNvPr id="0" name=""/>
         <dsp:cNvSpPr/>
       </dsp:nvSpPr>
       <dsp:spPr>
         <a:xfrm>
-          <a:off x="213229" y="1066432"/>
-          <a:ext cx="207244" cy="2538114"/>
+          <a:off x="382919" y="908388"/>
+          <a:ext cx="181533" cy="1814866"/>
         </a:xfrm>
         <a:custGeom>
           <a:avLst/>
@@ -5041,10 +4829,10 @@
                 <a:pt x="0" y="0"/>
               </a:moveTo>
               <a:lnTo>
-                <a:pt x="0" y="2538114"/>
+                <a:pt x="0" y="1814866"/>
               </a:lnTo>
               <a:lnTo>
-                <a:pt x="207244" y="2538114"/>
+                <a:pt x="181533" y="1814866"/>
               </a:lnTo>
             </a:path>
           </a:pathLst>
@@ -5077,15 +4865,15 @@
         <a:fontRef idx="minor"/>
       </dsp:style>
     </dsp:sp>
-    <dsp:sp modelId="{5C64FD53-80A5-429C-A13E-0684D2C7E4F4}">
+    <dsp:sp modelId="{4B7DDA1B-E77F-4F2A-BD5A-AC67C257877D}">
       <dsp:nvSpPr>
         <dsp:cNvPr id="0" name=""/>
         <dsp:cNvSpPr/>
       </dsp:nvSpPr>
       <dsp:spPr>
         <a:xfrm>
-          <a:off x="420474" y="3152463"/>
-          <a:ext cx="2334834" cy="904166"/>
+          <a:off x="564453" y="2269419"/>
+          <a:ext cx="2988003" cy="907669"/>
         </a:xfrm>
         <a:prstGeom prst="roundRect">
           <a:avLst>
@@ -5127,12 +4915,12 @@
         <a:fontRef idx="minor"/>
       </dsp:style>
       <dsp:txBody>
-        <a:bodyPr spcFirstLastPara="0" vert="horz" wrap="square" lIns="47625" tIns="31750" rIns="47625" bIns="31750" numCol="1" spcCol="1270" anchor="ctr" anchorCtr="0">
+        <a:bodyPr spcFirstLastPara="0" vert="horz" wrap="square" lIns="38100" tIns="25400" rIns="38100" bIns="25400" numCol="1" spcCol="1270" anchor="ctr" anchorCtr="0">
           <a:noAutofit/>
         </a:bodyPr>
         <a:lstStyle/>
         <a:p>
-          <a:pPr marL="0" lvl="0" indent="0" algn="ctr" defTabSz="1111250">
+          <a:pPr marL="0" lvl="0" indent="0" algn="ctr" defTabSz="889000">
             <a:lnSpc>
               <a:spcPct val="90000"/>
             </a:lnSpc>
@@ -5142,18 +4930,19 @@
             <a:spcAft>
               <a:spcPct val="35000"/>
             </a:spcAft>
+            <a:buFont typeface="Symbol" panose="05050102010706020507" pitchFamily="18" charset="2"/>
             <a:buNone/>
           </a:pPr>
           <a:r>
-            <a:rPr lang="en-CA" sz="2500" kern="1200" dirty="0"/>
-            <a:t>content</a:t>
+            <a:rPr lang="pt-PT" sz="2000" kern="1200" dirty="0"/>
+            <a:t>Criação de campanhas promocionais</a:t>
           </a:r>
-          <a:endParaRPr lang="en-US" sz="2500" kern="1200" dirty="0"/>
+          <a:endParaRPr lang="en-US" sz="2000" kern="1200" dirty="0"/>
         </a:p>
       </dsp:txBody>
       <dsp:txXfrm>
-        <a:off x="446956" y="3178945"/>
-        <a:ext cx="2281870" cy="851202"/>
+        <a:off x="591038" y="2296004"/>
+        <a:ext cx="2934833" cy="854499"/>
       </dsp:txXfrm>
     </dsp:sp>
     <dsp:sp modelId="{EF30944E-B1FC-431A-9CC9-0BE1F17CA7AA}">
@@ -5163,8 +4952,8 @@
       </dsp:nvSpPr>
       <dsp:spPr>
         <a:xfrm>
-          <a:off x="3117175" y="30209"/>
-          <a:ext cx="2072446" cy="1036223"/>
+          <a:off x="3643224" y="718"/>
+          <a:ext cx="1815338" cy="907669"/>
         </a:xfrm>
         <a:prstGeom prst="roundRect">
           <a:avLst>
@@ -5207,12 +4996,12 @@
         </a:fontRef>
       </dsp:style>
       <dsp:txBody>
-        <a:bodyPr spcFirstLastPara="0" vert="horz" wrap="square" lIns="80010" tIns="53340" rIns="80010" bIns="53340" numCol="1" spcCol="1270" anchor="ctr" anchorCtr="0">
+        <a:bodyPr spcFirstLastPara="0" vert="horz" wrap="square" lIns="34290" tIns="22860" rIns="34290" bIns="22860" numCol="1" spcCol="1270" anchor="ctr" anchorCtr="0">
           <a:noAutofit/>
         </a:bodyPr>
         <a:lstStyle/>
         <a:p>
-          <a:pPr marL="0" lvl="0" indent="0" algn="ctr" defTabSz="1866900">
+          <a:pPr marL="0" lvl="0" indent="0" algn="ctr" defTabSz="800100">
             <a:lnSpc>
               <a:spcPct val="90000"/>
             </a:lnSpc>
@@ -5225,26 +5014,26 @@
             <a:buNone/>
           </a:pPr>
           <a:r>
-            <a:rPr lang="en-CA" sz="4200" kern="1200" dirty="0"/>
-            <a:t>content</a:t>
+            <a:rPr lang="pt-PT" sz="1800" kern="1200"/>
+            <a:t>Vendedores</a:t>
           </a:r>
-          <a:endParaRPr lang="en-US" sz="4200" kern="1200" dirty="0"/>
+          <a:endParaRPr lang="en-US" sz="1800" kern="1200" dirty="0"/>
         </a:p>
       </dsp:txBody>
       <dsp:txXfrm>
-        <a:off x="3147525" y="60559"/>
-        <a:ext cx="2011746" cy="975523"/>
+        <a:off x="3669809" y="27303"/>
+        <a:ext cx="1762168" cy="854499"/>
       </dsp:txXfrm>
     </dsp:sp>
-    <dsp:sp modelId="{33D8CCF8-D60C-4D7B-B6F2-38D5A2C764A8}">
+    <dsp:sp modelId="{91B35279-7648-4375-B713-9DF3BF94E8D9}">
       <dsp:nvSpPr>
         <dsp:cNvPr id="0" name=""/>
         <dsp:cNvSpPr/>
       </dsp:nvSpPr>
       <dsp:spPr>
         <a:xfrm>
-          <a:off x="3324419" y="1066432"/>
-          <a:ext cx="207244" cy="711139"/>
+          <a:off x="3824758" y="908388"/>
+          <a:ext cx="181533" cy="680751"/>
         </a:xfrm>
         <a:custGeom>
           <a:avLst/>
@@ -5258,10 +5047,10 @@
                 <a:pt x="0" y="0"/>
               </a:moveTo>
               <a:lnTo>
-                <a:pt x="0" y="711139"/>
+                <a:pt x="0" y="680751"/>
               </a:lnTo>
               <a:lnTo>
-                <a:pt x="207244" y="711139"/>
+                <a:pt x="181533" y="680751"/>
               </a:lnTo>
             </a:path>
           </a:pathLst>
@@ -5294,15 +5083,15 @@
         <a:fontRef idx="minor"/>
       </dsp:style>
     </dsp:sp>
-    <dsp:sp modelId="{5DB72798-CBEB-43EB-AEE2-B122F1A06F83}">
+    <dsp:sp modelId="{A28C8685-A8C1-44F6-9DBC-C4D88A000FD6}">
       <dsp:nvSpPr>
         <dsp:cNvPr id="0" name=""/>
         <dsp:cNvSpPr/>
       </dsp:nvSpPr>
       <dsp:spPr>
         <a:xfrm>
-          <a:off x="3531664" y="1325488"/>
-          <a:ext cx="2333243" cy="904166"/>
+          <a:off x="4006292" y="1135305"/>
+          <a:ext cx="2988003" cy="907669"/>
         </a:xfrm>
         <a:prstGeom prst="roundRect">
           <a:avLst>
@@ -5344,12 +5133,12 @@
         <a:fontRef idx="minor"/>
       </dsp:style>
       <dsp:txBody>
-        <a:bodyPr spcFirstLastPara="0" vert="horz" wrap="square" lIns="47625" tIns="31750" rIns="47625" bIns="31750" numCol="1" spcCol="1270" anchor="ctr" anchorCtr="0">
+        <a:bodyPr spcFirstLastPara="0" vert="horz" wrap="square" lIns="38100" tIns="25400" rIns="38100" bIns="25400" numCol="1" spcCol="1270" anchor="ctr" anchorCtr="0">
           <a:noAutofit/>
         </a:bodyPr>
         <a:lstStyle/>
         <a:p>
-          <a:pPr marL="0" lvl="0" indent="0" algn="ctr" defTabSz="1111250">
+          <a:pPr marL="0" lvl="0" indent="0" algn="ctr" defTabSz="889000">
             <a:lnSpc>
               <a:spcPct val="90000"/>
             </a:lnSpc>
@@ -5362,26 +5151,25 @@
             <a:buNone/>
           </a:pPr>
           <a:r>
-            <a:rPr lang="en-CA" sz="2500" kern="1200" dirty="0"/>
-            <a:t>content</a:t>
+            <a:rPr lang="pt-PT" sz="2000" kern="1200" dirty="0"/>
+            <a:t>Venda de produtos</a:t>
           </a:r>
-          <a:endParaRPr lang="en-US" sz="2500" kern="1200" dirty="0"/>
         </a:p>
       </dsp:txBody>
       <dsp:txXfrm>
-        <a:off x="3558146" y="1351970"/>
-        <a:ext cx="2280279" cy="851202"/>
+        <a:off x="4032877" y="1161890"/>
+        <a:ext cx="2934833" cy="854499"/>
       </dsp:txXfrm>
     </dsp:sp>
-    <dsp:sp modelId="{1230C02A-614B-47F6-94FE-D1470FC2A903}">
+    <dsp:sp modelId="{2A33608E-8BBB-4FFC-9D2E-D7202A9CEC62}">
       <dsp:nvSpPr>
         <dsp:cNvPr id="0" name=""/>
         <dsp:cNvSpPr/>
       </dsp:nvSpPr>
       <dsp:spPr>
         <a:xfrm>
-          <a:off x="3324419" y="1066432"/>
-          <a:ext cx="207244" cy="1940390"/>
+          <a:off x="3824758" y="908388"/>
+          <a:ext cx="181533" cy="1815338"/>
         </a:xfrm>
         <a:custGeom>
           <a:avLst/>
@@ -5395,10 +5183,10 @@
                 <a:pt x="0" y="0"/>
               </a:moveTo>
               <a:lnTo>
-                <a:pt x="0" y="1940390"/>
+                <a:pt x="0" y="1815338"/>
               </a:lnTo>
               <a:lnTo>
-                <a:pt x="207244" y="1940390"/>
+                <a:pt x="181533" y="1815338"/>
               </a:lnTo>
             </a:path>
           </a:pathLst>
@@ -5431,15 +5219,15 @@
         <a:fontRef idx="minor"/>
       </dsp:style>
     </dsp:sp>
-    <dsp:sp modelId="{077DF96F-93FD-49D3-89E8-C0E306317D6B}">
+    <dsp:sp modelId="{2D3CA462-1BBD-487F-A208-8A0A0778879E}">
       <dsp:nvSpPr>
         <dsp:cNvPr id="0" name=""/>
         <dsp:cNvSpPr/>
       </dsp:nvSpPr>
       <dsp:spPr>
         <a:xfrm>
-          <a:off x="3531664" y="2488711"/>
-          <a:ext cx="1657957" cy="1036223"/>
+          <a:off x="4006292" y="2269891"/>
+          <a:ext cx="2988003" cy="907669"/>
         </a:xfrm>
         <a:prstGeom prst="roundRect">
           <a:avLst>
@@ -5481,12 +5269,12 @@
         <a:fontRef idx="minor"/>
       </dsp:style>
       <dsp:txBody>
-        <a:bodyPr spcFirstLastPara="0" vert="horz" wrap="square" lIns="47625" tIns="31750" rIns="47625" bIns="31750" numCol="1" spcCol="1270" anchor="ctr" anchorCtr="0">
+        <a:bodyPr spcFirstLastPara="0" vert="horz" wrap="square" lIns="38100" tIns="25400" rIns="38100" bIns="25400" numCol="1" spcCol="1270" anchor="ctr" anchorCtr="0">
           <a:noAutofit/>
         </a:bodyPr>
         <a:lstStyle/>
         <a:p>
-          <a:pPr marL="0" lvl="0" indent="0" algn="ctr" defTabSz="1111250">
+          <a:pPr marL="0" lvl="0" indent="0" algn="ctr" defTabSz="889000">
             <a:lnSpc>
               <a:spcPct val="90000"/>
             </a:lnSpc>
@@ -5499,26 +5287,29 @@
             <a:buNone/>
           </a:pPr>
           <a:r>
-            <a:rPr lang="en-CA" sz="2500" kern="1200"/>
-            <a:t>content</a:t>
+            <a:rPr lang="pt-PT" sz="2000" kern="1200" dirty="0"/>
+            <a:t>Resposta a comentários sobre produtos em </a:t>
           </a:r>
-          <a:endParaRPr lang="en-US" sz="2500" kern="1200"/>
+          <a:r>
+            <a:rPr lang="en-US" sz="2000" i="1" kern="1200" dirty="0"/>
+            <a:t>threads</a:t>
+          </a:r>
         </a:p>
       </dsp:txBody>
       <dsp:txXfrm>
-        <a:off x="3562014" y="2519061"/>
-        <a:ext cx="1597257" cy="975523"/>
+        <a:off x="4032877" y="2296476"/>
+        <a:ext cx="2934833" cy="854499"/>
       </dsp:txXfrm>
     </dsp:sp>
-    <dsp:sp modelId="{26994A90-1875-4CEC-8F49-DCE6ED2AEC26}">
+    <dsp:sp modelId="{BBB6D5B2-0E1A-43FD-AE26-C1637F8578C2}">
       <dsp:nvSpPr>
         <dsp:cNvPr id="0" name=""/>
         <dsp:cNvSpPr/>
       </dsp:nvSpPr>
       <dsp:spPr>
         <a:xfrm>
-          <a:off x="5968530" y="30209"/>
-          <a:ext cx="2072446" cy="1036223"/>
+          <a:off x="7085062" y="718"/>
+          <a:ext cx="1815338" cy="907669"/>
         </a:xfrm>
         <a:prstGeom prst="roundRect">
           <a:avLst>
@@ -5561,12 +5352,12 @@
         </a:fontRef>
       </dsp:style>
       <dsp:txBody>
-        <a:bodyPr spcFirstLastPara="0" vert="horz" wrap="square" lIns="80010" tIns="53340" rIns="80010" bIns="53340" numCol="1" spcCol="1270" anchor="ctr" anchorCtr="0">
+        <a:bodyPr spcFirstLastPara="0" vert="horz" wrap="square" lIns="34290" tIns="22860" rIns="34290" bIns="22860" numCol="1" spcCol="1270" anchor="ctr" anchorCtr="0">
           <a:noAutofit/>
         </a:bodyPr>
         <a:lstStyle/>
         <a:p>
-          <a:pPr marL="0" lvl="0" indent="0" algn="ctr" defTabSz="1866900">
+          <a:pPr marL="0" lvl="0" indent="0" algn="ctr" defTabSz="800100">
             <a:lnSpc>
               <a:spcPct val="90000"/>
             </a:lnSpc>
@@ -5579,26 +5370,25 @@
             <a:buNone/>
           </a:pPr>
           <a:r>
-            <a:rPr lang="en-CA" sz="4200" kern="1200" dirty="0"/>
-            <a:t>content</a:t>
+            <a:rPr lang="pt-PT" sz="1800" kern="1200" dirty="0"/>
+            <a:t>Compradores</a:t>
           </a:r>
-          <a:endParaRPr lang="en-US" sz="4200" kern="1200" dirty="0"/>
         </a:p>
       </dsp:txBody>
       <dsp:txXfrm>
-        <a:off x="5998880" y="60559"/>
-        <a:ext cx="2011746" cy="975523"/>
+        <a:off x="7111647" y="27303"/>
+        <a:ext cx="1762168" cy="854499"/>
       </dsp:txXfrm>
     </dsp:sp>
-    <dsp:sp modelId="{382E9C81-3BAB-4543-B0BD-11FE9A067969}">
+    <dsp:sp modelId="{789EC290-DFFA-4E2A-B9FE-29B5A9A9B6BF}">
       <dsp:nvSpPr>
         <dsp:cNvPr id="0" name=""/>
         <dsp:cNvSpPr/>
       </dsp:nvSpPr>
       <dsp:spPr>
         <a:xfrm>
-          <a:off x="6175774" y="1066432"/>
-          <a:ext cx="207244" cy="777167"/>
+          <a:off x="7266596" y="908388"/>
+          <a:ext cx="181533" cy="680751"/>
         </a:xfrm>
         <a:custGeom>
           <a:avLst/>
@@ -5612,10 +5402,10 @@
                 <a:pt x="0" y="0"/>
               </a:moveTo>
               <a:lnTo>
-                <a:pt x="0" y="777167"/>
+                <a:pt x="0" y="680751"/>
               </a:lnTo>
               <a:lnTo>
-                <a:pt x="207244" y="777167"/>
+                <a:pt x="181533" y="680751"/>
               </a:lnTo>
             </a:path>
           </a:pathLst>
@@ -5648,15 +5438,15 @@
         <a:fontRef idx="minor"/>
       </dsp:style>
     </dsp:sp>
-    <dsp:sp modelId="{7C8A1000-99FA-4197-AB9E-91187898F8C3}">
+    <dsp:sp modelId="{14A74095-9703-4207-92DB-85F3EB6823AD}">
       <dsp:nvSpPr>
         <dsp:cNvPr id="0" name=""/>
         <dsp:cNvSpPr/>
       </dsp:nvSpPr>
       <dsp:spPr>
         <a:xfrm>
-          <a:off x="6383019" y="1325488"/>
-          <a:ext cx="1657957" cy="1036223"/>
+          <a:off x="7448130" y="1135305"/>
+          <a:ext cx="2988003" cy="907669"/>
         </a:xfrm>
         <a:prstGeom prst="roundRect">
           <a:avLst>
@@ -5698,12 +5488,12 @@
         <a:fontRef idx="minor"/>
       </dsp:style>
       <dsp:txBody>
-        <a:bodyPr spcFirstLastPara="0" vert="horz" wrap="square" lIns="47625" tIns="31750" rIns="47625" bIns="31750" numCol="1" spcCol="1270" anchor="ctr" anchorCtr="0">
+        <a:bodyPr spcFirstLastPara="0" vert="horz" wrap="square" lIns="38100" tIns="25400" rIns="38100" bIns="25400" numCol="1" spcCol="1270" anchor="ctr" anchorCtr="0">
           <a:noAutofit/>
         </a:bodyPr>
         <a:lstStyle/>
         <a:p>
-          <a:pPr marL="0" lvl="0" indent="0" algn="ctr" defTabSz="1111250">
+          <a:pPr marL="0" lvl="0" indent="0" algn="ctr" defTabSz="889000">
             <a:lnSpc>
               <a:spcPct val="90000"/>
             </a:lnSpc>
@@ -5716,106 +5506,25 @@
             <a:buNone/>
           </a:pPr>
           <a:r>
-            <a:rPr lang="en-CA" sz="2500" kern="1200"/>
-            <a:t>content</a:t>
+            <a:rPr lang="pt-PT" sz="2000" kern="1200" dirty="0"/>
+            <a:t>Realização de encomendas</a:t>
           </a:r>
-          <a:endParaRPr lang="en-US" sz="2500" kern="1200"/>
         </a:p>
       </dsp:txBody>
       <dsp:txXfrm>
-        <a:off x="6413369" y="1355838"/>
-        <a:ext cx="1597257" cy="975523"/>
+        <a:off x="7474715" y="1161890"/>
+        <a:ext cx="2934833" cy="854499"/>
       </dsp:txXfrm>
     </dsp:sp>
-    <dsp:sp modelId="{F7723B08-FDF8-4267-8DC3-E233B06F5DC0}">
+    <dsp:sp modelId="{02E9A38B-264A-4A28-BE04-09608DB043E5}">
       <dsp:nvSpPr>
         <dsp:cNvPr id="0" name=""/>
         <dsp:cNvSpPr/>
       </dsp:nvSpPr>
       <dsp:spPr>
         <a:xfrm>
-          <a:off x="8559088" y="30209"/>
-          <a:ext cx="2072446" cy="1036223"/>
-        </a:xfrm>
-        <a:prstGeom prst="roundRect">
-          <a:avLst>
-            <a:gd name="adj" fmla="val 10000"/>
-          </a:avLst>
-        </a:prstGeom>
-        <a:solidFill>
-          <a:schemeClr val="accent1">
-            <a:hueOff val="0"/>
-            <a:satOff val="0"/>
-            <a:lumOff val="0"/>
-            <a:alphaOff val="0"/>
-          </a:schemeClr>
-        </a:solidFill>
-        <a:ln w="19050" cap="rnd" cmpd="sng" algn="ctr">
-          <a:solidFill>
-            <a:schemeClr val="lt1">
-              <a:hueOff val="0"/>
-              <a:satOff val="0"/>
-              <a:lumOff val="0"/>
-              <a:alphaOff val="0"/>
-            </a:schemeClr>
-          </a:solidFill>
-          <a:prstDash val="solid"/>
-        </a:ln>
-        <a:effectLst/>
-      </dsp:spPr>
-      <dsp:style>
-        <a:lnRef idx="2">
-          <a:scrgbClr r="0" g="0" b="0"/>
-        </a:lnRef>
-        <a:fillRef idx="1">
-          <a:scrgbClr r="0" g="0" b="0"/>
-        </a:fillRef>
-        <a:effectRef idx="0">
-          <a:scrgbClr r="0" g="0" b="0"/>
-        </a:effectRef>
-        <a:fontRef idx="minor">
-          <a:schemeClr val="lt1"/>
-        </a:fontRef>
-      </dsp:style>
-      <dsp:txBody>
-        <a:bodyPr spcFirstLastPara="0" vert="horz" wrap="square" lIns="80010" tIns="53340" rIns="80010" bIns="53340" numCol="1" spcCol="1270" anchor="ctr" anchorCtr="0">
-          <a:noAutofit/>
-        </a:bodyPr>
-        <a:lstStyle/>
-        <a:p>
-          <a:pPr marL="0" lvl="0" indent="0" algn="ctr" defTabSz="1866900">
-            <a:lnSpc>
-              <a:spcPct val="90000"/>
-            </a:lnSpc>
-            <a:spcBef>
-              <a:spcPct val="0"/>
-            </a:spcBef>
-            <a:spcAft>
-              <a:spcPct val="35000"/>
-            </a:spcAft>
-            <a:buNone/>
-          </a:pPr>
-          <a:r>
-            <a:rPr lang="en-CA" sz="4200" kern="1200" dirty="0"/>
-            <a:t>content</a:t>
-          </a:r>
-          <a:endParaRPr lang="en-US" sz="4200" kern="1200" dirty="0"/>
-        </a:p>
-      </dsp:txBody>
-      <dsp:txXfrm>
-        <a:off x="8589438" y="60559"/>
-        <a:ext cx="2011746" cy="975523"/>
-      </dsp:txXfrm>
-    </dsp:sp>
-    <dsp:sp modelId="{3FAB9D14-74F6-4949-86FE-DDFA337CDD9B}">
-      <dsp:nvSpPr>
-        <dsp:cNvPr id="0" name=""/>
-        <dsp:cNvSpPr/>
-      </dsp:nvSpPr>
-      <dsp:spPr>
-        <a:xfrm>
-          <a:off x="8766332" y="1066432"/>
-          <a:ext cx="207244" cy="673612"/>
+          <a:off x="7266596" y="908388"/>
+          <a:ext cx="181533" cy="1815338"/>
         </a:xfrm>
         <a:custGeom>
           <a:avLst/>
@@ -5829,10 +5538,10 @@
                 <a:pt x="0" y="0"/>
               </a:moveTo>
               <a:lnTo>
-                <a:pt x="0" y="673612"/>
+                <a:pt x="0" y="1815338"/>
               </a:lnTo>
               <a:lnTo>
-                <a:pt x="207244" y="673612"/>
+                <a:pt x="181533" y="1815338"/>
               </a:lnTo>
             </a:path>
           </a:pathLst>
@@ -5865,15 +5574,15 @@
         <a:fontRef idx="minor"/>
       </dsp:style>
     </dsp:sp>
-    <dsp:sp modelId="{FD5B5B45-8D4F-4FC8-98BD-94634AE50740}">
+    <dsp:sp modelId="{6E625772-9F1A-49D2-9193-C4C7F16E0899}">
       <dsp:nvSpPr>
         <dsp:cNvPr id="0" name=""/>
         <dsp:cNvSpPr/>
       </dsp:nvSpPr>
       <dsp:spPr>
         <a:xfrm>
-          <a:off x="8973577" y="1325488"/>
-          <a:ext cx="1281120" cy="829113"/>
+          <a:off x="7448130" y="2269891"/>
+          <a:ext cx="2988003" cy="907669"/>
         </a:xfrm>
         <a:prstGeom prst="roundRect">
           <a:avLst>
@@ -5915,12 +5624,12 @@
         <a:fontRef idx="minor"/>
       </dsp:style>
       <dsp:txBody>
-        <a:bodyPr spcFirstLastPara="0" vert="horz" wrap="square" lIns="47625" tIns="31750" rIns="47625" bIns="31750" numCol="1" spcCol="1270" anchor="ctr" anchorCtr="0">
+        <a:bodyPr spcFirstLastPara="0" vert="horz" wrap="square" lIns="38100" tIns="25400" rIns="38100" bIns="25400" numCol="1" spcCol="1270" anchor="ctr" anchorCtr="0">
           <a:noAutofit/>
         </a:bodyPr>
         <a:lstStyle/>
         <a:p>
-          <a:pPr marL="0" lvl="0" indent="0" algn="ctr" defTabSz="1111250">
+          <a:pPr marL="0" lvl="0" indent="0" algn="ctr" defTabSz="889000">
             <a:lnSpc>
               <a:spcPct val="90000"/>
             </a:lnSpc>
@@ -5933,26 +5642,25 @@
             <a:buNone/>
           </a:pPr>
           <a:r>
-            <a:rPr lang="en-CA" sz="2500" kern="1200" dirty="0"/>
-            <a:t>content</a:t>
+            <a:rPr lang="pt-PT" sz="2000" kern="1200" dirty="0"/>
+            <a:t>Classificação de produtos</a:t>
           </a:r>
-          <a:endParaRPr lang="en-US" sz="2500" kern="1200" dirty="0"/>
         </a:p>
       </dsp:txBody>
       <dsp:txXfrm>
-        <a:off x="8997861" y="1349772"/>
-        <a:ext cx="1232552" cy="780545"/>
+        <a:off x="7474715" y="2296476"/>
+        <a:ext cx="2934833" cy="854499"/>
       </dsp:txXfrm>
     </dsp:sp>
-    <dsp:sp modelId="{AF665868-D1B1-4E79-BB44-3B530F5AB03B}">
+    <dsp:sp modelId="{7B6764B6-163B-468E-B793-3861BACFE459}">
       <dsp:nvSpPr>
         <dsp:cNvPr id="0" name=""/>
         <dsp:cNvSpPr/>
       </dsp:nvSpPr>
       <dsp:spPr>
         <a:xfrm>
-          <a:off x="8766332" y="1066432"/>
-          <a:ext cx="207244" cy="1761781"/>
+          <a:off x="7266596" y="908388"/>
+          <a:ext cx="181533" cy="2949925"/>
         </a:xfrm>
         <a:custGeom>
           <a:avLst/>
@@ -5966,10 +5674,10 @@
                 <a:pt x="0" y="0"/>
               </a:moveTo>
               <a:lnTo>
-                <a:pt x="0" y="1761781"/>
+                <a:pt x="0" y="2949925"/>
               </a:lnTo>
               <a:lnTo>
-                <a:pt x="207244" y="1761781"/>
+                <a:pt x="181533" y="2949925"/>
               </a:lnTo>
             </a:path>
           </a:pathLst>
@@ -6002,15 +5710,15 @@
         <a:fontRef idx="minor"/>
       </dsp:style>
     </dsp:sp>
-    <dsp:sp modelId="{C67D23C7-4635-4A49-93C0-F8DDA1E06049}">
+    <dsp:sp modelId="{B468F478-4533-4A40-9612-9EF806B0E159}">
       <dsp:nvSpPr>
         <dsp:cNvPr id="0" name=""/>
         <dsp:cNvSpPr/>
       </dsp:nvSpPr>
       <dsp:spPr>
         <a:xfrm>
-          <a:off x="8973577" y="2413657"/>
-          <a:ext cx="1281120" cy="829113"/>
+          <a:off x="7448130" y="3404478"/>
+          <a:ext cx="2987567" cy="907669"/>
         </a:xfrm>
         <a:prstGeom prst="roundRect">
           <a:avLst>
@@ -6052,12 +5760,12 @@
         <a:fontRef idx="minor"/>
       </dsp:style>
       <dsp:txBody>
-        <a:bodyPr spcFirstLastPara="0" vert="horz" wrap="square" lIns="47625" tIns="31750" rIns="47625" bIns="31750" numCol="1" spcCol="1270" anchor="ctr" anchorCtr="0">
+        <a:bodyPr spcFirstLastPara="0" vert="horz" wrap="square" lIns="38100" tIns="25400" rIns="38100" bIns="25400" numCol="1" spcCol="1270" anchor="ctr" anchorCtr="0">
           <a:noAutofit/>
         </a:bodyPr>
         <a:lstStyle/>
         <a:p>
-          <a:pPr marL="0" lvl="0" indent="0" algn="ctr" defTabSz="1111250">
+          <a:pPr marL="0" lvl="0" indent="0" algn="ctr" defTabSz="889000">
             <a:lnSpc>
               <a:spcPct val="90000"/>
             </a:lnSpc>
@@ -6070,26 +5778,29 @@
             <a:buNone/>
           </a:pPr>
           <a:r>
-            <a:rPr lang="en-CA" sz="2500" kern="1200" dirty="0"/>
-            <a:t>content</a:t>
+            <a:rPr lang="pt-PT" sz="2000" kern="1200" dirty="0"/>
+            <a:t>Publicação de comentários sobre produtos em </a:t>
           </a:r>
-          <a:endParaRPr lang="en-US" sz="2500" kern="1200" dirty="0"/>
+          <a:r>
+            <a:rPr lang="en-US" sz="2000" i="1" kern="1200" dirty="0"/>
+            <a:t>threads</a:t>
+          </a:r>
         </a:p>
       </dsp:txBody>
       <dsp:txXfrm>
-        <a:off x="8997861" y="2437941"/>
-        <a:ext cx="1232552" cy="780545"/>
+        <a:off x="7474715" y="3431063"/>
+        <a:ext cx="2934397" cy="854499"/>
       </dsp:txXfrm>
     </dsp:sp>
-    <dsp:sp modelId="{7BD6ADC1-CA47-4FB4-86C1-12120231E138}">
+    <dsp:sp modelId="{02C31BA6-6F02-4B5E-AB36-7E614F05BDD7}">
       <dsp:nvSpPr>
         <dsp:cNvPr id="0" name=""/>
         <dsp:cNvSpPr/>
       </dsp:nvSpPr>
       <dsp:spPr>
         <a:xfrm>
-          <a:off x="8766332" y="1066432"/>
-          <a:ext cx="207244" cy="2849018"/>
+          <a:off x="7266596" y="908388"/>
+          <a:ext cx="181533" cy="4084511"/>
         </a:xfrm>
         <a:custGeom>
           <a:avLst/>
@@ -6103,10 +5814,10 @@
                 <a:pt x="0" y="0"/>
               </a:moveTo>
               <a:lnTo>
-                <a:pt x="0" y="2849018"/>
+                <a:pt x="0" y="4084511"/>
               </a:lnTo>
               <a:lnTo>
-                <a:pt x="207244" y="2849018"/>
+                <a:pt x="181533" y="4084511"/>
               </a:lnTo>
             </a:path>
           </a:pathLst>
@@ -6139,15 +5850,15 @@
         <a:fontRef idx="minor"/>
       </dsp:style>
     </dsp:sp>
-    <dsp:sp modelId="{4D9C5689-A3CC-4246-ACE4-2FCD625D2DBD}">
+    <dsp:sp modelId="{06C776E6-5E91-47BA-A505-8C4BB019E18D}">
       <dsp:nvSpPr>
         <dsp:cNvPr id="0" name=""/>
         <dsp:cNvSpPr/>
       </dsp:nvSpPr>
       <dsp:spPr>
         <a:xfrm>
-          <a:off x="8973577" y="3501826"/>
-          <a:ext cx="1280025" cy="827248"/>
+          <a:off x="7448130" y="4539064"/>
+          <a:ext cx="2988003" cy="907669"/>
         </a:xfrm>
         <a:prstGeom prst="roundRect">
           <a:avLst>
@@ -6189,12 +5900,12 @@
         <a:fontRef idx="minor"/>
       </dsp:style>
       <dsp:txBody>
-        <a:bodyPr spcFirstLastPara="0" vert="horz" wrap="square" lIns="47625" tIns="31750" rIns="47625" bIns="31750" numCol="1" spcCol="1270" anchor="ctr" anchorCtr="0">
+        <a:bodyPr spcFirstLastPara="0" vert="horz" wrap="square" lIns="38100" tIns="25400" rIns="38100" bIns="25400" numCol="1" spcCol="1270" anchor="ctr" anchorCtr="0">
           <a:noAutofit/>
         </a:bodyPr>
         <a:lstStyle/>
         <a:p>
-          <a:pPr marL="0" lvl="0" indent="0" algn="ctr" defTabSz="1111250">
+          <a:pPr marL="0" lvl="0" indent="0" algn="ctr" defTabSz="889000">
             <a:lnSpc>
               <a:spcPct val="90000"/>
             </a:lnSpc>
@@ -6207,152 +5918,14 @@
             <a:buNone/>
           </a:pPr>
           <a:r>
-            <a:rPr lang="en-CA" sz="2500" kern="1200" dirty="0"/>
-            <a:t>content</a:t>
+            <a:rPr lang="pt-PT" sz="2000" kern="1200" dirty="0"/>
+            <a:t>Participação em campanhas promocionais</a:t>
           </a:r>
-          <a:endParaRPr lang="en-US" sz="2500" kern="1200" dirty="0"/>
         </a:p>
       </dsp:txBody>
       <dsp:txXfrm>
-        <a:off x="8997806" y="3526055"/>
-        <a:ext cx="1231567" cy="778790"/>
-      </dsp:txXfrm>
-    </dsp:sp>
-    <dsp:sp modelId="{0C4B42A2-C79A-462B-8997-0C54F8785037}">
-      <dsp:nvSpPr>
-        <dsp:cNvPr id="0" name=""/>
-        <dsp:cNvSpPr/>
-      </dsp:nvSpPr>
-      <dsp:spPr>
-        <a:xfrm>
-          <a:off x="8766332" y="1066432"/>
-          <a:ext cx="207244" cy="3936254"/>
-        </a:xfrm>
-        <a:custGeom>
-          <a:avLst/>
-          <a:gdLst/>
-          <a:ahLst/>
-          <a:cxnLst/>
-          <a:rect l="0" t="0" r="0" b="0"/>
-          <a:pathLst>
-            <a:path>
-              <a:moveTo>
-                <a:pt x="0" y="0"/>
-              </a:moveTo>
-              <a:lnTo>
-                <a:pt x="0" y="3936254"/>
-              </a:lnTo>
-              <a:lnTo>
-                <a:pt x="207244" y="3936254"/>
-              </a:lnTo>
-            </a:path>
-          </a:pathLst>
-        </a:custGeom>
-        <a:noFill/>
-        <a:ln w="19050" cap="rnd" cmpd="sng" algn="ctr">
-          <a:solidFill>
-            <a:schemeClr val="accent1">
-              <a:shade val="60000"/>
-              <a:hueOff val="0"/>
-              <a:satOff val="0"/>
-              <a:lumOff val="0"/>
-              <a:alphaOff val="0"/>
-            </a:schemeClr>
-          </a:solidFill>
-          <a:prstDash val="solid"/>
-        </a:ln>
-        <a:effectLst/>
-      </dsp:spPr>
-      <dsp:style>
-        <a:lnRef idx="2">
-          <a:scrgbClr r="0" g="0" b="0"/>
-        </a:lnRef>
-        <a:fillRef idx="0">
-          <a:scrgbClr r="0" g="0" b="0"/>
-        </a:fillRef>
-        <a:effectRef idx="0">
-          <a:scrgbClr r="0" g="0" b="0"/>
-        </a:effectRef>
-        <a:fontRef idx="minor"/>
-      </dsp:style>
-    </dsp:sp>
-    <dsp:sp modelId="{9795C372-B1B6-485C-8B73-D30022696272}">
-      <dsp:nvSpPr>
-        <dsp:cNvPr id="0" name=""/>
-        <dsp:cNvSpPr/>
-      </dsp:nvSpPr>
-      <dsp:spPr>
-        <a:xfrm>
-          <a:off x="8973577" y="4588130"/>
-          <a:ext cx="1281120" cy="829113"/>
-        </a:xfrm>
-        <a:prstGeom prst="roundRect">
-          <a:avLst>
-            <a:gd name="adj" fmla="val 10000"/>
-          </a:avLst>
-        </a:prstGeom>
-        <a:solidFill>
-          <a:schemeClr val="lt1">
-            <a:alpha val="90000"/>
-            <a:hueOff val="0"/>
-            <a:satOff val="0"/>
-            <a:lumOff val="0"/>
-            <a:alphaOff val="0"/>
-          </a:schemeClr>
-        </a:solidFill>
-        <a:ln w="19050" cap="rnd" cmpd="sng" algn="ctr">
-          <a:solidFill>
-            <a:schemeClr val="accent1">
-              <a:hueOff val="0"/>
-              <a:satOff val="0"/>
-              <a:lumOff val="0"/>
-              <a:alphaOff val="0"/>
-            </a:schemeClr>
-          </a:solidFill>
-          <a:prstDash val="solid"/>
-        </a:ln>
-        <a:effectLst/>
-      </dsp:spPr>
-      <dsp:style>
-        <a:lnRef idx="2">
-          <a:scrgbClr r="0" g="0" b="0"/>
-        </a:lnRef>
-        <a:fillRef idx="1">
-          <a:scrgbClr r="0" g="0" b="0"/>
-        </a:fillRef>
-        <a:effectRef idx="0">
-          <a:scrgbClr r="0" g="0" b="0"/>
-        </a:effectRef>
-        <a:fontRef idx="minor"/>
-      </dsp:style>
-      <dsp:txBody>
-        <a:bodyPr spcFirstLastPara="0" vert="horz" wrap="square" lIns="47625" tIns="31750" rIns="47625" bIns="31750" numCol="1" spcCol="1270" anchor="ctr" anchorCtr="0">
-          <a:noAutofit/>
-        </a:bodyPr>
-        <a:lstStyle/>
-        <a:p>
-          <a:pPr marL="0" lvl="0" indent="0" algn="ctr" defTabSz="1111250">
-            <a:lnSpc>
-              <a:spcPct val="90000"/>
-            </a:lnSpc>
-            <a:spcBef>
-              <a:spcPct val="0"/>
-            </a:spcBef>
-            <a:spcAft>
-              <a:spcPct val="35000"/>
-            </a:spcAft>
-            <a:buNone/>
-          </a:pPr>
-          <a:r>
-            <a:rPr lang="en-CA" sz="2500" kern="1200" dirty="0"/>
-            <a:t>content</a:t>
-          </a:r>
-          <a:endParaRPr lang="en-US" sz="2500" kern="1200" dirty="0"/>
-        </a:p>
-      </dsp:txBody>
-      <dsp:txXfrm>
-        <a:off x="8997861" y="4612414"/>
-        <a:ext cx="1232552" cy="780545"/>
+        <a:off x="7474715" y="4565649"/>
+        <a:ext cx="2934833" cy="854499"/>
       </dsp:txXfrm>
     </dsp:sp>
   </dsp:spTree>
@@ -10379,6 +9952,456 @@
 </p:notes>
 </file>
 
+<file path=ppt/notesSlides/notesSlide5.xml><?xml version="1.0" encoding="utf-8"?>
+<p:notes xmlns:a="http://schemas.openxmlformats.org/drawingml/2006/main" xmlns:r="http://schemas.openxmlformats.org/officeDocument/2006/relationships" xmlns:p="http://schemas.openxmlformats.org/presentationml/2006/main">
+  <p:cSld>
+    <p:spTree>
+      <p:nvGrpSpPr>
+        <p:cNvPr id="1" name=""/>
+        <p:cNvGrpSpPr/>
+        <p:nvPr/>
+      </p:nvGrpSpPr>
+      <p:grpSpPr>
+        <a:xfrm>
+          <a:off x="0" y="0"/>
+          <a:ext cx="0" cy="0"/>
+          <a:chOff x="0" y="0"/>
+          <a:chExt cx="0" cy="0"/>
+        </a:xfrm>
+      </p:grpSpPr>
+      <p:sp>
+        <p:nvSpPr>
+          <p:cNvPr id="2" name="Marcador de Posição da Imagem do Diapositivo 1"/>
+          <p:cNvSpPr>
+            <a:spLocks noGrp="1" noRot="1" noChangeAspect="1"/>
+          </p:cNvSpPr>
+          <p:nvPr>
+            <p:ph type="sldImg"/>
+          </p:nvPr>
+        </p:nvSpPr>
+        <p:spPr>
+          <a:xfrm>
+            <a:off x="217488" y="812800"/>
+            <a:ext cx="7123112" cy="4008438"/>
+          </a:xfrm>
+        </p:spPr>
+      </p:sp>
+      <p:sp>
+        <p:nvSpPr>
+          <p:cNvPr id="3" name="Marcador de Posição de Notas 2"/>
+          <p:cNvSpPr>
+            <a:spLocks noGrp="1"/>
+          </p:cNvSpPr>
+          <p:nvPr>
+            <p:ph type="body" idx="1"/>
+          </p:nvPr>
+        </p:nvSpPr>
+        <p:spPr/>
+        <p:txBody>
+          <a:bodyPr/>
+          <a:lstStyle/>
+          <a:p>
+            <a:endParaRPr lang="pt-PT" dirty="0"/>
+          </a:p>
+        </p:txBody>
+      </p:sp>
+      <p:sp>
+        <p:nvSpPr>
+          <p:cNvPr id="4" name="Marcador de Posição do Número do Diapositivo 3"/>
+          <p:cNvSpPr>
+            <a:spLocks noGrp="1"/>
+          </p:cNvSpPr>
+          <p:nvPr>
+            <p:ph type="sldNum" sz="quarter" idx="5"/>
+          </p:nvPr>
+        </p:nvSpPr>
+        <p:spPr/>
+        <p:txBody>
+          <a:bodyPr/>
+          <a:lstStyle/>
+          <a:p>
+            <a:pPr lvl="0"/>
+            <a:fld id="{C80227EA-FB27-4C76-80DA-072C02B2B6B1}" type="slidenum">
+              <a:rPr lang="pt-PT" smtClean="0"/>
+              <a:t>5</a:t>
+            </a:fld>
+            <a:endParaRPr lang="pt-PT"/>
+          </a:p>
+        </p:txBody>
+      </p:sp>
+    </p:spTree>
+    <p:extLst>
+      <p:ext uri="{BB962C8B-B14F-4D97-AF65-F5344CB8AC3E}">
+        <p14:creationId xmlns:p14="http://schemas.microsoft.com/office/powerpoint/2010/main" val="3377913151"/>
+      </p:ext>
+    </p:extLst>
+  </p:cSld>
+  <p:clrMapOvr>
+    <a:masterClrMapping/>
+  </p:clrMapOvr>
+</p:notes>
+</file>
+
+<file path=ppt/notesSlides/notesSlide6.xml><?xml version="1.0" encoding="utf-8"?>
+<p:notes xmlns:a="http://schemas.openxmlformats.org/drawingml/2006/main" xmlns:r="http://schemas.openxmlformats.org/officeDocument/2006/relationships" xmlns:p="http://schemas.openxmlformats.org/presentationml/2006/main">
+  <p:cSld>
+    <p:spTree>
+      <p:nvGrpSpPr>
+        <p:cNvPr id="1" name=""/>
+        <p:cNvGrpSpPr/>
+        <p:nvPr/>
+      </p:nvGrpSpPr>
+      <p:grpSpPr>
+        <a:xfrm>
+          <a:off x="0" y="0"/>
+          <a:ext cx="0" cy="0"/>
+          <a:chOff x="0" y="0"/>
+          <a:chExt cx="0" cy="0"/>
+        </a:xfrm>
+      </p:grpSpPr>
+      <p:sp>
+        <p:nvSpPr>
+          <p:cNvPr id="2" name="Marcador de Posição da Imagem do Diapositivo 1"/>
+          <p:cNvSpPr>
+            <a:spLocks noGrp="1" noRot="1" noChangeAspect="1"/>
+          </p:cNvSpPr>
+          <p:nvPr>
+            <p:ph type="sldImg"/>
+          </p:nvPr>
+        </p:nvSpPr>
+        <p:spPr>
+          <a:xfrm>
+            <a:off x="217488" y="812800"/>
+            <a:ext cx="7123112" cy="4008438"/>
+          </a:xfrm>
+        </p:spPr>
+      </p:sp>
+      <p:sp>
+        <p:nvSpPr>
+          <p:cNvPr id="3" name="Marcador de Posição de Notas 2"/>
+          <p:cNvSpPr>
+            <a:spLocks noGrp="1"/>
+          </p:cNvSpPr>
+          <p:nvPr>
+            <p:ph type="body" idx="1"/>
+          </p:nvPr>
+        </p:nvSpPr>
+        <p:spPr/>
+        <p:txBody>
+          <a:bodyPr/>
+          <a:lstStyle/>
+          <a:p>
+            <a:endParaRPr lang="pt-PT" dirty="0"/>
+          </a:p>
+        </p:txBody>
+      </p:sp>
+      <p:sp>
+        <p:nvSpPr>
+          <p:cNvPr id="4" name="Marcador de Posição do Número do Diapositivo 3"/>
+          <p:cNvSpPr>
+            <a:spLocks noGrp="1"/>
+          </p:cNvSpPr>
+          <p:nvPr>
+            <p:ph type="sldNum" sz="quarter" idx="5"/>
+          </p:nvPr>
+        </p:nvSpPr>
+        <p:spPr/>
+        <p:txBody>
+          <a:bodyPr/>
+          <a:lstStyle/>
+          <a:p>
+            <a:pPr lvl="0"/>
+            <a:fld id="{C80227EA-FB27-4C76-80DA-072C02B2B6B1}" type="slidenum">
+              <a:rPr lang="pt-PT" smtClean="0"/>
+              <a:t>6</a:t>
+            </a:fld>
+            <a:endParaRPr lang="pt-PT"/>
+          </a:p>
+        </p:txBody>
+      </p:sp>
+    </p:spTree>
+    <p:extLst>
+      <p:ext uri="{BB962C8B-B14F-4D97-AF65-F5344CB8AC3E}">
+        <p14:creationId xmlns:p14="http://schemas.microsoft.com/office/powerpoint/2010/main" val="1449305353"/>
+      </p:ext>
+    </p:extLst>
+  </p:cSld>
+  <p:clrMapOvr>
+    <a:masterClrMapping/>
+  </p:clrMapOvr>
+</p:notes>
+</file>
+
+<file path=ppt/notesSlides/notesSlide7.xml><?xml version="1.0" encoding="utf-8"?>
+<p:notes xmlns:a="http://schemas.openxmlformats.org/drawingml/2006/main" xmlns:r="http://schemas.openxmlformats.org/officeDocument/2006/relationships" xmlns:p="http://schemas.openxmlformats.org/presentationml/2006/main">
+  <p:cSld>
+    <p:spTree>
+      <p:nvGrpSpPr>
+        <p:cNvPr id="1" name=""/>
+        <p:cNvGrpSpPr/>
+        <p:nvPr/>
+      </p:nvGrpSpPr>
+      <p:grpSpPr>
+        <a:xfrm>
+          <a:off x="0" y="0"/>
+          <a:ext cx="0" cy="0"/>
+          <a:chOff x="0" y="0"/>
+          <a:chExt cx="0" cy="0"/>
+        </a:xfrm>
+      </p:grpSpPr>
+      <p:sp>
+        <p:nvSpPr>
+          <p:cNvPr id="2" name="Marcador de Posição da Imagem do Diapositivo 1"/>
+          <p:cNvSpPr>
+            <a:spLocks noGrp="1" noRot="1" noChangeAspect="1"/>
+          </p:cNvSpPr>
+          <p:nvPr>
+            <p:ph type="sldImg"/>
+          </p:nvPr>
+        </p:nvSpPr>
+        <p:spPr>
+          <a:xfrm>
+            <a:off x="217488" y="812800"/>
+            <a:ext cx="7123112" cy="4008438"/>
+          </a:xfrm>
+        </p:spPr>
+      </p:sp>
+      <p:sp>
+        <p:nvSpPr>
+          <p:cNvPr id="3" name="Marcador de Posição de Notas 2"/>
+          <p:cNvSpPr>
+            <a:spLocks noGrp="1"/>
+          </p:cNvSpPr>
+          <p:nvPr>
+            <p:ph type="body" idx="1"/>
+          </p:nvPr>
+        </p:nvSpPr>
+        <p:spPr/>
+        <p:txBody>
+          <a:bodyPr/>
+          <a:lstStyle/>
+          <a:p>
+            <a:endParaRPr lang="pt-PT" dirty="0"/>
+          </a:p>
+        </p:txBody>
+      </p:sp>
+      <p:sp>
+        <p:nvSpPr>
+          <p:cNvPr id="4" name="Marcador de Posição do Número do Diapositivo 3"/>
+          <p:cNvSpPr>
+            <a:spLocks noGrp="1"/>
+          </p:cNvSpPr>
+          <p:nvPr>
+            <p:ph type="sldNum" sz="quarter" idx="5"/>
+          </p:nvPr>
+        </p:nvSpPr>
+        <p:spPr/>
+        <p:txBody>
+          <a:bodyPr/>
+          <a:lstStyle/>
+          <a:p>
+            <a:pPr lvl="0"/>
+            <a:fld id="{C80227EA-FB27-4C76-80DA-072C02B2B6B1}" type="slidenum">
+              <a:rPr lang="pt-PT" smtClean="0"/>
+              <a:t>7</a:t>
+            </a:fld>
+            <a:endParaRPr lang="pt-PT"/>
+          </a:p>
+        </p:txBody>
+      </p:sp>
+    </p:spTree>
+    <p:extLst>
+      <p:ext uri="{BB962C8B-B14F-4D97-AF65-F5344CB8AC3E}">
+        <p14:creationId xmlns:p14="http://schemas.microsoft.com/office/powerpoint/2010/main" val="3745300863"/>
+      </p:ext>
+    </p:extLst>
+  </p:cSld>
+  <p:clrMapOvr>
+    <a:masterClrMapping/>
+  </p:clrMapOvr>
+</p:notes>
+</file>
+
+<file path=ppt/notesSlides/notesSlide8.xml><?xml version="1.0" encoding="utf-8"?>
+<p:notes xmlns:a="http://schemas.openxmlformats.org/drawingml/2006/main" xmlns:r="http://schemas.openxmlformats.org/officeDocument/2006/relationships" xmlns:p="http://schemas.openxmlformats.org/presentationml/2006/main">
+  <p:cSld>
+    <p:spTree>
+      <p:nvGrpSpPr>
+        <p:cNvPr id="1" name=""/>
+        <p:cNvGrpSpPr/>
+        <p:nvPr/>
+      </p:nvGrpSpPr>
+      <p:grpSpPr>
+        <a:xfrm>
+          <a:off x="0" y="0"/>
+          <a:ext cx="0" cy="0"/>
+          <a:chOff x="0" y="0"/>
+          <a:chExt cx="0" cy="0"/>
+        </a:xfrm>
+      </p:grpSpPr>
+      <p:sp>
+        <p:nvSpPr>
+          <p:cNvPr id="2" name="Marcador de Posição da Imagem do Diapositivo 1"/>
+          <p:cNvSpPr>
+            <a:spLocks noGrp="1" noRot="1" noChangeAspect="1"/>
+          </p:cNvSpPr>
+          <p:nvPr>
+            <p:ph type="sldImg"/>
+          </p:nvPr>
+        </p:nvSpPr>
+        <p:spPr>
+          <a:xfrm>
+            <a:off x="217488" y="812800"/>
+            <a:ext cx="7123112" cy="4008438"/>
+          </a:xfrm>
+        </p:spPr>
+      </p:sp>
+      <p:sp>
+        <p:nvSpPr>
+          <p:cNvPr id="3" name="Marcador de Posição de Notas 2"/>
+          <p:cNvSpPr>
+            <a:spLocks noGrp="1"/>
+          </p:cNvSpPr>
+          <p:nvPr>
+            <p:ph type="body" idx="1"/>
+          </p:nvPr>
+        </p:nvSpPr>
+        <p:spPr/>
+        <p:txBody>
+          <a:bodyPr/>
+          <a:lstStyle/>
+          <a:p>
+            <a:endParaRPr lang="pt-PT" dirty="0"/>
+          </a:p>
+        </p:txBody>
+      </p:sp>
+      <p:sp>
+        <p:nvSpPr>
+          <p:cNvPr id="4" name="Marcador de Posição do Número do Diapositivo 3"/>
+          <p:cNvSpPr>
+            <a:spLocks noGrp="1"/>
+          </p:cNvSpPr>
+          <p:nvPr>
+            <p:ph type="sldNum" sz="quarter" idx="5"/>
+          </p:nvPr>
+        </p:nvSpPr>
+        <p:spPr/>
+        <p:txBody>
+          <a:bodyPr/>
+          <a:lstStyle/>
+          <a:p>
+            <a:pPr lvl="0"/>
+            <a:fld id="{C80227EA-FB27-4C76-80DA-072C02B2B6B1}" type="slidenum">
+              <a:rPr lang="pt-PT" smtClean="0"/>
+              <a:t>8</a:t>
+            </a:fld>
+            <a:endParaRPr lang="pt-PT"/>
+          </a:p>
+        </p:txBody>
+      </p:sp>
+    </p:spTree>
+    <p:extLst>
+      <p:ext uri="{BB962C8B-B14F-4D97-AF65-F5344CB8AC3E}">
+        <p14:creationId xmlns:p14="http://schemas.microsoft.com/office/powerpoint/2010/main" val="3329104466"/>
+      </p:ext>
+    </p:extLst>
+  </p:cSld>
+  <p:clrMapOvr>
+    <a:masterClrMapping/>
+  </p:clrMapOvr>
+</p:notes>
+</file>
+
+<file path=ppt/notesSlides/notesSlide9.xml><?xml version="1.0" encoding="utf-8"?>
+<p:notes xmlns:a="http://schemas.openxmlformats.org/drawingml/2006/main" xmlns:r="http://schemas.openxmlformats.org/officeDocument/2006/relationships" xmlns:p="http://schemas.openxmlformats.org/presentationml/2006/main">
+  <p:cSld>
+    <p:spTree>
+      <p:nvGrpSpPr>
+        <p:cNvPr id="1" name=""/>
+        <p:cNvGrpSpPr/>
+        <p:nvPr/>
+      </p:nvGrpSpPr>
+      <p:grpSpPr>
+        <a:xfrm>
+          <a:off x="0" y="0"/>
+          <a:ext cx="0" cy="0"/>
+          <a:chOff x="0" y="0"/>
+          <a:chExt cx="0" cy="0"/>
+        </a:xfrm>
+      </p:grpSpPr>
+      <p:sp>
+        <p:nvSpPr>
+          <p:cNvPr id="2" name="Marcador de Posição da Imagem do Diapositivo 1"/>
+          <p:cNvSpPr>
+            <a:spLocks noGrp="1" noRot="1" noChangeAspect="1"/>
+          </p:cNvSpPr>
+          <p:nvPr>
+            <p:ph type="sldImg"/>
+          </p:nvPr>
+        </p:nvSpPr>
+        <p:spPr>
+          <a:xfrm>
+            <a:off x="217488" y="812800"/>
+            <a:ext cx="7123112" cy="4008438"/>
+          </a:xfrm>
+        </p:spPr>
+      </p:sp>
+      <p:sp>
+        <p:nvSpPr>
+          <p:cNvPr id="3" name="Marcador de Posição de Notas 2"/>
+          <p:cNvSpPr>
+            <a:spLocks noGrp="1"/>
+          </p:cNvSpPr>
+          <p:nvPr>
+            <p:ph type="body" idx="1"/>
+          </p:nvPr>
+        </p:nvSpPr>
+        <p:spPr/>
+        <p:txBody>
+          <a:bodyPr/>
+          <a:lstStyle/>
+          <a:p>
+            <a:endParaRPr lang="pt-PT" dirty="0"/>
+          </a:p>
+        </p:txBody>
+      </p:sp>
+      <p:sp>
+        <p:nvSpPr>
+          <p:cNvPr id="4" name="Marcador de Posição do Número do Diapositivo 3"/>
+          <p:cNvSpPr>
+            <a:spLocks noGrp="1"/>
+          </p:cNvSpPr>
+          <p:nvPr>
+            <p:ph type="sldNum" sz="quarter" idx="5"/>
+          </p:nvPr>
+        </p:nvSpPr>
+        <p:spPr/>
+        <p:txBody>
+          <a:bodyPr/>
+          <a:lstStyle/>
+          <a:p>
+            <a:pPr lvl="0"/>
+            <a:fld id="{C80227EA-FB27-4C76-80DA-072C02B2B6B1}" type="slidenum">
+              <a:rPr lang="pt-PT" smtClean="0"/>
+              <a:t>9</a:t>
+            </a:fld>
+            <a:endParaRPr lang="pt-PT"/>
+          </a:p>
+        </p:txBody>
+      </p:sp>
+    </p:spTree>
+    <p:extLst>
+      <p:ext uri="{BB962C8B-B14F-4D97-AF65-F5344CB8AC3E}">
+        <p14:creationId xmlns:p14="http://schemas.microsoft.com/office/powerpoint/2010/main" val="3217777059"/>
+      </p:ext>
+    </p:extLst>
+  </p:cSld>
+  <p:clrMapOvr>
+    <a:masterClrMapping/>
+  </p:clrMapOvr>
+</p:notes>
+</file>
+
 <file path=ppt/slideLayouts/slideLayout1.xml><?xml version="1.0" encoding="utf-8"?>
 <p:sldLayout xmlns:a="http://schemas.openxmlformats.org/drawingml/2006/main" xmlns:r="http://schemas.openxmlformats.org/officeDocument/2006/relationships" xmlns:p="http://schemas.openxmlformats.org/presentationml/2006/main" showMasterSp="0" type="title" preserve="1">
   <p:cSld name="Diapositivo de Título">
@@ -11126,7 +11149,7 @@
             <a:fld id="{F5A39829-0E07-418E-823C-101154A9FFCB}" type="datetime1">
               <a:rPr lang="pt-PT" smtClean="0"/>
               <a:pPr lvl="0"/>
-              <a:t>21/03/2022</a:t>
+              <a:t>23/03/2022</a:t>
             </a:fld>
             <a:endParaRPr lang="pt-PT"/>
           </a:p>
@@ -11381,7 +11404,7 @@
             <a:fld id="{F5A39829-0E07-418E-823C-101154A9FFCB}" type="datetime1">
               <a:rPr lang="pt-PT" smtClean="0"/>
               <a:pPr lvl="0"/>
-              <a:t>21/03/2022</a:t>
+              <a:t>23/03/2022</a:t>
             </a:fld>
             <a:endParaRPr lang="pt-PT"/>
           </a:p>
@@ -11699,7 +11722,7 @@
             <a:fld id="{F5A39829-0E07-418E-823C-101154A9FFCB}" type="datetime1">
               <a:rPr lang="pt-PT" smtClean="0"/>
               <a:pPr lvl="0"/>
-              <a:t>21/03/2022</a:t>
+              <a:t>23/03/2022</a:t>
             </a:fld>
             <a:endParaRPr lang="pt-PT"/>
           </a:p>
@@ -12036,7 +12059,7 @@
             <a:fld id="{F5A39829-0E07-418E-823C-101154A9FFCB}" type="datetime1">
               <a:rPr lang="pt-PT" smtClean="0"/>
               <a:pPr lvl="0"/>
-              <a:t>21/03/2022</a:t>
+              <a:t>23/03/2022</a:t>
             </a:fld>
             <a:endParaRPr lang="pt-PT"/>
           </a:p>
@@ -12354,7 +12377,7 @@
             <a:fld id="{F5A39829-0E07-418E-823C-101154A9FFCB}" type="datetime1">
               <a:rPr lang="pt-PT" smtClean="0"/>
               <a:pPr lvl="0"/>
-              <a:t>21/03/2022</a:t>
+              <a:t>23/03/2022</a:t>
             </a:fld>
             <a:endParaRPr lang="pt-PT"/>
           </a:p>
@@ -12751,7 +12774,7 @@
             <a:fld id="{F5A39829-0E07-418E-823C-101154A9FFCB}" type="datetime1">
               <a:rPr lang="pt-PT" smtClean="0"/>
               <a:pPr lvl="0"/>
-              <a:t>21/03/2022</a:t>
+              <a:t>23/03/2022</a:t>
             </a:fld>
             <a:endParaRPr lang="pt-PT"/>
           </a:p>
@@ -12925,7 +12948,7 @@
             <a:fld id="{F5A39829-0E07-418E-823C-101154A9FFCB}" type="datetime1">
               <a:rPr lang="pt-PT" smtClean="0"/>
               <a:pPr lvl="0"/>
-              <a:t>21/03/2022</a:t>
+              <a:t>23/03/2022</a:t>
             </a:fld>
             <a:endParaRPr lang="pt-PT"/>
           </a:p>
@@ -13109,7 +13132,7 @@
             <a:fld id="{F5A39829-0E07-418E-823C-101154A9FFCB}" type="datetime1">
               <a:rPr lang="pt-PT" smtClean="0"/>
               <a:pPr lvl="0"/>
-              <a:t>21/03/2022</a:t>
+              <a:t>23/03/2022</a:t>
             </a:fld>
             <a:endParaRPr lang="pt-PT"/>
           </a:p>
@@ -13283,7 +13306,7 @@
             <a:fld id="{F5A39829-0E07-418E-823C-101154A9FFCB}" type="datetime1">
               <a:rPr lang="pt-PT" smtClean="0"/>
               <a:pPr lvl="0"/>
-              <a:t>21/03/2022</a:t>
+              <a:t>23/03/2022</a:t>
             </a:fld>
             <a:endParaRPr lang="pt-PT"/>
           </a:p>
@@ -13534,7 +13557,7 @@
             <a:fld id="{F5A39829-0E07-418E-823C-101154A9FFCB}" type="datetime1">
               <a:rPr lang="pt-PT" smtClean="0"/>
               <a:pPr lvl="0"/>
-              <a:t>21/03/2022</a:t>
+              <a:t>23/03/2022</a:t>
             </a:fld>
             <a:endParaRPr lang="pt-PT"/>
           </a:p>
@@ -13770,7 +13793,7 @@
             <a:fld id="{F5A39829-0E07-418E-823C-101154A9FFCB}" type="datetime1">
               <a:rPr lang="pt-PT" smtClean="0"/>
               <a:pPr lvl="0"/>
-              <a:t>21/03/2022</a:t>
+              <a:t>23/03/2022</a:t>
             </a:fld>
             <a:endParaRPr lang="pt-PT"/>
           </a:p>
@@ -14148,7 +14171,7 @@
             <a:fld id="{F5A39829-0E07-418E-823C-101154A9FFCB}" type="datetime1">
               <a:rPr lang="pt-PT" smtClean="0"/>
               <a:pPr lvl="0"/>
-              <a:t>21/03/2022</a:t>
+              <a:t>23/03/2022</a:t>
             </a:fld>
             <a:endParaRPr lang="pt-PT"/>
           </a:p>
@@ -14275,7 +14298,7 @@
             <a:fld id="{F5A39829-0E07-418E-823C-101154A9FFCB}" type="datetime1">
               <a:rPr lang="pt-PT" smtClean="0"/>
               <a:pPr lvl="0"/>
-              <a:t>21/03/2022</a:t>
+              <a:t>23/03/2022</a:t>
             </a:fld>
             <a:endParaRPr lang="pt-PT"/>
           </a:p>
@@ -14374,7 +14397,7 @@
             <a:fld id="{F5A39829-0E07-418E-823C-101154A9FFCB}" type="datetime1">
               <a:rPr lang="pt-PT" smtClean="0"/>
               <a:pPr lvl="0"/>
-              <a:t>21/03/2022</a:t>
+              <a:t>23/03/2022</a:t>
             </a:fld>
             <a:endParaRPr lang="pt-PT"/>
           </a:p>
@@ -14633,7 +14656,7 @@
             <a:fld id="{F5A39829-0E07-418E-823C-101154A9FFCB}" type="datetime1">
               <a:rPr lang="pt-PT" smtClean="0"/>
               <a:pPr lvl="0"/>
-              <a:t>21/03/2022</a:t>
+              <a:t>23/03/2022</a:t>
             </a:fld>
             <a:endParaRPr lang="pt-PT"/>
           </a:p>
@@ -14944,7 +14967,7 @@
             <a:fld id="{F5A39829-0E07-418E-823C-101154A9FFCB}" type="datetime1">
               <a:rPr lang="pt-PT" smtClean="0"/>
               <a:pPr lvl="0"/>
-              <a:t>21/03/2022</a:t>
+              <a:t>23/03/2022</a:t>
             </a:fld>
             <a:endParaRPr lang="pt-PT"/>
           </a:p>
@@ -15648,7 +15671,7 @@
             <a:fld id="{F5A39829-0E07-418E-823C-101154A9FFCB}" type="datetime1">
               <a:rPr lang="pt-PT" smtClean="0"/>
               <a:pPr lvl="0"/>
-              <a:t>21/03/2022</a:t>
+              <a:t>23/03/2022</a:t>
             </a:fld>
             <a:endParaRPr lang="pt-PT"/>
           </a:p>
@@ -17713,653 +17736,7 @@
 </p:sld>
 </file>
 
-<file path=ppt/slides/slide2.xml><?xml version="1.0" encoding="utf-8"?>
-<p:sld xmlns:a="http://schemas.openxmlformats.org/drawingml/2006/main" xmlns:r="http://schemas.openxmlformats.org/officeDocument/2006/relationships" xmlns:p="http://schemas.openxmlformats.org/presentationml/2006/main" showMasterSp="0">
-  <p:cSld>
-    <p:bg>
-      <p:bgPr>
-        <a:blipFill dpi="0" rotWithShape="1">
-          <a:blip r:embed="rId3">
-            <a:lum/>
-          </a:blip>
-          <a:srcRect/>
-          <a:stretch>
-            <a:fillRect/>
-          </a:stretch>
-        </a:blipFill>
-        <a:effectLst/>
-      </p:bgPr>
-    </p:bg>
-    <p:spTree>
-      <p:nvGrpSpPr>
-        <p:cNvPr id="1" name=""/>
-        <p:cNvGrpSpPr/>
-        <p:nvPr/>
-      </p:nvGrpSpPr>
-      <p:grpSpPr>
-        <a:xfrm>
-          <a:off x="0" y="0"/>
-          <a:ext cx="0" cy="0"/>
-          <a:chOff x="0" y="0"/>
-          <a:chExt cx="0" cy="0"/>
-        </a:xfrm>
-      </p:grpSpPr>
-      <p:sp>
-        <p:nvSpPr>
-          <p:cNvPr id="4" name="CaixaDeTexto 3">
-            <a:extLst>
-              <a:ext uri="{FF2B5EF4-FFF2-40B4-BE49-F238E27FC236}">
-                <a16:creationId xmlns:a16="http://schemas.microsoft.com/office/drawing/2014/main" id="{7C38E510-A5B6-4E52-BDF7-108E4B220321}"/>
-              </a:ext>
-            </a:extLst>
-          </p:cNvPr>
-          <p:cNvSpPr txBox="1"/>
-          <p:nvPr/>
-        </p:nvSpPr>
-        <p:spPr>
-          <a:xfrm>
-            <a:off x="0" y="524663"/>
-            <a:ext cx="10961914" cy="584775"/>
-          </a:xfrm>
-          <a:prstGeom prst="rect">
-            <a:avLst/>
-          </a:prstGeom>
-          <a:noFill/>
-        </p:spPr>
-        <p:txBody>
-          <a:bodyPr wrap="square">
-            <a:spAutoFit/>
-          </a:bodyPr>
-          <a:lstStyle/>
-          <a:p>
-            <a:pPr algn="ctr"/>
-            <a:r>
-              <a:rPr lang="pt-PT" sz="3200" b="1" dirty="0" err="1">
-                <a:solidFill>
-                  <a:srgbClr val="0071A4"/>
-                </a:solidFill>
-                <a:latin typeface="+mj-lt"/>
-                <a:ea typeface="SimSun" panose="02010600030101010101" pitchFamily="2" charset="-122"/>
-              </a:rPr>
-              <a:t>Indíce</a:t>
-            </a:r>
-            <a:endParaRPr lang="pt-PT" sz="3200" b="1" dirty="0">
-              <a:solidFill>
-                <a:srgbClr val="0071A4"/>
-              </a:solidFill>
-              <a:latin typeface="+mj-lt"/>
-            </a:endParaRPr>
-          </a:p>
-        </p:txBody>
-      </p:sp>
-      <p:sp>
-        <p:nvSpPr>
-          <p:cNvPr id="5" name="CaixaDeTexto 4">
-            <a:extLst>
-              <a:ext uri="{FF2B5EF4-FFF2-40B4-BE49-F238E27FC236}">
-                <a16:creationId xmlns:a16="http://schemas.microsoft.com/office/drawing/2014/main" id="{CDA88A9F-3B51-4A59-9FAB-D80C9DA31784}"/>
-              </a:ext>
-            </a:extLst>
-          </p:cNvPr>
-          <p:cNvSpPr txBox="1"/>
-          <p:nvPr/>
-        </p:nvSpPr>
-        <p:spPr>
-          <a:xfrm>
-            <a:off x="665545" y="1795251"/>
-            <a:ext cx="10101944" cy="3267498"/>
-          </a:xfrm>
-          <a:prstGeom prst="rect">
-            <a:avLst/>
-          </a:prstGeom>
-          <a:noFill/>
-        </p:spPr>
-        <p:txBody>
-          <a:bodyPr wrap="square" rtlCol="0">
-            <a:spAutoFit/>
-          </a:bodyPr>
-          <a:lstStyle/>
-          <a:p>
-            <a:pPr marL="342900" indent="-342900" algn="just">
-              <a:lnSpc>
-                <a:spcPct val="150000"/>
-              </a:lnSpc>
-              <a:buFont typeface="Symbol" panose="05050102010706020507" pitchFamily="18" charset="2"/>
-              <a:buChar char="·"/>
-            </a:pPr>
-            <a:r>
-              <a:rPr lang="pt-BR" sz="2000" dirty="0"/>
-              <a:t>I</a:t>
-            </a:r>
-            <a:r>
-              <a:rPr lang="pt-PT" sz="2000" dirty="0" err="1"/>
-              <a:t>ntrodução</a:t>
-            </a:r>
-            <a:endParaRPr lang="pt-PT" sz="2000" dirty="0"/>
-          </a:p>
-          <a:p>
-            <a:pPr marL="342900" indent="-342900" algn="just">
-              <a:lnSpc>
-                <a:spcPct val="150000"/>
-              </a:lnSpc>
-              <a:buFont typeface="Symbol" panose="05050102010706020507" pitchFamily="18" charset="2"/>
-              <a:buChar char="·"/>
-            </a:pPr>
-            <a:r>
-              <a:rPr lang="pt-PT" sz="2000" dirty="0"/>
-              <a:t>Apresentação dos conceitos</a:t>
-            </a:r>
-          </a:p>
-          <a:p>
-            <a:pPr marL="342900" indent="-342900" algn="just">
-              <a:lnSpc>
-                <a:spcPct val="150000"/>
-              </a:lnSpc>
-              <a:buFont typeface="Symbol" panose="05050102010706020507" pitchFamily="18" charset="2"/>
-              <a:buChar char="·"/>
-            </a:pPr>
-            <a:r>
-              <a:rPr lang="pt-PT" sz="2000" dirty="0"/>
-              <a:t>Descrição de uma solução potencial</a:t>
-            </a:r>
-          </a:p>
-          <a:p>
-            <a:pPr marL="342900" indent="-342900" algn="just">
-              <a:lnSpc>
-                <a:spcPct val="150000"/>
-              </a:lnSpc>
-              <a:buFont typeface="Symbol" panose="05050102010706020507" pitchFamily="18" charset="2"/>
-              <a:buChar char="·"/>
-            </a:pPr>
-            <a:r>
-              <a:rPr lang="pt-PT" sz="2000" dirty="0"/>
-              <a:t>Principais tecnologias a implementar</a:t>
-            </a:r>
-          </a:p>
-          <a:p>
-            <a:pPr marL="342900" indent="-342900" algn="just">
-              <a:lnSpc>
-                <a:spcPct val="150000"/>
-              </a:lnSpc>
-              <a:buFont typeface="Symbol" panose="05050102010706020507" pitchFamily="18" charset="2"/>
-              <a:buChar char="·"/>
-            </a:pPr>
-            <a:r>
-              <a:rPr lang="pt-PT" sz="2000" dirty="0"/>
-              <a:t>Plano de desenvolvimento</a:t>
-            </a:r>
-          </a:p>
-          <a:p>
-            <a:pPr marL="342900" indent="-342900" algn="just">
-              <a:lnSpc>
-                <a:spcPct val="150000"/>
-              </a:lnSpc>
-              <a:buFont typeface="Symbol" panose="05050102010706020507" pitchFamily="18" charset="2"/>
-              <a:buChar char="·"/>
-            </a:pPr>
-            <a:r>
-              <a:rPr lang="pt-PT" sz="2000" dirty="0"/>
-              <a:t>Diagramas</a:t>
-            </a:r>
-          </a:p>
-          <a:p>
-            <a:pPr marL="342900" indent="-342900" algn="just">
-              <a:lnSpc>
-                <a:spcPct val="150000"/>
-              </a:lnSpc>
-              <a:buFont typeface="Symbol" panose="05050102010706020507" pitchFamily="18" charset="2"/>
-              <a:buChar char="·"/>
-            </a:pPr>
-            <a:r>
-              <a:rPr lang="pt-PT" sz="2000" dirty="0"/>
-              <a:t>Conclusão</a:t>
-            </a:r>
-          </a:p>
-        </p:txBody>
-      </p:sp>
-    </p:spTree>
-    <p:extLst>
-      <p:ext uri="{BB962C8B-B14F-4D97-AF65-F5344CB8AC3E}">
-        <p14:creationId xmlns:p14="http://schemas.microsoft.com/office/powerpoint/2010/main" val="718284460"/>
-      </p:ext>
-    </p:extLst>
-  </p:cSld>
-  <p:clrMapOvr>
-    <a:masterClrMapping/>
-  </p:clrMapOvr>
-</p:sld>
-</file>
-
-<file path=ppt/slides/slide3.xml><?xml version="1.0" encoding="utf-8"?>
-<p:sld xmlns:a="http://schemas.openxmlformats.org/drawingml/2006/main" xmlns:r="http://schemas.openxmlformats.org/officeDocument/2006/relationships" xmlns:p="http://schemas.openxmlformats.org/presentationml/2006/main" showMasterSp="0">
-  <p:cSld>
-    <p:bg>
-      <p:bgPr>
-        <a:blipFill dpi="0" rotWithShape="1">
-          <a:blip r:embed="rId3">
-            <a:lum/>
-          </a:blip>
-          <a:srcRect/>
-          <a:stretch>
-            <a:fillRect/>
-          </a:stretch>
-        </a:blipFill>
-        <a:effectLst/>
-      </p:bgPr>
-    </p:bg>
-    <p:spTree>
-      <p:nvGrpSpPr>
-        <p:cNvPr id="1" name=""/>
-        <p:cNvGrpSpPr/>
-        <p:nvPr/>
-      </p:nvGrpSpPr>
-      <p:grpSpPr>
-        <a:xfrm>
-          <a:off x="0" y="0"/>
-          <a:ext cx="0" cy="0"/>
-          <a:chOff x="0" y="0"/>
-          <a:chExt cx="0" cy="0"/>
-        </a:xfrm>
-      </p:grpSpPr>
-      <p:sp>
-        <p:nvSpPr>
-          <p:cNvPr id="4" name="CaixaDeTexto 3">
-            <a:extLst>
-              <a:ext uri="{FF2B5EF4-FFF2-40B4-BE49-F238E27FC236}">
-                <a16:creationId xmlns:a16="http://schemas.microsoft.com/office/drawing/2014/main" id="{7C38E510-A5B6-4E52-BDF7-108E4B220321}"/>
-              </a:ext>
-            </a:extLst>
-          </p:cNvPr>
-          <p:cNvSpPr txBox="1"/>
-          <p:nvPr/>
-        </p:nvSpPr>
-        <p:spPr>
-          <a:xfrm>
-            <a:off x="0" y="524663"/>
-            <a:ext cx="10961914" cy="584775"/>
-          </a:xfrm>
-          <a:prstGeom prst="rect">
-            <a:avLst/>
-          </a:prstGeom>
-          <a:noFill/>
-        </p:spPr>
-        <p:txBody>
-          <a:bodyPr wrap="square">
-            <a:spAutoFit/>
-          </a:bodyPr>
-          <a:lstStyle/>
-          <a:p>
-            <a:pPr algn="ctr"/>
-            <a:r>
-              <a:rPr lang="pt-PT" sz="3200" b="1" dirty="0">
-                <a:solidFill>
-                  <a:srgbClr val="0071A4"/>
-                </a:solidFill>
-                <a:latin typeface="+mj-lt"/>
-                <a:ea typeface="SimSun" panose="02010600030101010101" pitchFamily="2" charset="-122"/>
-              </a:rPr>
-              <a:t>Introdução </a:t>
-            </a:r>
-            <a:r>
-              <a:rPr lang="pt-PT" sz="3200" b="1" dirty="0">
-                <a:solidFill>
-                  <a:srgbClr val="FF0000"/>
-                </a:solidFill>
-                <a:latin typeface="+mj-lt"/>
-                <a:ea typeface="SimSun" panose="02010600030101010101" pitchFamily="2" charset="-122"/>
-              </a:rPr>
-              <a:t>(TÓPICOS)</a:t>
-            </a:r>
-            <a:endParaRPr lang="pt-PT" sz="3200" b="1" dirty="0">
-              <a:solidFill>
-                <a:srgbClr val="FF0000"/>
-              </a:solidFill>
-              <a:latin typeface="+mj-lt"/>
-            </a:endParaRPr>
-          </a:p>
-        </p:txBody>
-      </p:sp>
-      <p:sp>
-        <p:nvSpPr>
-          <p:cNvPr id="5" name="CaixaDeTexto 4">
-            <a:extLst>
-              <a:ext uri="{FF2B5EF4-FFF2-40B4-BE49-F238E27FC236}">
-                <a16:creationId xmlns:a16="http://schemas.microsoft.com/office/drawing/2014/main" id="{CDA88A9F-3B51-4A59-9FAB-D80C9DA31784}"/>
-              </a:ext>
-            </a:extLst>
-          </p:cNvPr>
-          <p:cNvSpPr txBox="1"/>
-          <p:nvPr/>
-        </p:nvSpPr>
-        <p:spPr>
-          <a:xfrm>
-            <a:off x="1045028" y="1230755"/>
-            <a:ext cx="10101944" cy="5442965"/>
-          </a:xfrm>
-          <a:prstGeom prst="rect">
-            <a:avLst/>
-          </a:prstGeom>
-          <a:noFill/>
-        </p:spPr>
-        <p:txBody>
-          <a:bodyPr wrap="square" rtlCol="0">
-            <a:spAutoFit/>
-          </a:bodyPr>
-          <a:lstStyle/>
-          <a:p>
-            <a:pPr marL="342900" indent="-342900" algn="just">
-              <a:lnSpc>
-                <a:spcPct val="150000"/>
-              </a:lnSpc>
-              <a:buFont typeface="Symbol" panose="05050102010706020507" pitchFamily="18" charset="2"/>
-              <a:buChar char="·"/>
-            </a:pPr>
-            <a:r>
-              <a:rPr lang="pt-BR" dirty="0"/>
-              <a:t>Sistema simplificado de venda de produtos eletrónicos online</a:t>
-            </a:r>
-          </a:p>
-          <a:p>
-            <a:pPr marL="342900" indent="-342900" algn="just">
-              <a:lnSpc>
-                <a:spcPct val="150000"/>
-              </a:lnSpc>
-              <a:buFont typeface="Symbol" panose="05050102010706020507" pitchFamily="18" charset="2"/>
-              <a:buChar char="·"/>
-            </a:pPr>
-            <a:r>
-              <a:rPr lang="pt-BR" dirty="0"/>
-              <a:t>Funcionalidade de autenticação</a:t>
-            </a:r>
-          </a:p>
-          <a:p>
-            <a:pPr marL="342900" indent="-342900" algn="just">
-              <a:lnSpc>
-                <a:spcPct val="150000"/>
-              </a:lnSpc>
-              <a:buFont typeface="Symbol" panose="05050102010706020507" pitchFamily="18" charset="2"/>
-              <a:buChar char="·"/>
-            </a:pPr>
-            <a:r>
-              <a:rPr lang="pt-BR" dirty="0"/>
-              <a:t>Administradores:</a:t>
-            </a:r>
-          </a:p>
-          <a:p>
-            <a:pPr marL="800100" lvl="1" indent="-342900" algn="just">
-              <a:lnSpc>
-                <a:spcPct val="150000"/>
-              </a:lnSpc>
-              <a:buFont typeface="Symbol" panose="05050102010706020507" pitchFamily="18" charset="2"/>
-              <a:buChar char="·"/>
-            </a:pPr>
-            <a:r>
-              <a:rPr lang="pt-BR" dirty="0"/>
-              <a:t>Moderação e gestão da plataforma</a:t>
-            </a:r>
-          </a:p>
-          <a:p>
-            <a:pPr marL="342900" indent="-342900" algn="just">
-              <a:lnSpc>
-                <a:spcPct val="150000"/>
-              </a:lnSpc>
-              <a:buFont typeface="Symbol" panose="05050102010706020507" pitchFamily="18" charset="2"/>
-              <a:buChar char="·"/>
-            </a:pPr>
-            <a:r>
-              <a:rPr lang="pt-BR" dirty="0"/>
-              <a:t>Vendedores:</a:t>
-            </a:r>
-          </a:p>
-          <a:p>
-            <a:pPr marL="800100" lvl="1" indent="-342900" algn="just">
-              <a:lnSpc>
-                <a:spcPct val="150000"/>
-              </a:lnSpc>
-              <a:buFont typeface="Symbol" panose="05050102010706020507" pitchFamily="18" charset="2"/>
-              <a:buChar char="·"/>
-            </a:pPr>
-            <a:r>
-              <a:rPr lang="pt-BR" dirty="0"/>
-              <a:t>Venda de produtos</a:t>
-            </a:r>
-          </a:p>
-          <a:p>
-            <a:pPr marL="800100" lvl="1" indent="-342900" algn="just">
-              <a:lnSpc>
-                <a:spcPct val="150000"/>
-              </a:lnSpc>
-              <a:buFont typeface="Symbol" panose="05050102010706020507" pitchFamily="18" charset="2"/>
-              <a:buChar char="·"/>
-            </a:pPr>
-            <a:r>
-              <a:rPr lang="pt-BR" dirty="0"/>
-              <a:t>Resposta a comentários sobre produtos em </a:t>
-            </a:r>
-            <a:r>
-              <a:rPr lang="pt-BR" i="1" dirty="0"/>
-              <a:t>threads</a:t>
-            </a:r>
-          </a:p>
-          <a:p>
-            <a:pPr marL="800100" lvl="1" indent="-342900" algn="just">
-              <a:lnSpc>
-                <a:spcPct val="150000"/>
-              </a:lnSpc>
-              <a:buFont typeface="Symbol" panose="05050102010706020507" pitchFamily="18" charset="2"/>
-              <a:buChar char="·"/>
-            </a:pPr>
-            <a:r>
-              <a:rPr lang="pt-BR" dirty="0"/>
-              <a:t>Criação de campanhas promocionais</a:t>
-            </a:r>
-          </a:p>
-          <a:p>
-            <a:pPr marL="342900" indent="-342900" algn="just">
-              <a:lnSpc>
-                <a:spcPct val="150000"/>
-              </a:lnSpc>
-              <a:buFont typeface="Symbol" panose="05050102010706020507" pitchFamily="18" charset="2"/>
-              <a:buChar char="·"/>
-            </a:pPr>
-            <a:r>
-              <a:rPr lang="pt-BR" dirty="0"/>
-              <a:t>Compradores:</a:t>
-            </a:r>
-          </a:p>
-          <a:p>
-            <a:pPr marL="800100" lvl="1" indent="-342900" algn="just">
-              <a:lnSpc>
-                <a:spcPct val="150000"/>
-              </a:lnSpc>
-              <a:buFont typeface="Symbol" panose="05050102010706020507" pitchFamily="18" charset="2"/>
-              <a:buChar char="·"/>
-            </a:pPr>
-            <a:r>
-              <a:rPr lang="pt-PT" dirty="0"/>
-              <a:t>Realização de encomendas</a:t>
-            </a:r>
-          </a:p>
-          <a:p>
-            <a:pPr marL="800100" lvl="1" indent="-342900" algn="just">
-              <a:lnSpc>
-                <a:spcPct val="150000"/>
-              </a:lnSpc>
-              <a:buFont typeface="Symbol" panose="05050102010706020507" pitchFamily="18" charset="2"/>
-              <a:buChar char="·"/>
-            </a:pPr>
-            <a:r>
-              <a:rPr lang="pt-PT" dirty="0"/>
-              <a:t>Classificação de produtos</a:t>
-            </a:r>
-          </a:p>
-          <a:p>
-            <a:pPr marL="800100" lvl="1" indent="-342900" algn="just">
-              <a:lnSpc>
-                <a:spcPct val="150000"/>
-              </a:lnSpc>
-              <a:buFont typeface="Symbol" panose="05050102010706020507" pitchFamily="18" charset="2"/>
-              <a:buChar char="·"/>
-            </a:pPr>
-            <a:r>
-              <a:rPr lang="pt-PT" dirty="0"/>
-              <a:t>Publicação de comentários sobre produtos em </a:t>
-            </a:r>
-            <a:r>
-              <a:rPr lang="pt-PT" i="1" dirty="0" err="1"/>
-              <a:t>threads</a:t>
-            </a:r>
-            <a:endParaRPr lang="pt-PT" i="1" dirty="0"/>
-          </a:p>
-          <a:p>
-            <a:pPr marL="800100" lvl="1" indent="-342900" algn="just">
-              <a:lnSpc>
-                <a:spcPct val="150000"/>
-              </a:lnSpc>
-              <a:buFont typeface="Symbol" panose="05050102010706020507" pitchFamily="18" charset="2"/>
-              <a:buChar char="·"/>
-            </a:pPr>
-            <a:r>
-              <a:rPr lang="pt-PT" dirty="0"/>
-              <a:t>Participação em campanhas promocionais</a:t>
-            </a:r>
-          </a:p>
-        </p:txBody>
-      </p:sp>
-    </p:spTree>
-    <p:extLst>
-      <p:ext uri="{BB962C8B-B14F-4D97-AF65-F5344CB8AC3E}">
-        <p14:creationId xmlns:p14="http://schemas.microsoft.com/office/powerpoint/2010/main" val="1456460978"/>
-      </p:ext>
-    </p:extLst>
-  </p:cSld>
-  <p:clrMapOvr>
-    <a:masterClrMapping/>
-  </p:clrMapOvr>
-</p:sld>
-</file>
-
-<file path=ppt/slides/slide4.xml><?xml version="1.0" encoding="utf-8"?>
-<p:sld xmlns:a="http://schemas.openxmlformats.org/drawingml/2006/main" xmlns:r="http://schemas.openxmlformats.org/officeDocument/2006/relationships" xmlns:p="http://schemas.openxmlformats.org/presentationml/2006/main" showMasterSp="0">
-  <p:cSld>
-    <p:bg>
-      <p:bgPr>
-        <a:blipFill dpi="0" rotWithShape="1">
-          <a:blip r:embed="rId3">
-            <a:lum/>
-          </a:blip>
-          <a:srcRect/>
-          <a:stretch>
-            <a:fillRect/>
-          </a:stretch>
-        </a:blipFill>
-        <a:effectLst/>
-      </p:bgPr>
-    </p:bg>
-    <p:spTree>
-      <p:nvGrpSpPr>
-        <p:cNvPr id="1" name=""/>
-        <p:cNvGrpSpPr/>
-        <p:nvPr/>
-      </p:nvGrpSpPr>
-      <p:grpSpPr>
-        <a:xfrm>
-          <a:off x="0" y="0"/>
-          <a:ext cx="0" cy="0"/>
-          <a:chOff x="0" y="0"/>
-          <a:chExt cx="0" cy="0"/>
-        </a:xfrm>
-      </p:grpSpPr>
-      <p:sp>
-        <p:nvSpPr>
-          <p:cNvPr id="23" name="CaixaDeTexto 22">
-            <a:extLst>
-              <a:ext uri="{FF2B5EF4-FFF2-40B4-BE49-F238E27FC236}">
-                <a16:creationId xmlns:a16="http://schemas.microsoft.com/office/drawing/2014/main" id="{845C2358-F6D8-4F0B-978D-5361D0830CCA}"/>
-              </a:ext>
-            </a:extLst>
-          </p:cNvPr>
-          <p:cNvSpPr txBox="1"/>
-          <p:nvPr/>
-        </p:nvSpPr>
-        <p:spPr>
-          <a:xfrm>
-            <a:off x="34472" y="524663"/>
-            <a:ext cx="10962000" cy="584775"/>
-          </a:xfrm>
-          <a:prstGeom prst="rect">
-            <a:avLst/>
-          </a:prstGeom>
-          <a:noFill/>
-        </p:spPr>
-        <p:txBody>
-          <a:bodyPr wrap="square">
-            <a:spAutoFit/>
-          </a:bodyPr>
-          <a:lstStyle/>
-          <a:p>
-            <a:pPr algn="ctr"/>
-            <a:r>
-              <a:rPr lang="pt-PT" sz="3200" b="1" dirty="0" err="1">
-                <a:solidFill>
-                  <a:srgbClr val="0071A4"/>
-                </a:solidFill>
-                <a:latin typeface="+mj-lt"/>
-                <a:ea typeface="SimSun" panose="02010600030101010101" pitchFamily="2" charset="-122"/>
-              </a:rPr>
-              <a:t>Title</a:t>
-            </a:r>
-            <a:endParaRPr lang="pt-PT" sz="3200" b="1" dirty="0">
-              <a:solidFill>
-                <a:srgbClr val="0071A4"/>
-              </a:solidFill>
-              <a:latin typeface="+mj-lt"/>
-            </a:endParaRPr>
-          </a:p>
-        </p:txBody>
-      </p:sp>
-      <p:graphicFrame>
-        <p:nvGraphicFramePr>
-          <p:cNvPr id="2" name="Diagram 1">
-            <a:extLst>
-              <a:ext uri="{FF2B5EF4-FFF2-40B4-BE49-F238E27FC236}">
-                <a16:creationId xmlns:a16="http://schemas.microsoft.com/office/drawing/2014/main" id="{6FD7EE68-48AE-44B2-88A6-5C1BFD1E0270}"/>
-              </a:ext>
-            </a:extLst>
-          </p:cNvPr>
-          <p:cNvGraphicFramePr/>
-          <p:nvPr>
-            <p:extLst>
-              <p:ext uri="{D42A27DB-BD31-4B8C-83A1-F6EECF244321}">
-                <p14:modId xmlns:p14="http://schemas.microsoft.com/office/powerpoint/2010/main" val="2690841278"/>
-              </p:ext>
-            </p:extLst>
-          </p:nvPr>
-        </p:nvGraphicFramePr>
-        <p:xfrm>
-          <a:off x="447040" y="1198880"/>
-          <a:ext cx="10637520" cy="5447453"/>
-        </p:xfrm>
-        <a:graphic>
-          <a:graphicData uri="http://schemas.openxmlformats.org/drawingml/2006/diagram">
-            <dgm:relIds xmlns:dgm="http://schemas.openxmlformats.org/drawingml/2006/diagram" xmlns:r="http://schemas.openxmlformats.org/officeDocument/2006/relationships" r:dm="rId4" r:lo="rId5" r:qs="rId6" r:cs="rId7"/>
-          </a:graphicData>
-        </a:graphic>
-      </p:graphicFrame>
-    </p:spTree>
-    <p:extLst>
-      <p:ext uri="{BB962C8B-B14F-4D97-AF65-F5344CB8AC3E}">
-        <p14:creationId xmlns:p14="http://schemas.microsoft.com/office/powerpoint/2010/main" val="88355269"/>
-      </p:ext>
-    </p:extLst>
-  </p:cSld>
-  <p:clrMapOvr>
-    <a:masterClrMapping/>
-  </p:clrMapOvr>
-</p:sld>
-</file>
-
-<file path=ppt/slides/slide5.xml><?xml version="1.0" encoding="utf-8"?>
+<file path=ppt/slides/slide10.xml><?xml version="1.0" encoding="utf-8"?>
 <p:sld xmlns:a="http://schemas.openxmlformats.org/drawingml/2006/main" xmlns:r="http://schemas.openxmlformats.org/officeDocument/2006/relationships" xmlns:p="http://schemas.openxmlformats.org/presentationml/2006/main" showMasterSp="0">
   <p:cSld>
     <p:bg>
@@ -18470,6 +17847,1036 @@
     <p:extLst>
       <p:ext uri="{BB962C8B-B14F-4D97-AF65-F5344CB8AC3E}">
         <p14:creationId xmlns:p14="http://schemas.microsoft.com/office/powerpoint/2010/main" val="2858407676"/>
+      </p:ext>
+    </p:extLst>
+  </p:cSld>
+  <p:clrMapOvr>
+    <a:masterClrMapping/>
+  </p:clrMapOvr>
+</p:sld>
+</file>
+
+<file path=ppt/slides/slide2.xml><?xml version="1.0" encoding="utf-8"?>
+<p:sld xmlns:a="http://schemas.openxmlformats.org/drawingml/2006/main" xmlns:r="http://schemas.openxmlformats.org/officeDocument/2006/relationships" xmlns:p="http://schemas.openxmlformats.org/presentationml/2006/main" showMasterSp="0">
+  <p:cSld>
+    <p:bg>
+      <p:bgPr>
+        <a:blipFill dpi="0" rotWithShape="1">
+          <a:blip r:embed="rId3">
+            <a:lum/>
+          </a:blip>
+          <a:srcRect/>
+          <a:stretch>
+            <a:fillRect/>
+          </a:stretch>
+        </a:blipFill>
+        <a:effectLst/>
+      </p:bgPr>
+    </p:bg>
+    <p:spTree>
+      <p:nvGrpSpPr>
+        <p:cNvPr id="1" name=""/>
+        <p:cNvGrpSpPr/>
+        <p:nvPr/>
+      </p:nvGrpSpPr>
+      <p:grpSpPr>
+        <a:xfrm>
+          <a:off x="0" y="0"/>
+          <a:ext cx="0" cy="0"/>
+          <a:chOff x="0" y="0"/>
+          <a:chExt cx="0" cy="0"/>
+        </a:xfrm>
+      </p:grpSpPr>
+      <p:sp>
+        <p:nvSpPr>
+          <p:cNvPr id="4" name="CaixaDeTexto 3">
+            <a:extLst>
+              <a:ext uri="{FF2B5EF4-FFF2-40B4-BE49-F238E27FC236}">
+                <a16:creationId xmlns:a16="http://schemas.microsoft.com/office/drawing/2014/main" id="{7C38E510-A5B6-4E52-BDF7-108E4B220321}"/>
+              </a:ext>
+            </a:extLst>
+          </p:cNvPr>
+          <p:cNvSpPr txBox="1"/>
+          <p:nvPr/>
+        </p:nvSpPr>
+        <p:spPr>
+          <a:xfrm>
+            <a:off x="615043" y="524663"/>
+            <a:ext cx="10961914" cy="584775"/>
+          </a:xfrm>
+          <a:prstGeom prst="rect">
+            <a:avLst/>
+          </a:prstGeom>
+          <a:noFill/>
+        </p:spPr>
+        <p:txBody>
+          <a:bodyPr wrap="square">
+            <a:spAutoFit/>
+          </a:bodyPr>
+          <a:lstStyle/>
+          <a:p>
+            <a:pPr algn="ctr"/>
+            <a:r>
+              <a:rPr lang="pt-PT" sz="3200" b="1" dirty="0">
+                <a:solidFill>
+                  <a:srgbClr val="0071A4"/>
+                </a:solidFill>
+                <a:latin typeface="+mj-lt"/>
+                <a:ea typeface="SimSun" panose="02010600030101010101" pitchFamily="2" charset="-122"/>
+              </a:rPr>
+              <a:t>Índice</a:t>
+            </a:r>
+            <a:endParaRPr lang="pt-PT" sz="3200" b="1" dirty="0">
+              <a:solidFill>
+                <a:srgbClr val="0071A4"/>
+              </a:solidFill>
+              <a:latin typeface="+mj-lt"/>
+            </a:endParaRPr>
+          </a:p>
+        </p:txBody>
+      </p:sp>
+      <p:sp>
+        <p:nvSpPr>
+          <p:cNvPr id="5" name="CaixaDeTexto 4">
+            <a:extLst>
+              <a:ext uri="{FF2B5EF4-FFF2-40B4-BE49-F238E27FC236}">
+                <a16:creationId xmlns:a16="http://schemas.microsoft.com/office/drawing/2014/main" id="{CDA88A9F-3B51-4A59-9FAB-D80C9DA31784}"/>
+              </a:ext>
+            </a:extLst>
+          </p:cNvPr>
+          <p:cNvSpPr txBox="1"/>
+          <p:nvPr/>
+        </p:nvSpPr>
+        <p:spPr>
+          <a:xfrm>
+            <a:off x="1045028" y="1795251"/>
+            <a:ext cx="10101944" cy="4456476"/>
+          </a:xfrm>
+          <a:prstGeom prst="rect">
+            <a:avLst/>
+          </a:prstGeom>
+          <a:noFill/>
+        </p:spPr>
+        <p:txBody>
+          <a:bodyPr wrap="square" rtlCol="0">
+            <a:spAutoFit/>
+          </a:bodyPr>
+          <a:lstStyle/>
+          <a:p>
+            <a:pPr marL="342900" indent="-342900" algn="just">
+              <a:lnSpc>
+                <a:spcPct val="150000"/>
+              </a:lnSpc>
+              <a:buFont typeface="Symbol" panose="05050102010706020507" pitchFamily="18" charset="2"/>
+              <a:buChar char="·"/>
+            </a:pPr>
+            <a:r>
+              <a:rPr lang="pt-BR" sz="2400" dirty="0"/>
+              <a:t>Introdução</a:t>
+            </a:r>
+          </a:p>
+          <a:p>
+            <a:pPr marL="342900" indent="-342900" algn="just">
+              <a:lnSpc>
+                <a:spcPct val="150000"/>
+              </a:lnSpc>
+              <a:buFont typeface="Symbol" panose="05050102010706020507" pitchFamily="18" charset="2"/>
+              <a:buChar char="·"/>
+            </a:pPr>
+            <a:r>
+              <a:rPr lang="pt-BR" sz="2400" dirty="0"/>
+              <a:t>Operações da base de dados</a:t>
+            </a:r>
+            <a:endParaRPr lang="pt-PT" sz="2400" dirty="0"/>
+          </a:p>
+          <a:p>
+            <a:pPr marL="342900" indent="-342900" algn="just">
+              <a:lnSpc>
+                <a:spcPct val="150000"/>
+              </a:lnSpc>
+              <a:buFont typeface="Symbol" panose="05050102010706020507" pitchFamily="18" charset="2"/>
+              <a:buChar char="·"/>
+            </a:pPr>
+            <a:r>
+              <a:rPr lang="pt-PT" sz="2400" dirty="0"/>
+              <a:t>Transações</a:t>
+            </a:r>
+          </a:p>
+          <a:p>
+            <a:pPr marL="342900" indent="-342900" algn="just">
+              <a:lnSpc>
+                <a:spcPct val="150000"/>
+              </a:lnSpc>
+              <a:buFont typeface="Symbol" panose="05050102010706020507" pitchFamily="18" charset="2"/>
+              <a:buChar char="·"/>
+            </a:pPr>
+            <a:r>
+              <a:rPr lang="pt-PT" sz="2400" dirty="0">
+                <a:solidFill>
+                  <a:srgbClr val="FF0000"/>
+                </a:solidFill>
+              </a:rPr>
+              <a:t>Potenciais conflitos de concorrência</a:t>
+            </a:r>
+          </a:p>
+          <a:p>
+            <a:pPr marL="342900" indent="-342900" algn="just">
+              <a:lnSpc>
+                <a:spcPct val="150000"/>
+              </a:lnSpc>
+              <a:buFont typeface="Symbol" panose="05050102010706020507" pitchFamily="18" charset="2"/>
+              <a:buChar char="·"/>
+            </a:pPr>
+            <a:r>
+              <a:rPr lang="pt-PT" sz="2400" dirty="0"/>
+              <a:t>Tecnologias a implementar</a:t>
+            </a:r>
+          </a:p>
+          <a:p>
+            <a:pPr marL="342900" indent="-342900" algn="just">
+              <a:lnSpc>
+                <a:spcPct val="150000"/>
+              </a:lnSpc>
+              <a:buFont typeface="Symbol" panose="05050102010706020507" pitchFamily="18" charset="2"/>
+              <a:buChar char="·"/>
+            </a:pPr>
+            <a:r>
+              <a:rPr lang="pt-PT" sz="2400" dirty="0"/>
+              <a:t>Plano de desenvolvimento</a:t>
+            </a:r>
+          </a:p>
+          <a:p>
+            <a:pPr marL="342900" indent="-342900" algn="just">
+              <a:lnSpc>
+                <a:spcPct val="150000"/>
+              </a:lnSpc>
+              <a:buFont typeface="Symbol" panose="05050102010706020507" pitchFamily="18" charset="2"/>
+              <a:buChar char="·"/>
+            </a:pPr>
+            <a:r>
+              <a:rPr lang="pt-PT" sz="2400" dirty="0"/>
+              <a:t>Diagramas</a:t>
+            </a:r>
+          </a:p>
+          <a:p>
+            <a:pPr marL="342900" indent="-342900" algn="just">
+              <a:lnSpc>
+                <a:spcPct val="150000"/>
+              </a:lnSpc>
+              <a:buFont typeface="Symbol" panose="05050102010706020507" pitchFamily="18" charset="2"/>
+              <a:buChar char="·"/>
+            </a:pPr>
+            <a:r>
+              <a:rPr lang="pt-PT" sz="2400" dirty="0"/>
+              <a:t>Conclusão</a:t>
+            </a:r>
+            <a:endParaRPr lang="pt-PT" sz="2000" dirty="0"/>
+          </a:p>
+        </p:txBody>
+      </p:sp>
+    </p:spTree>
+    <p:extLst>
+      <p:ext uri="{BB962C8B-B14F-4D97-AF65-F5344CB8AC3E}">
+        <p14:creationId xmlns:p14="http://schemas.microsoft.com/office/powerpoint/2010/main" val="718284460"/>
+      </p:ext>
+    </p:extLst>
+  </p:cSld>
+  <p:clrMapOvr>
+    <a:masterClrMapping/>
+  </p:clrMapOvr>
+</p:sld>
+</file>
+
+<file path=ppt/slides/slide3.xml><?xml version="1.0" encoding="utf-8"?>
+<p:sld xmlns:a="http://schemas.openxmlformats.org/drawingml/2006/main" xmlns:r="http://schemas.openxmlformats.org/officeDocument/2006/relationships" xmlns:p="http://schemas.openxmlformats.org/presentationml/2006/main" showMasterSp="0">
+  <p:cSld>
+    <p:bg>
+      <p:bgPr>
+        <a:blipFill dpi="0" rotWithShape="1">
+          <a:blip r:embed="rId3">
+            <a:lum/>
+          </a:blip>
+          <a:srcRect/>
+          <a:stretch>
+            <a:fillRect/>
+          </a:stretch>
+        </a:blipFill>
+        <a:effectLst/>
+      </p:bgPr>
+    </p:bg>
+    <p:spTree>
+      <p:nvGrpSpPr>
+        <p:cNvPr id="1" name=""/>
+        <p:cNvGrpSpPr/>
+        <p:nvPr/>
+      </p:nvGrpSpPr>
+      <p:grpSpPr>
+        <a:xfrm>
+          <a:off x="0" y="0"/>
+          <a:ext cx="0" cy="0"/>
+          <a:chOff x="0" y="0"/>
+          <a:chExt cx="0" cy="0"/>
+        </a:xfrm>
+      </p:grpSpPr>
+      <p:sp>
+        <p:nvSpPr>
+          <p:cNvPr id="4" name="CaixaDeTexto 3">
+            <a:extLst>
+              <a:ext uri="{FF2B5EF4-FFF2-40B4-BE49-F238E27FC236}">
+                <a16:creationId xmlns:a16="http://schemas.microsoft.com/office/drawing/2014/main" id="{7C38E510-A5B6-4E52-BDF7-108E4B220321}"/>
+              </a:ext>
+            </a:extLst>
+          </p:cNvPr>
+          <p:cNvSpPr txBox="1"/>
+          <p:nvPr/>
+        </p:nvSpPr>
+        <p:spPr>
+          <a:xfrm>
+            <a:off x="615043" y="348200"/>
+            <a:ext cx="10961914" cy="584775"/>
+          </a:xfrm>
+          <a:prstGeom prst="rect">
+            <a:avLst/>
+          </a:prstGeom>
+          <a:noFill/>
+        </p:spPr>
+        <p:txBody>
+          <a:bodyPr wrap="square">
+            <a:spAutoFit/>
+          </a:bodyPr>
+          <a:lstStyle/>
+          <a:p>
+            <a:pPr algn="ctr"/>
+            <a:r>
+              <a:rPr lang="pt-PT" sz="3200" b="1" dirty="0">
+                <a:solidFill>
+                  <a:srgbClr val="0071A4"/>
+                </a:solidFill>
+                <a:latin typeface="+mj-lt"/>
+                <a:ea typeface="SimSun" panose="02010600030101010101" pitchFamily="2" charset="-122"/>
+              </a:rPr>
+              <a:t>Introdução </a:t>
+            </a:r>
+            <a:r>
+              <a:rPr lang="pt-PT" sz="3200" b="1" dirty="0">
+                <a:solidFill>
+                  <a:srgbClr val="FF0000"/>
+                </a:solidFill>
+                <a:latin typeface="+mj-lt"/>
+                <a:ea typeface="SimSun" panose="02010600030101010101" pitchFamily="2" charset="-122"/>
+              </a:rPr>
+              <a:t>(TÓPICOS)</a:t>
+            </a:r>
+            <a:endParaRPr lang="pt-PT" sz="3200" b="1" dirty="0">
+              <a:solidFill>
+                <a:srgbClr val="FF0000"/>
+              </a:solidFill>
+              <a:latin typeface="+mj-lt"/>
+            </a:endParaRPr>
+          </a:p>
+        </p:txBody>
+      </p:sp>
+      <p:sp>
+        <p:nvSpPr>
+          <p:cNvPr id="5" name="CaixaDeTexto 4">
+            <a:extLst>
+              <a:ext uri="{FF2B5EF4-FFF2-40B4-BE49-F238E27FC236}">
+                <a16:creationId xmlns:a16="http://schemas.microsoft.com/office/drawing/2014/main" id="{CDA88A9F-3B51-4A59-9FAB-D80C9DA31784}"/>
+              </a:ext>
+            </a:extLst>
+          </p:cNvPr>
+          <p:cNvSpPr txBox="1"/>
+          <p:nvPr/>
+        </p:nvSpPr>
+        <p:spPr>
+          <a:xfrm>
+            <a:off x="615043" y="2796584"/>
+            <a:ext cx="10101944" cy="1686487"/>
+          </a:xfrm>
+          <a:prstGeom prst="rect">
+            <a:avLst/>
+          </a:prstGeom>
+          <a:noFill/>
+        </p:spPr>
+        <p:txBody>
+          <a:bodyPr wrap="square" rtlCol="0">
+            <a:spAutoFit/>
+          </a:bodyPr>
+          <a:lstStyle/>
+          <a:p>
+            <a:pPr marL="342900" indent="-342900" algn="just">
+              <a:lnSpc>
+                <a:spcPct val="150000"/>
+              </a:lnSpc>
+              <a:buFont typeface="Symbol" panose="05050102010706020507" pitchFamily="18" charset="2"/>
+              <a:buChar char="·"/>
+            </a:pPr>
+            <a:r>
+              <a:rPr lang="pt-PT" sz="2400" dirty="0"/>
+              <a:t>Este projeto tem como objetivo desenvolver um sistema simplificado de venda de produtos eletrónicos online assente num DBMS transacional relacional.</a:t>
+            </a:r>
+          </a:p>
+        </p:txBody>
+      </p:sp>
+    </p:spTree>
+    <p:extLst>
+      <p:ext uri="{BB962C8B-B14F-4D97-AF65-F5344CB8AC3E}">
+        <p14:creationId xmlns:p14="http://schemas.microsoft.com/office/powerpoint/2010/main" val="1456460978"/>
+      </p:ext>
+    </p:extLst>
+  </p:cSld>
+  <p:clrMapOvr>
+    <a:masterClrMapping/>
+  </p:clrMapOvr>
+</p:sld>
+</file>
+
+<file path=ppt/slides/slide4.xml><?xml version="1.0" encoding="utf-8"?>
+<p:sld xmlns:a="http://schemas.openxmlformats.org/drawingml/2006/main" xmlns:r="http://schemas.openxmlformats.org/officeDocument/2006/relationships" xmlns:p="http://schemas.openxmlformats.org/presentationml/2006/main" showMasterSp="0">
+  <p:cSld>
+    <p:bg>
+      <p:bgPr>
+        <a:blipFill dpi="0" rotWithShape="1">
+          <a:blip r:embed="rId3">
+            <a:lum/>
+          </a:blip>
+          <a:srcRect/>
+          <a:stretch>
+            <a:fillRect/>
+          </a:stretch>
+        </a:blipFill>
+        <a:effectLst/>
+      </p:bgPr>
+    </p:bg>
+    <p:spTree>
+      <p:nvGrpSpPr>
+        <p:cNvPr id="1" name=""/>
+        <p:cNvGrpSpPr/>
+        <p:nvPr/>
+      </p:nvGrpSpPr>
+      <p:grpSpPr>
+        <a:xfrm>
+          <a:off x="0" y="0"/>
+          <a:ext cx="0" cy="0"/>
+          <a:chOff x="0" y="0"/>
+          <a:chExt cx="0" cy="0"/>
+        </a:xfrm>
+      </p:grpSpPr>
+      <p:sp>
+        <p:nvSpPr>
+          <p:cNvPr id="23" name="CaixaDeTexto 22">
+            <a:extLst>
+              <a:ext uri="{FF2B5EF4-FFF2-40B4-BE49-F238E27FC236}">
+                <a16:creationId xmlns:a16="http://schemas.microsoft.com/office/drawing/2014/main" id="{845C2358-F6D8-4F0B-978D-5361D0830CCA}"/>
+              </a:ext>
+            </a:extLst>
+          </p:cNvPr>
+          <p:cNvSpPr txBox="1"/>
+          <p:nvPr/>
+        </p:nvSpPr>
+        <p:spPr>
+          <a:xfrm>
+            <a:off x="590445" y="294226"/>
+            <a:ext cx="10729595" cy="707886"/>
+          </a:xfrm>
+          <a:prstGeom prst="rect">
+            <a:avLst/>
+          </a:prstGeom>
+          <a:noFill/>
+        </p:spPr>
+        <p:txBody>
+          <a:bodyPr wrap="square">
+            <a:spAutoFit/>
+          </a:bodyPr>
+          <a:lstStyle/>
+          <a:p>
+            <a:r>
+              <a:rPr lang="pt-PT" sz="2000" dirty="0"/>
+              <a:t>A plataforma é acedida por três tipos de utilizadores com acesso a diferentes funcionalidades:</a:t>
+            </a:r>
+            <a:endParaRPr lang="pt-PT" sz="2000" b="1" dirty="0">
+              <a:solidFill>
+                <a:srgbClr val="0071A4"/>
+              </a:solidFill>
+              <a:latin typeface="+mj-lt"/>
+            </a:endParaRPr>
+          </a:p>
+        </p:txBody>
+      </p:sp>
+      <p:graphicFrame>
+        <p:nvGraphicFramePr>
+          <p:cNvPr id="2" name="Diagram 1">
+            <a:extLst>
+              <a:ext uri="{FF2B5EF4-FFF2-40B4-BE49-F238E27FC236}">
+                <a16:creationId xmlns:a16="http://schemas.microsoft.com/office/drawing/2014/main" id="{6FD7EE68-48AE-44B2-88A6-5C1BFD1E0270}"/>
+              </a:ext>
+            </a:extLst>
+          </p:cNvPr>
+          <p:cNvGraphicFramePr/>
+          <p:nvPr>
+            <p:extLst>
+              <p:ext uri="{D42A27DB-BD31-4B8C-83A1-F6EECF244321}">
+                <p14:modId xmlns:p14="http://schemas.microsoft.com/office/powerpoint/2010/main" val="4098697610"/>
+              </p:ext>
+            </p:extLst>
+          </p:nvPr>
+        </p:nvGraphicFramePr>
+        <p:xfrm>
+          <a:off x="358952" y="1198881"/>
+          <a:ext cx="10637520" cy="5447453"/>
+        </p:xfrm>
+        <a:graphic>
+          <a:graphicData uri="http://schemas.openxmlformats.org/drawingml/2006/diagram">
+            <dgm:relIds xmlns:dgm="http://schemas.openxmlformats.org/drawingml/2006/diagram" xmlns:r="http://schemas.openxmlformats.org/officeDocument/2006/relationships" r:dm="rId4" r:lo="rId5" r:qs="rId6" r:cs="rId7"/>
+          </a:graphicData>
+        </a:graphic>
+      </p:graphicFrame>
+    </p:spTree>
+    <p:extLst>
+      <p:ext uri="{BB962C8B-B14F-4D97-AF65-F5344CB8AC3E}">
+        <p14:creationId xmlns:p14="http://schemas.microsoft.com/office/powerpoint/2010/main" val="88355269"/>
+      </p:ext>
+    </p:extLst>
+  </p:cSld>
+  <p:clrMapOvr>
+    <a:masterClrMapping/>
+  </p:clrMapOvr>
+</p:sld>
+</file>
+
+<file path=ppt/slides/slide5.xml><?xml version="1.0" encoding="utf-8"?>
+<p:sld xmlns:a="http://schemas.openxmlformats.org/drawingml/2006/main" xmlns:r="http://schemas.openxmlformats.org/officeDocument/2006/relationships" xmlns:p="http://schemas.openxmlformats.org/presentationml/2006/main" showMasterSp="0">
+  <p:cSld>
+    <p:bg>
+      <p:bgPr>
+        <a:blipFill dpi="0" rotWithShape="1">
+          <a:blip r:embed="rId3">
+            <a:lum/>
+          </a:blip>
+          <a:srcRect/>
+          <a:stretch>
+            <a:fillRect/>
+          </a:stretch>
+        </a:blipFill>
+        <a:effectLst/>
+      </p:bgPr>
+    </p:bg>
+    <p:spTree>
+      <p:nvGrpSpPr>
+        <p:cNvPr id="1" name=""/>
+        <p:cNvGrpSpPr/>
+        <p:nvPr/>
+      </p:nvGrpSpPr>
+      <p:grpSpPr>
+        <a:xfrm>
+          <a:off x="0" y="0"/>
+          <a:ext cx="0" cy="0"/>
+          <a:chOff x="0" y="0"/>
+          <a:chExt cx="0" cy="0"/>
+        </a:xfrm>
+      </p:grpSpPr>
+      <p:sp>
+        <p:nvSpPr>
+          <p:cNvPr id="5" name="CaixaDeTexto 3">
+            <a:extLst>
+              <a:ext uri="{FF2B5EF4-FFF2-40B4-BE49-F238E27FC236}">
+                <a16:creationId xmlns:a16="http://schemas.microsoft.com/office/drawing/2014/main" id="{7E22DD34-571B-4FEA-80BA-9A2299573EC6}"/>
+              </a:ext>
+            </a:extLst>
+          </p:cNvPr>
+          <p:cNvSpPr txBox="1"/>
+          <p:nvPr/>
+        </p:nvSpPr>
+        <p:spPr>
+          <a:xfrm>
+            <a:off x="615043" y="524663"/>
+            <a:ext cx="10961914" cy="584775"/>
+          </a:xfrm>
+          <a:prstGeom prst="rect">
+            <a:avLst/>
+          </a:prstGeom>
+          <a:noFill/>
+        </p:spPr>
+        <p:txBody>
+          <a:bodyPr wrap="square">
+            <a:spAutoFit/>
+          </a:bodyPr>
+          <a:lstStyle/>
+          <a:p>
+            <a:pPr algn="ctr"/>
+            <a:r>
+              <a:rPr lang="pt-PT" sz="3200" b="1" dirty="0">
+                <a:solidFill>
+                  <a:srgbClr val="0071A4"/>
+                </a:solidFill>
+                <a:latin typeface="+mj-lt"/>
+                <a:ea typeface="SimSun" panose="02010600030101010101" pitchFamily="2" charset="-122"/>
+              </a:rPr>
+              <a:t>Operações da base de dados</a:t>
+            </a:r>
+            <a:endParaRPr lang="pt-PT" sz="3200" b="1" dirty="0">
+              <a:solidFill>
+                <a:srgbClr val="0071A4"/>
+              </a:solidFill>
+              <a:latin typeface="+mj-lt"/>
+            </a:endParaRPr>
+          </a:p>
+        </p:txBody>
+      </p:sp>
+    </p:spTree>
+    <p:extLst>
+      <p:ext uri="{BB962C8B-B14F-4D97-AF65-F5344CB8AC3E}">
+        <p14:creationId xmlns:p14="http://schemas.microsoft.com/office/powerpoint/2010/main" val="2030627380"/>
+      </p:ext>
+    </p:extLst>
+  </p:cSld>
+  <p:clrMapOvr>
+    <a:masterClrMapping/>
+  </p:clrMapOvr>
+</p:sld>
+</file>
+
+<file path=ppt/slides/slide6.xml><?xml version="1.0" encoding="utf-8"?>
+<p:sld xmlns:a="http://schemas.openxmlformats.org/drawingml/2006/main" xmlns:r="http://schemas.openxmlformats.org/officeDocument/2006/relationships" xmlns:p="http://schemas.openxmlformats.org/presentationml/2006/main" showMasterSp="0">
+  <p:cSld>
+    <p:bg>
+      <p:bgPr>
+        <a:blipFill dpi="0" rotWithShape="1">
+          <a:blip r:embed="rId3">
+            <a:lum/>
+          </a:blip>
+          <a:srcRect/>
+          <a:stretch>
+            <a:fillRect/>
+          </a:stretch>
+        </a:blipFill>
+        <a:effectLst/>
+      </p:bgPr>
+    </p:bg>
+    <p:spTree>
+      <p:nvGrpSpPr>
+        <p:cNvPr id="1" name=""/>
+        <p:cNvGrpSpPr/>
+        <p:nvPr/>
+      </p:nvGrpSpPr>
+      <p:grpSpPr>
+        <a:xfrm>
+          <a:off x="0" y="0"/>
+          <a:ext cx="0" cy="0"/>
+          <a:chOff x="0" y="0"/>
+          <a:chExt cx="0" cy="0"/>
+        </a:xfrm>
+      </p:grpSpPr>
+      <p:sp>
+        <p:nvSpPr>
+          <p:cNvPr id="5" name="CaixaDeTexto 3">
+            <a:extLst>
+              <a:ext uri="{FF2B5EF4-FFF2-40B4-BE49-F238E27FC236}">
+                <a16:creationId xmlns:a16="http://schemas.microsoft.com/office/drawing/2014/main" id="{7E22DD34-571B-4FEA-80BA-9A2299573EC6}"/>
+              </a:ext>
+            </a:extLst>
+          </p:cNvPr>
+          <p:cNvSpPr txBox="1"/>
+          <p:nvPr/>
+        </p:nvSpPr>
+        <p:spPr>
+          <a:xfrm>
+            <a:off x="615043" y="524663"/>
+            <a:ext cx="10961914" cy="584775"/>
+          </a:xfrm>
+          <a:prstGeom prst="rect">
+            <a:avLst/>
+          </a:prstGeom>
+          <a:noFill/>
+        </p:spPr>
+        <p:txBody>
+          <a:bodyPr wrap="square">
+            <a:spAutoFit/>
+          </a:bodyPr>
+          <a:lstStyle/>
+          <a:p>
+            <a:pPr algn="ctr"/>
+            <a:r>
+              <a:rPr lang="pt-PT" sz="3200" b="1" dirty="0">
+                <a:solidFill>
+                  <a:srgbClr val="0071A4"/>
+                </a:solidFill>
+                <a:latin typeface="+mj-lt"/>
+                <a:ea typeface="SimSun" panose="02010600030101010101" pitchFamily="2" charset="-122"/>
+              </a:rPr>
+              <a:t>Transações</a:t>
+            </a:r>
+            <a:endParaRPr lang="pt-PT" sz="3200" b="1" dirty="0">
+              <a:solidFill>
+                <a:srgbClr val="0071A4"/>
+              </a:solidFill>
+              <a:latin typeface="+mj-lt"/>
+            </a:endParaRPr>
+          </a:p>
+        </p:txBody>
+      </p:sp>
+    </p:spTree>
+    <p:extLst>
+      <p:ext uri="{BB962C8B-B14F-4D97-AF65-F5344CB8AC3E}">
+        <p14:creationId xmlns:p14="http://schemas.microsoft.com/office/powerpoint/2010/main" val="2040586716"/>
+      </p:ext>
+    </p:extLst>
+  </p:cSld>
+  <p:clrMapOvr>
+    <a:masterClrMapping/>
+  </p:clrMapOvr>
+</p:sld>
+</file>
+
+<file path=ppt/slides/slide7.xml><?xml version="1.0" encoding="utf-8"?>
+<p:sld xmlns:a="http://schemas.openxmlformats.org/drawingml/2006/main" xmlns:r="http://schemas.openxmlformats.org/officeDocument/2006/relationships" xmlns:p="http://schemas.openxmlformats.org/presentationml/2006/main" showMasterSp="0">
+  <p:cSld>
+    <p:bg>
+      <p:bgPr>
+        <a:blipFill dpi="0" rotWithShape="1">
+          <a:blip r:embed="rId3">
+            <a:lum/>
+          </a:blip>
+          <a:srcRect/>
+          <a:stretch>
+            <a:fillRect/>
+          </a:stretch>
+        </a:blipFill>
+        <a:effectLst/>
+      </p:bgPr>
+    </p:bg>
+    <p:spTree>
+      <p:nvGrpSpPr>
+        <p:cNvPr id="1" name=""/>
+        <p:cNvGrpSpPr/>
+        <p:nvPr/>
+      </p:nvGrpSpPr>
+      <p:grpSpPr>
+        <a:xfrm>
+          <a:off x="0" y="0"/>
+          <a:ext cx="0" cy="0"/>
+          <a:chOff x="0" y="0"/>
+          <a:chExt cx="0" cy="0"/>
+        </a:xfrm>
+      </p:grpSpPr>
+      <p:sp>
+        <p:nvSpPr>
+          <p:cNvPr id="5" name="CaixaDeTexto 3">
+            <a:extLst>
+              <a:ext uri="{FF2B5EF4-FFF2-40B4-BE49-F238E27FC236}">
+                <a16:creationId xmlns:a16="http://schemas.microsoft.com/office/drawing/2014/main" id="{7E22DD34-571B-4FEA-80BA-9A2299573EC6}"/>
+              </a:ext>
+            </a:extLst>
+          </p:cNvPr>
+          <p:cNvSpPr txBox="1"/>
+          <p:nvPr/>
+        </p:nvSpPr>
+        <p:spPr>
+          <a:xfrm>
+            <a:off x="615043" y="524663"/>
+            <a:ext cx="10961914" cy="584775"/>
+          </a:xfrm>
+          <a:prstGeom prst="rect">
+            <a:avLst/>
+          </a:prstGeom>
+          <a:noFill/>
+        </p:spPr>
+        <p:txBody>
+          <a:bodyPr wrap="square">
+            <a:spAutoFit/>
+          </a:bodyPr>
+          <a:lstStyle/>
+          <a:p>
+            <a:pPr algn="ctr"/>
+            <a:r>
+              <a:rPr lang="pt-PT" sz="3200" b="1" dirty="0">
+                <a:solidFill>
+                  <a:srgbClr val="0071A4"/>
+                </a:solidFill>
+                <a:latin typeface="+mj-lt"/>
+                <a:ea typeface="SimSun" panose="02010600030101010101" pitchFamily="2" charset="-122"/>
+              </a:rPr>
+              <a:t>Potenciais conflitos de concorrência</a:t>
+            </a:r>
+            <a:endParaRPr lang="pt-PT" sz="3200" b="1" dirty="0">
+              <a:solidFill>
+                <a:srgbClr val="0071A4"/>
+              </a:solidFill>
+              <a:latin typeface="+mj-lt"/>
+            </a:endParaRPr>
+          </a:p>
+        </p:txBody>
+      </p:sp>
+    </p:spTree>
+    <p:extLst>
+      <p:ext uri="{BB962C8B-B14F-4D97-AF65-F5344CB8AC3E}">
+        <p14:creationId xmlns:p14="http://schemas.microsoft.com/office/powerpoint/2010/main" val="3739239423"/>
+      </p:ext>
+    </p:extLst>
+  </p:cSld>
+  <p:clrMapOvr>
+    <a:masterClrMapping/>
+  </p:clrMapOvr>
+</p:sld>
+</file>
+
+<file path=ppt/slides/slide8.xml><?xml version="1.0" encoding="utf-8"?>
+<p:sld xmlns:a="http://schemas.openxmlformats.org/drawingml/2006/main" xmlns:r="http://schemas.openxmlformats.org/officeDocument/2006/relationships" xmlns:p="http://schemas.openxmlformats.org/presentationml/2006/main" showMasterSp="0">
+  <p:cSld>
+    <p:bg>
+      <p:bgPr>
+        <a:blipFill dpi="0" rotWithShape="1">
+          <a:blip r:embed="rId3">
+            <a:lum/>
+          </a:blip>
+          <a:srcRect/>
+          <a:stretch>
+            <a:fillRect/>
+          </a:stretch>
+        </a:blipFill>
+        <a:effectLst/>
+      </p:bgPr>
+    </p:bg>
+    <p:spTree>
+      <p:nvGrpSpPr>
+        <p:cNvPr id="1" name=""/>
+        <p:cNvGrpSpPr/>
+        <p:nvPr/>
+      </p:nvGrpSpPr>
+      <p:grpSpPr>
+        <a:xfrm>
+          <a:off x="0" y="0"/>
+          <a:ext cx="0" cy="0"/>
+          <a:chOff x="0" y="0"/>
+          <a:chExt cx="0" cy="0"/>
+        </a:xfrm>
+      </p:grpSpPr>
+      <p:sp>
+        <p:nvSpPr>
+          <p:cNvPr id="5" name="CaixaDeTexto 3">
+            <a:extLst>
+              <a:ext uri="{FF2B5EF4-FFF2-40B4-BE49-F238E27FC236}">
+                <a16:creationId xmlns:a16="http://schemas.microsoft.com/office/drawing/2014/main" id="{7E22DD34-571B-4FEA-80BA-9A2299573EC6}"/>
+              </a:ext>
+            </a:extLst>
+          </p:cNvPr>
+          <p:cNvSpPr txBox="1"/>
+          <p:nvPr/>
+        </p:nvSpPr>
+        <p:spPr>
+          <a:xfrm>
+            <a:off x="615043" y="524663"/>
+            <a:ext cx="10961914" cy="584775"/>
+          </a:xfrm>
+          <a:prstGeom prst="rect">
+            <a:avLst/>
+          </a:prstGeom>
+          <a:noFill/>
+        </p:spPr>
+        <p:txBody>
+          <a:bodyPr wrap="square">
+            <a:spAutoFit/>
+          </a:bodyPr>
+          <a:lstStyle/>
+          <a:p>
+            <a:pPr algn="ctr"/>
+            <a:r>
+              <a:rPr lang="pt-PT" sz="3200" b="1" dirty="0">
+                <a:solidFill>
+                  <a:srgbClr val="0071A4"/>
+                </a:solidFill>
+                <a:latin typeface="+mj-lt"/>
+                <a:ea typeface="SimSun" panose="02010600030101010101" pitchFamily="2" charset="-122"/>
+              </a:rPr>
+              <a:t>Tecnologias a implementar</a:t>
+            </a:r>
+            <a:endParaRPr lang="pt-PT" sz="3200" b="1" dirty="0">
+              <a:solidFill>
+                <a:srgbClr val="0071A4"/>
+              </a:solidFill>
+              <a:latin typeface="+mj-lt"/>
+            </a:endParaRPr>
+          </a:p>
+        </p:txBody>
+      </p:sp>
+      <p:sp>
+        <p:nvSpPr>
+          <p:cNvPr id="4" name="CaixaDeTexto 4">
+            <a:extLst>
+              <a:ext uri="{FF2B5EF4-FFF2-40B4-BE49-F238E27FC236}">
+                <a16:creationId xmlns:a16="http://schemas.microsoft.com/office/drawing/2014/main" id="{831B997D-B222-4F43-AC4D-24D1769BC0E3}"/>
+              </a:ext>
+            </a:extLst>
+          </p:cNvPr>
+          <p:cNvSpPr txBox="1"/>
+          <p:nvPr/>
+        </p:nvSpPr>
+        <p:spPr>
+          <a:xfrm>
+            <a:off x="1045028" y="1795251"/>
+            <a:ext cx="10101944" cy="2240485"/>
+          </a:xfrm>
+          <a:prstGeom prst="rect">
+            <a:avLst/>
+          </a:prstGeom>
+          <a:noFill/>
+        </p:spPr>
+        <p:txBody>
+          <a:bodyPr wrap="square" rtlCol="0">
+            <a:spAutoFit/>
+          </a:bodyPr>
+          <a:lstStyle/>
+          <a:p>
+            <a:pPr marL="342900" indent="-342900" algn="just">
+              <a:lnSpc>
+                <a:spcPct val="150000"/>
+              </a:lnSpc>
+              <a:buFont typeface="Symbol" panose="05050102010706020507" pitchFamily="18" charset="2"/>
+              <a:buChar char="·"/>
+            </a:pPr>
+            <a:r>
+              <a:rPr lang="en-CA" sz="2400" dirty="0"/>
+              <a:t>Python</a:t>
+            </a:r>
+          </a:p>
+          <a:p>
+            <a:pPr marL="800100" lvl="1" indent="-342900" algn="just">
+              <a:lnSpc>
+                <a:spcPct val="150000"/>
+              </a:lnSpc>
+              <a:buFont typeface="Symbol" panose="05050102010706020507" pitchFamily="18" charset="2"/>
+              <a:buChar char="·"/>
+            </a:pPr>
+            <a:r>
+              <a:rPr lang="en-CA" sz="2400" dirty="0"/>
+              <a:t>flask</a:t>
+            </a:r>
+          </a:p>
+          <a:p>
+            <a:pPr marL="800100" lvl="1" indent="-342900" algn="just">
+              <a:lnSpc>
+                <a:spcPct val="150000"/>
+              </a:lnSpc>
+              <a:buFont typeface="Symbol" panose="05050102010706020507" pitchFamily="18" charset="2"/>
+              <a:buChar char="·"/>
+            </a:pPr>
+            <a:r>
+              <a:rPr lang="en-CA" sz="2400" dirty="0"/>
+              <a:t>psycopg2</a:t>
+            </a:r>
+          </a:p>
+          <a:p>
+            <a:pPr marL="342900" indent="-342900" algn="just">
+              <a:lnSpc>
+                <a:spcPct val="150000"/>
+              </a:lnSpc>
+              <a:buFont typeface="Symbol" panose="05050102010706020507" pitchFamily="18" charset="2"/>
+              <a:buChar char="·"/>
+            </a:pPr>
+            <a:r>
+              <a:rPr lang="en-CA" sz="2400" dirty="0"/>
+              <a:t>PostgreSQL</a:t>
+            </a:r>
+            <a:endParaRPr lang="pt-PT" sz="2000" dirty="0"/>
+          </a:p>
+        </p:txBody>
+      </p:sp>
+    </p:spTree>
+    <p:extLst>
+      <p:ext uri="{BB962C8B-B14F-4D97-AF65-F5344CB8AC3E}">
+        <p14:creationId xmlns:p14="http://schemas.microsoft.com/office/powerpoint/2010/main" val="842232488"/>
+      </p:ext>
+    </p:extLst>
+  </p:cSld>
+  <p:clrMapOvr>
+    <a:masterClrMapping/>
+  </p:clrMapOvr>
+</p:sld>
+</file>
+
+<file path=ppt/slides/slide9.xml><?xml version="1.0" encoding="utf-8"?>
+<p:sld xmlns:a="http://schemas.openxmlformats.org/drawingml/2006/main" xmlns:r="http://schemas.openxmlformats.org/officeDocument/2006/relationships" xmlns:p="http://schemas.openxmlformats.org/presentationml/2006/main" showMasterSp="0">
+  <p:cSld>
+    <p:bg>
+      <p:bgPr>
+        <a:blipFill dpi="0" rotWithShape="1">
+          <a:blip r:embed="rId3">
+            <a:lum/>
+          </a:blip>
+          <a:srcRect/>
+          <a:stretch>
+            <a:fillRect/>
+          </a:stretch>
+        </a:blipFill>
+        <a:effectLst/>
+      </p:bgPr>
+    </p:bg>
+    <p:spTree>
+      <p:nvGrpSpPr>
+        <p:cNvPr id="1" name=""/>
+        <p:cNvGrpSpPr/>
+        <p:nvPr/>
+      </p:nvGrpSpPr>
+      <p:grpSpPr>
+        <a:xfrm>
+          <a:off x="0" y="0"/>
+          <a:ext cx="0" cy="0"/>
+          <a:chOff x="0" y="0"/>
+          <a:chExt cx="0" cy="0"/>
+        </a:xfrm>
+      </p:grpSpPr>
+      <p:sp>
+        <p:nvSpPr>
+          <p:cNvPr id="5" name="CaixaDeTexto 3">
+            <a:extLst>
+              <a:ext uri="{FF2B5EF4-FFF2-40B4-BE49-F238E27FC236}">
+                <a16:creationId xmlns:a16="http://schemas.microsoft.com/office/drawing/2014/main" id="{7E22DD34-571B-4FEA-80BA-9A2299573EC6}"/>
+              </a:ext>
+            </a:extLst>
+          </p:cNvPr>
+          <p:cNvSpPr txBox="1"/>
+          <p:nvPr/>
+        </p:nvSpPr>
+        <p:spPr>
+          <a:xfrm>
+            <a:off x="615043" y="524663"/>
+            <a:ext cx="10961914" cy="584775"/>
+          </a:xfrm>
+          <a:prstGeom prst="rect">
+            <a:avLst/>
+          </a:prstGeom>
+          <a:noFill/>
+        </p:spPr>
+        <p:txBody>
+          <a:bodyPr wrap="square">
+            <a:spAutoFit/>
+          </a:bodyPr>
+          <a:lstStyle/>
+          <a:p>
+            <a:pPr algn="ctr"/>
+            <a:r>
+              <a:rPr lang="pt-PT" sz="3200" b="1" dirty="0">
+                <a:solidFill>
+                  <a:srgbClr val="0071A4"/>
+                </a:solidFill>
+                <a:latin typeface="+mj-lt"/>
+                <a:ea typeface="SimSun" panose="02010600030101010101" pitchFamily="2" charset="-122"/>
+              </a:rPr>
+              <a:t>Plano de desenvolvimento</a:t>
+            </a:r>
+            <a:endParaRPr lang="pt-PT" sz="3200" b="1" dirty="0">
+              <a:solidFill>
+                <a:srgbClr val="0071A4"/>
+              </a:solidFill>
+              <a:latin typeface="+mj-lt"/>
+            </a:endParaRPr>
+          </a:p>
+        </p:txBody>
+      </p:sp>
+    </p:spTree>
+    <p:extLst>
+      <p:ext uri="{BB962C8B-B14F-4D97-AF65-F5344CB8AC3E}">
+        <p14:creationId xmlns:p14="http://schemas.microsoft.com/office/powerpoint/2010/main" val="2420974392"/>
       </p:ext>
     </p:extLst>
   </p:cSld>

</xml_diff>

<commit_message>
Operações, transações e conflitos de concorrência
</commit_message>
<xml_diff>
--- a/Apresentação.pptx
+++ b/Apresentação.pptx
@@ -16945,7 +16945,7 @@
             <a:fld id="{F5A39829-0E07-418E-823C-101154A9FFCB}" type="datetime1">
               <a:rPr lang="pt-PT" smtClean="0"/>
               <a:pPr lvl="0"/>
-              <a:t>24/03/2022</a:t>
+              <a:t>25/03/2022</a:t>
             </a:fld>
             <a:endParaRPr lang="pt-PT"/>
           </a:p>
@@ -17200,7 +17200,7 @@
             <a:fld id="{F5A39829-0E07-418E-823C-101154A9FFCB}" type="datetime1">
               <a:rPr lang="pt-PT" smtClean="0"/>
               <a:pPr lvl="0"/>
-              <a:t>24/03/2022</a:t>
+              <a:t>25/03/2022</a:t>
             </a:fld>
             <a:endParaRPr lang="pt-PT"/>
           </a:p>
@@ -17518,7 +17518,7 @@
             <a:fld id="{F5A39829-0E07-418E-823C-101154A9FFCB}" type="datetime1">
               <a:rPr lang="pt-PT" smtClean="0"/>
               <a:pPr lvl="0"/>
-              <a:t>24/03/2022</a:t>
+              <a:t>25/03/2022</a:t>
             </a:fld>
             <a:endParaRPr lang="pt-PT"/>
           </a:p>
@@ -17855,7 +17855,7 @@
             <a:fld id="{F5A39829-0E07-418E-823C-101154A9FFCB}" type="datetime1">
               <a:rPr lang="pt-PT" smtClean="0"/>
               <a:pPr lvl="0"/>
-              <a:t>24/03/2022</a:t>
+              <a:t>25/03/2022</a:t>
             </a:fld>
             <a:endParaRPr lang="pt-PT"/>
           </a:p>
@@ -18173,7 +18173,7 @@
             <a:fld id="{F5A39829-0E07-418E-823C-101154A9FFCB}" type="datetime1">
               <a:rPr lang="pt-PT" smtClean="0"/>
               <a:pPr lvl="0"/>
-              <a:t>24/03/2022</a:t>
+              <a:t>25/03/2022</a:t>
             </a:fld>
             <a:endParaRPr lang="pt-PT"/>
           </a:p>
@@ -18570,7 +18570,7 @@
             <a:fld id="{F5A39829-0E07-418E-823C-101154A9FFCB}" type="datetime1">
               <a:rPr lang="pt-PT" smtClean="0"/>
               <a:pPr lvl="0"/>
-              <a:t>24/03/2022</a:t>
+              <a:t>25/03/2022</a:t>
             </a:fld>
             <a:endParaRPr lang="pt-PT"/>
           </a:p>
@@ -18744,7 +18744,7 @@
             <a:fld id="{F5A39829-0E07-418E-823C-101154A9FFCB}" type="datetime1">
               <a:rPr lang="pt-PT" smtClean="0"/>
               <a:pPr lvl="0"/>
-              <a:t>24/03/2022</a:t>
+              <a:t>25/03/2022</a:t>
             </a:fld>
             <a:endParaRPr lang="pt-PT"/>
           </a:p>
@@ -18928,7 +18928,7 @@
             <a:fld id="{F5A39829-0E07-418E-823C-101154A9FFCB}" type="datetime1">
               <a:rPr lang="pt-PT" smtClean="0"/>
               <a:pPr lvl="0"/>
-              <a:t>24/03/2022</a:t>
+              <a:t>25/03/2022</a:t>
             </a:fld>
             <a:endParaRPr lang="pt-PT"/>
           </a:p>
@@ -19102,7 +19102,7 @@
             <a:fld id="{F5A39829-0E07-418E-823C-101154A9FFCB}" type="datetime1">
               <a:rPr lang="pt-PT" smtClean="0"/>
               <a:pPr lvl="0"/>
-              <a:t>24/03/2022</a:t>
+              <a:t>25/03/2022</a:t>
             </a:fld>
             <a:endParaRPr lang="pt-PT"/>
           </a:p>
@@ -19353,7 +19353,7 @@
             <a:fld id="{F5A39829-0E07-418E-823C-101154A9FFCB}" type="datetime1">
               <a:rPr lang="pt-PT" smtClean="0"/>
               <a:pPr lvl="0"/>
-              <a:t>24/03/2022</a:t>
+              <a:t>25/03/2022</a:t>
             </a:fld>
             <a:endParaRPr lang="pt-PT"/>
           </a:p>
@@ -19589,7 +19589,7 @@
             <a:fld id="{F5A39829-0E07-418E-823C-101154A9FFCB}" type="datetime1">
               <a:rPr lang="pt-PT" smtClean="0"/>
               <a:pPr lvl="0"/>
-              <a:t>24/03/2022</a:t>
+              <a:t>25/03/2022</a:t>
             </a:fld>
             <a:endParaRPr lang="pt-PT"/>
           </a:p>
@@ -19967,7 +19967,7 @@
             <a:fld id="{F5A39829-0E07-418E-823C-101154A9FFCB}" type="datetime1">
               <a:rPr lang="pt-PT" smtClean="0"/>
               <a:pPr lvl="0"/>
-              <a:t>24/03/2022</a:t>
+              <a:t>25/03/2022</a:t>
             </a:fld>
             <a:endParaRPr lang="pt-PT"/>
           </a:p>
@@ -20094,7 +20094,7 @@
             <a:fld id="{F5A39829-0E07-418E-823C-101154A9FFCB}" type="datetime1">
               <a:rPr lang="pt-PT" smtClean="0"/>
               <a:pPr lvl="0"/>
-              <a:t>24/03/2022</a:t>
+              <a:t>25/03/2022</a:t>
             </a:fld>
             <a:endParaRPr lang="pt-PT"/>
           </a:p>
@@ -20193,7 +20193,7 @@
             <a:fld id="{F5A39829-0E07-418E-823C-101154A9FFCB}" type="datetime1">
               <a:rPr lang="pt-PT" smtClean="0"/>
               <a:pPr lvl="0"/>
-              <a:t>24/03/2022</a:t>
+              <a:t>25/03/2022</a:t>
             </a:fld>
             <a:endParaRPr lang="pt-PT"/>
           </a:p>
@@ -20452,7 +20452,7 @@
             <a:fld id="{F5A39829-0E07-418E-823C-101154A9FFCB}" type="datetime1">
               <a:rPr lang="pt-PT" smtClean="0"/>
               <a:pPr lvl="0"/>
-              <a:t>24/03/2022</a:t>
+              <a:t>25/03/2022</a:t>
             </a:fld>
             <a:endParaRPr lang="pt-PT"/>
           </a:p>
@@ -20763,7 +20763,7 @@
             <a:fld id="{F5A39829-0E07-418E-823C-101154A9FFCB}" type="datetime1">
               <a:rPr lang="pt-PT" smtClean="0"/>
               <a:pPr lvl="0"/>
-              <a:t>24/03/2022</a:t>
+              <a:t>25/03/2022</a:t>
             </a:fld>
             <a:endParaRPr lang="pt-PT"/>
           </a:p>
@@ -21467,7 +21467,7 @@
             <a:fld id="{F5A39829-0E07-418E-823C-101154A9FFCB}" type="datetime1">
               <a:rPr lang="pt-PT" smtClean="0"/>
               <a:pPr lvl="0"/>
-              <a:t>24/03/2022</a:t>
+              <a:t>25/03/2022</a:t>
             </a:fld>
             <a:endParaRPr lang="pt-PT"/>
           </a:p>
@@ -22001,784 +22001,6 @@
           <a:chExt cx="0" cy="0"/>
         </a:xfrm>
       </p:grpSpPr>
-      <p:sp>
-        <p:nvSpPr>
-          <p:cNvPr id="8" name="Rectangle 7">
-            <a:extLst>
-              <a:ext uri="{FF2B5EF4-FFF2-40B4-BE49-F238E27FC236}">
-                <a16:creationId xmlns:a16="http://schemas.microsoft.com/office/drawing/2014/main" id="{03E8462A-FEBA-4848-81CC-3F8DA3E477BE}"/>
-              </a:ext>
-              <a:ext uri="{C183D7F6-B498-43B3-948B-1728B52AA6E4}">
-                <adec:decorative xmlns:adec="http://schemas.microsoft.com/office/drawing/2017/decorative" val="1"/>
-              </a:ext>
-            </a:extLst>
-          </p:cNvPr>
-          <p:cNvSpPr>
-            <a:spLocks noGrp="1" noRot="1" noChangeAspect="1" noMove="1" noResize="1" noEditPoints="1" noAdjustHandles="1" noChangeArrowheads="1" noChangeShapeType="1" noTextEdit="1"/>
-          </p:cNvSpPr>
-          <p:nvPr>
-            <p:extLst>
-              <p:ext uri="{386F3935-93C4-4BCD-93E2-E3B085C9AB24}">
-                <p16:designElem xmlns:p16="http://schemas.microsoft.com/office/powerpoint/2015/main" val="1"/>
-              </p:ext>
-            </p:extLst>
-          </p:nvPr>
-        </p:nvSpPr>
-        <p:spPr>
-          <a:xfrm>
-            <a:off x="0" y="0"/>
-            <a:ext cx="12188952" cy="6858000"/>
-          </a:xfrm>
-          <a:prstGeom prst="rect">
-            <a:avLst/>
-          </a:prstGeom>
-          <a:solidFill>
-            <a:schemeClr val="accent2"/>
-          </a:solidFill>
-          <a:ln>
-            <a:noFill/>
-          </a:ln>
-        </p:spPr>
-        <p:style>
-          <a:lnRef idx="2">
-            <a:schemeClr val="accent1">
-              <a:shade val="50000"/>
-            </a:schemeClr>
-          </a:lnRef>
-          <a:fillRef idx="1">
-            <a:schemeClr val="accent1"/>
-          </a:fillRef>
-          <a:effectRef idx="0">
-            <a:schemeClr val="accent1"/>
-          </a:effectRef>
-          <a:fontRef idx="minor">
-            <a:schemeClr val="lt1"/>
-          </a:fontRef>
-        </p:style>
-        <p:txBody>
-          <a:bodyPr rtlCol="0" anchor="ctr"/>
-          <a:lstStyle/>
-          <a:p>
-            <a:pPr algn="ctr"/>
-            <a:endParaRPr lang="en-US" dirty="0"/>
-          </a:p>
-        </p:txBody>
-      </p:sp>
-      <p:grpSp>
-        <p:nvGrpSpPr>
-          <p:cNvPr id="10" name="Group 9">
-            <a:extLst>
-              <a:ext uri="{FF2B5EF4-FFF2-40B4-BE49-F238E27FC236}">
-                <a16:creationId xmlns:a16="http://schemas.microsoft.com/office/drawing/2014/main" id="{2109F83F-40FE-4DB3-84CC-09FB3340D06D}"/>
-              </a:ext>
-              <a:ext uri="{C183D7F6-B498-43B3-948B-1728B52AA6E4}">
-                <adec:decorative xmlns:adec="http://schemas.microsoft.com/office/drawing/2017/decorative" val="1"/>
-              </a:ext>
-            </a:extLst>
-          </p:cNvPr>
-          <p:cNvGrpSpPr>
-            <a:grpSpLocks noGrp="1" noUngrp="1" noRot="1" noChangeAspect="1" noMove="1" noResize="1"/>
-          </p:cNvGrpSpPr>
-          <p:nvPr>
-            <p:extLst>
-              <p:ext uri="{386F3935-93C4-4BCD-93E2-E3B085C9AB24}">
-                <p16:designElem xmlns:p16="http://schemas.microsoft.com/office/powerpoint/2015/main" val="1"/>
-              </p:ext>
-            </p:extLst>
-          </p:nvPr>
-        </p:nvGrpSpPr>
-        <p:grpSpPr>
-          <a:xfrm>
-            <a:off x="0" y="-8467"/>
-            <a:ext cx="12192000" cy="6866467"/>
-            <a:chOff x="0" y="-8467"/>
-            <a:chExt cx="12192000" cy="6866467"/>
-          </a:xfrm>
-        </p:grpSpPr>
-        <p:cxnSp>
-          <p:nvCxnSpPr>
-            <p:cNvPr id="11" name="Straight Connector 10">
-              <a:extLst>
-                <a:ext uri="{FF2B5EF4-FFF2-40B4-BE49-F238E27FC236}">
-                  <a16:creationId xmlns:a16="http://schemas.microsoft.com/office/drawing/2014/main" id="{1DE492D7-C3C3-48FF-80C8-37021EA0262F}"/>
-                </a:ext>
-                <a:ext uri="{C183D7F6-B498-43B3-948B-1728B52AA6E4}">
-                  <adec:decorative xmlns:adec="http://schemas.microsoft.com/office/drawing/2017/decorative" val="1"/>
-                </a:ext>
-              </a:extLst>
-            </p:cNvPr>
-            <p:cNvCxnSpPr/>
-            <p:nvPr>
-              <p:extLst>
-                <p:ext uri="{386F3935-93C4-4BCD-93E2-E3B085C9AB24}">
-                  <p16:designElem xmlns:p16="http://schemas.microsoft.com/office/powerpoint/2015/main" val="1"/>
-                </p:ext>
-              </p:extLst>
-            </p:nvPr>
-          </p:nvCxnSpPr>
-          <p:spPr>
-            <a:xfrm flipH="1">
-              <a:off x="7425267" y="3681413"/>
-              <a:ext cx="4763558" cy="3176587"/>
-            </a:xfrm>
-            <a:prstGeom prst="line">
-              <a:avLst/>
-            </a:prstGeom>
-            <a:ln w="9525">
-              <a:solidFill>
-                <a:schemeClr val="bg1">
-                  <a:lumMod val="85000"/>
-                </a:schemeClr>
-              </a:solidFill>
-            </a:ln>
-          </p:spPr>
-          <p:style>
-            <a:lnRef idx="2">
-              <a:schemeClr val="accent1"/>
-            </a:lnRef>
-            <a:fillRef idx="0">
-              <a:schemeClr val="accent1"/>
-            </a:fillRef>
-            <a:effectRef idx="1">
-              <a:schemeClr val="accent1"/>
-            </a:effectRef>
-            <a:fontRef idx="minor">
-              <a:schemeClr val="tx1"/>
-            </a:fontRef>
-          </p:style>
-        </p:cxnSp>
-        <p:sp>
-          <p:nvSpPr>
-            <p:cNvPr id="12" name="Rectangle 23">
-              <a:extLst>
-                <a:ext uri="{FF2B5EF4-FFF2-40B4-BE49-F238E27FC236}">
-                  <a16:creationId xmlns:a16="http://schemas.microsoft.com/office/drawing/2014/main" id="{0B30FF97-2E9A-490A-AED2-90BA2E0EC17F}"/>
-                </a:ext>
-                <a:ext uri="{C183D7F6-B498-43B3-948B-1728B52AA6E4}">
-                  <adec:decorative xmlns:adec="http://schemas.microsoft.com/office/drawing/2017/decorative" val="1"/>
-                </a:ext>
-              </a:extLst>
-            </p:cNvPr>
-            <p:cNvSpPr/>
-            <p:nvPr>
-              <p:extLst>
-                <p:ext uri="{386F3935-93C4-4BCD-93E2-E3B085C9AB24}">
-                  <p16:designElem xmlns:p16="http://schemas.microsoft.com/office/powerpoint/2015/main" val="1"/>
-                </p:ext>
-              </p:extLst>
-            </p:nvPr>
-          </p:nvSpPr>
-          <p:spPr>
-            <a:xfrm>
-              <a:off x="9181476" y="-8467"/>
-              <a:ext cx="3007349" cy="6866467"/>
-            </a:xfrm>
-            <a:custGeom>
-              <a:avLst/>
-              <a:gdLst/>
-              <a:ahLst/>
-              <a:cxnLst/>
-              <a:rect l="l" t="t" r="r" b="b"/>
-              <a:pathLst>
-                <a:path w="3007349" h="6866467">
-                  <a:moveTo>
-                    <a:pt x="2045532" y="0"/>
-                  </a:moveTo>
-                  <a:lnTo>
-                    <a:pt x="3007349" y="0"/>
-                  </a:lnTo>
-                  <a:lnTo>
-                    <a:pt x="3007349" y="6866467"/>
-                  </a:lnTo>
-                  <a:lnTo>
-                    <a:pt x="0" y="6866467"/>
-                  </a:lnTo>
-                  <a:lnTo>
-                    <a:pt x="2045532" y="0"/>
-                  </a:lnTo>
-                  <a:close/>
-                </a:path>
-              </a:pathLst>
-            </a:custGeom>
-            <a:solidFill>
-              <a:schemeClr val="accent1">
-                <a:alpha val="30000"/>
-              </a:schemeClr>
-            </a:solidFill>
-            <a:ln>
-              <a:noFill/>
-            </a:ln>
-            <a:effectLst/>
-          </p:spPr>
-          <p:style>
-            <a:lnRef idx="1">
-              <a:schemeClr val="accent1"/>
-            </a:lnRef>
-            <a:fillRef idx="3">
-              <a:schemeClr val="accent1"/>
-            </a:fillRef>
-            <a:effectRef idx="2">
-              <a:schemeClr val="accent1"/>
-            </a:effectRef>
-            <a:fontRef idx="minor">
-              <a:schemeClr val="lt1"/>
-            </a:fontRef>
-          </p:style>
-        </p:sp>
-        <p:sp>
-          <p:nvSpPr>
-            <p:cNvPr id="13" name="Rectangle 25">
-              <a:extLst>
-                <a:ext uri="{FF2B5EF4-FFF2-40B4-BE49-F238E27FC236}">
-                  <a16:creationId xmlns:a16="http://schemas.microsoft.com/office/drawing/2014/main" id="{B6D53C7D-A312-47B6-A66A-230A19CFACA6}"/>
-                </a:ext>
-                <a:ext uri="{C183D7F6-B498-43B3-948B-1728B52AA6E4}">
-                  <adec:decorative xmlns:adec="http://schemas.microsoft.com/office/drawing/2017/decorative" val="1"/>
-                </a:ext>
-              </a:extLst>
-            </p:cNvPr>
-            <p:cNvSpPr/>
-            <p:nvPr>
-              <p:extLst>
-                <p:ext uri="{386F3935-93C4-4BCD-93E2-E3B085C9AB24}">
-                  <p16:designElem xmlns:p16="http://schemas.microsoft.com/office/powerpoint/2015/main" val="1"/>
-                </p:ext>
-              </p:extLst>
-            </p:nvPr>
-          </p:nvSpPr>
-          <p:spPr>
-            <a:xfrm>
-              <a:off x="9603442" y="-8467"/>
-              <a:ext cx="2588558" cy="6866467"/>
-            </a:xfrm>
-            <a:custGeom>
-              <a:avLst/>
-              <a:gdLst/>
-              <a:ahLst/>
-              <a:cxnLst/>
-              <a:rect l="l" t="t" r="r" b="b"/>
-              <a:pathLst>
-                <a:path w="2573311" h="6866467">
-                  <a:moveTo>
-                    <a:pt x="0" y="0"/>
-                  </a:moveTo>
-                  <a:lnTo>
-                    <a:pt x="2573311" y="0"/>
-                  </a:lnTo>
-                  <a:lnTo>
-                    <a:pt x="2573311" y="6866467"/>
-                  </a:lnTo>
-                  <a:lnTo>
-                    <a:pt x="1202336" y="6866467"/>
-                  </a:lnTo>
-                  <a:lnTo>
-                    <a:pt x="0" y="0"/>
-                  </a:lnTo>
-                  <a:close/>
-                </a:path>
-              </a:pathLst>
-            </a:custGeom>
-            <a:solidFill>
-              <a:schemeClr val="accent1">
-                <a:alpha val="20000"/>
-              </a:schemeClr>
-            </a:solidFill>
-            <a:ln>
-              <a:noFill/>
-            </a:ln>
-            <a:effectLst/>
-          </p:spPr>
-          <p:style>
-            <a:lnRef idx="1">
-              <a:schemeClr val="accent1"/>
-            </a:lnRef>
-            <a:fillRef idx="3">
-              <a:schemeClr val="accent1"/>
-            </a:fillRef>
-            <a:effectRef idx="2">
-              <a:schemeClr val="accent1"/>
-            </a:effectRef>
-            <a:fontRef idx="minor">
-              <a:schemeClr val="lt1"/>
-            </a:fontRef>
-          </p:style>
-        </p:sp>
-        <p:sp>
-          <p:nvSpPr>
-            <p:cNvPr id="14" name="Isosceles Triangle 13">
-              <a:extLst>
-                <a:ext uri="{FF2B5EF4-FFF2-40B4-BE49-F238E27FC236}">
-                  <a16:creationId xmlns:a16="http://schemas.microsoft.com/office/drawing/2014/main" id="{9329D58C-0D2E-4A2B-AD6A-9CEE506784A8}"/>
-                </a:ext>
-                <a:ext uri="{C183D7F6-B498-43B3-948B-1728B52AA6E4}">
-                  <adec:decorative xmlns:adec="http://schemas.microsoft.com/office/drawing/2017/decorative" val="1"/>
-                </a:ext>
-              </a:extLst>
-            </p:cNvPr>
-            <p:cNvSpPr/>
-            <p:nvPr>
-              <p:extLst>
-                <p:ext uri="{386F3935-93C4-4BCD-93E2-E3B085C9AB24}">
-                  <p16:designElem xmlns:p16="http://schemas.microsoft.com/office/powerpoint/2015/main" val="1"/>
-                </p:ext>
-              </p:extLst>
-            </p:nvPr>
-          </p:nvSpPr>
-          <p:spPr>
-            <a:xfrm>
-              <a:off x="8932333" y="3048000"/>
-              <a:ext cx="3259667" cy="3810000"/>
-            </a:xfrm>
-            <a:prstGeom prst="triangle">
-              <a:avLst>
-                <a:gd name="adj" fmla="val 100000"/>
-              </a:avLst>
-            </a:prstGeom>
-            <a:solidFill>
-              <a:schemeClr val="accent2">
-                <a:alpha val="72000"/>
-              </a:schemeClr>
-            </a:solidFill>
-            <a:ln>
-              <a:noFill/>
-            </a:ln>
-            <a:effectLst/>
-          </p:spPr>
-          <p:style>
-            <a:lnRef idx="1">
-              <a:schemeClr val="accent1"/>
-            </a:lnRef>
-            <a:fillRef idx="3">
-              <a:schemeClr val="accent1"/>
-            </a:fillRef>
-            <a:effectRef idx="2">
-              <a:schemeClr val="accent1"/>
-            </a:effectRef>
-            <a:fontRef idx="minor">
-              <a:schemeClr val="lt1"/>
-            </a:fontRef>
-          </p:style>
-        </p:sp>
-        <p:sp>
-          <p:nvSpPr>
-            <p:cNvPr id="15" name="Rectangle 27">
-              <a:extLst>
-                <a:ext uri="{FF2B5EF4-FFF2-40B4-BE49-F238E27FC236}">
-                  <a16:creationId xmlns:a16="http://schemas.microsoft.com/office/drawing/2014/main" id="{9D446EDE-C690-4461-8BF2-7634808FC8B4}"/>
-                </a:ext>
-                <a:ext uri="{C183D7F6-B498-43B3-948B-1728B52AA6E4}">
-                  <adec:decorative xmlns:adec="http://schemas.microsoft.com/office/drawing/2017/decorative" val="1"/>
-                </a:ext>
-              </a:extLst>
-            </p:cNvPr>
-            <p:cNvSpPr/>
-            <p:nvPr>
-              <p:extLst>
-                <p:ext uri="{386F3935-93C4-4BCD-93E2-E3B085C9AB24}">
-                  <p16:designElem xmlns:p16="http://schemas.microsoft.com/office/powerpoint/2015/main" val="1"/>
-                </p:ext>
-              </p:extLst>
-            </p:nvPr>
-          </p:nvSpPr>
-          <p:spPr>
-            <a:xfrm>
-              <a:off x="9334500" y="-8467"/>
-              <a:ext cx="2854326" cy="6866467"/>
-            </a:xfrm>
-            <a:custGeom>
-              <a:avLst/>
-              <a:gdLst/>
-              <a:ahLst/>
-              <a:cxnLst/>
-              <a:rect l="l" t="t" r="r" b="b"/>
-              <a:pathLst>
-                <a:path w="2858013" h="6866467">
-                  <a:moveTo>
-                    <a:pt x="0" y="0"/>
-                  </a:moveTo>
-                  <a:lnTo>
-                    <a:pt x="2858013" y="0"/>
-                  </a:lnTo>
-                  <a:lnTo>
-                    <a:pt x="2858013" y="6866467"/>
-                  </a:lnTo>
-                  <a:lnTo>
-                    <a:pt x="2473942" y="6866467"/>
-                  </a:lnTo>
-                  <a:lnTo>
-                    <a:pt x="0" y="0"/>
-                  </a:lnTo>
-                  <a:close/>
-                </a:path>
-              </a:pathLst>
-            </a:custGeom>
-            <a:solidFill>
-              <a:schemeClr val="accent2">
-                <a:lumMod val="75000"/>
-                <a:alpha val="70000"/>
-              </a:schemeClr>
-            </a:solidFill>
-            <a:ln>
-              <a:noFill/>
-            </a:ln>
-            <a:effectLst/>
-          </p:spPr>
-          <p:style>
-            <a:lnRef idx="1">
-              <a:schemeClr val="accent1"/>
-            </a:lnRef>
-            <a:fillRef idx="3">
-              <a:schemeClr val="accent1"/>
-            </a:fillRef>
-            <a:effectRef idx="2">
-              <a:schemeClr val="accent1"/>
-            </a:effectRef>
-            <a:fontRef idx="minor">
-              <a:schemeClr val="lt1"/>
-            </a:fontRef>
-          </p:style>
-        </p:sp>
-        <p:sp>
-          <p:nvSpPr>
-            <p:cNvPr id="16" name="Rectangle 28">
-              <a:extLst>
-                <a:ext uri="{FF2B5EF4-FFF2-40B4-BE49-F238E27FC236}">
-                  <a16:creationId xmlns:a16="http://schemas.microsoft.com/office/drawing/2014/main" id="{323F3D34-6531-4AD7-A8C6-195A090281A1}"/>
-                </a:ext>
-                <a:ext uri="{C183D7F6-B498-43B3-948B-1728B52AA6E4}">
-                  <adec:decorative xmlns:adec="http://schemas.microsoft.com/office/drawing/2017/decorative" val="1"/>
-                </a:ext>
-              </a:extLst>
-            </p:cNvPr>
-            <p:cNvSpPr/>
-            <p:nvPr>
-              <p:extLst>
-                <p:ext uri="{386F3935-93C4-4BCD-93E2-E3B085C9AB24}">
-                  <p16:designElem xmlns:p16="http://schemas.microsoft.com/office/powerpoint/2015/main" val="1"/>
-                </p:ext>
-              </p:extLst>
-            </p:nvPr>
-          </p:nvSpPr>
-          <p:spPr>
-            <a:xfrm>
-              <a:off x="10898730" y="-8467"/>
-              <a:ext cx="1290094" cy="6866467"/>
-            </a:xfrm>
-            <a:custGeom>
-              <a:avLst/>
-              <a:gdLst/>
-              <a:ahLst/>
-              <a:cxnLst/>
-              <a:rect l="l" t="t" r="r" b="b"/>
-              <a:pathLst>
-                <a:path w="1290094" h="6858000">
-                  <a:moveTo>
-                    <a:pt x="1019735" y="0"/>
-                  </a:moveTo>
-                  <a:lnTo>
-                    <a:pt x="1290094" y="0"/>
-                  </a:lnTo>
-                  <a:lnTo>
-                    <a:pt x="1290094" y="6858000"/>
-                  </a:lnTo>
-                  <a:lnTo>
-                    <a:pt x="0" y="6858000"/>
-                  </a:lnTo>
-                  <a:lnTo>
-                    <a:pt x="1019735" y="0"/>
-                  </a:lnTo>
-                  <a:close/>
-                </a:path>
-              </a:pathLst>
-            </a:custGeom>
-            <a:solidFill>
-              <a:schemeClr val="accent1">
-                <a:lumMod val="60000"/>
-                <a:lumOff val="40000"/>
-                <a:alpha val="70000"/>
-              </a:schemeClr>
-            </a:solidFill>
-            <a:ln>
-              <a:noFill/>
-            </a:ln>
-            <a:effectLst/>
-          </p:spPr>
-          <p:style>
-            <a:lnRef idx="1">
-              <a:schemeClr val="accent1"/>
-            </a:lnRef>
-            <a:fillRef idx="3">
-              <a:schemeClr val="accent1"/>
-            </a:fillRef>
-            <a:effectRef idx="2">
-              <a:schemeClr val="accent1"/>
-            </a:effectRef>
-            <a:fontRef idx="minor">
-              <a:schemeClr val="lt1"/>
-            </a:fontRef>
-          </p:style>
-        </p:sp>
-        <p:sp>
-          <p:nvSpPr>
-            <p:cNvPr id="17" name="Rectangle 29">
-              <a:extLst>
-                <a:ext uri="{FF2B5EF4-FFF2-40B4-BE49-F238E27FC236}">
-                  <a16:creationId xmlns:a16="http://schemas.microsoft.com/office/drawing/2014/main" id="{B9B0AE3F-2350-435F-A9B0-C310BF876385}"/>
-                </a:ext>
-                <a:ext uri="{C183D7F6-B498-43B3-948B-1728B52AA6E4}">
-                  <adec:decorative xmlns:adec="http://schemas.microsoft.com/office/drawing/2017/decorative" val="1"/>
-                </a:ext>
-              </a:extLst>
-            </p:cNvPr>
-            <p:cNvSpPr/>
-            <p:nvPr>
-              <p:extLst>
-                <p:ext uri="{386F3935-93C4-4BCD-93E2-E3B085C9AB24}">
-                  <p16:designElem xmlns:p16="http://schemas.microsoft.com/office/powerpoint/2015/main" val="1"/>
-                </p:ext>
-              </p:extLst>
-            </p:nvPr>
-          </p:nvSpPr>
-          <p:spPr>
-            <a:xfrm>
-              <a:off x="10938999" y="-8467"/>
-              <a:ext cx="1249825" cy="6866467"/>
-            </a:xfrm>
-            <a:custGeom>
-              <a:avLst/>
-              <a:gdLst/>
-              <a:ahLst/>
-              <a:cxnLst/>
-              <a:rect l="l" t="t" r="r" b="b"/>
-              <a:pathLst>
-                <a:path w="1249825" h="6858000">
-                  <a:moveTo>
-                    <a:pt x="0" y="0"/>
-                  </a:moveTo>
-                  <a:lnTo>
-                    <a:pt x="1249825" y="0"/>
-                  </a:lnTo>
-                  <a:lnTo>
-                    <a:pt x="1249825" y="6858000"/>
-                  </a:lnTo>
-                  <a:lnTo>
-                    <a:pt x="1109382" y="6858000"/>
-                  </a:lnTo>
-                  <a:lnTo>
-                    <a:pt x="0" y="0"/>
-                  </a:lnTo>
-                  <a:close/>
-                </a:path>
-              </a:pathLst>
-            </a:custGeom>
-            <a:solidFill>
-              <a:schemeClr val="accent1">
-                <a:alpha val="65000"/>
-              </a:schemeClr>
-            </a:solidFill>
-            <a:ln>
-              <a:noFill/>
-            </a:ln>
-            <a:effectLst/>
-          </p:spPr>
-          <p:style>
-            <a:lnRef idx="1">
-              <a:schemeClr val="accent1"/>
-            </a:lnRef>
-            <a:fillRef idx="3">
-              <a:schemeClr val="accent1"/>
-            </a:fillRef>
-            <a:effectRef idx="2">
-              <a:schemeClr val="accent1"/>
-            </a:effectRef>
-            <a:fontRef idx="minor">
-              <a:schemeClr val="lt1"/>
-            </a:fontRef>
-          </p:style>
-        </p:sp>
-        <p:sp>
-          <p:nvSpPr>
-            <p:cNvPr id="18" name="Isosceles Triangle 17">
-              <a:extLst>
-                <a:ext uri="{FF2B5EF4-FFF2-40B4-BE49-F238E27FC236}">
-                  <a16:creationId xmlns:a16="http://schemas.microsoft.com/office/drawing/2014/main" id="{4EFA655C-9E50-4C14-A89E-AD7B648E4E2B}"/>
-                </a:ext>
-                <a:ext uri="{C183D7F6-B498-43B3-948B-1728B52AA6E4}">
-                  <adec:decorative xmlns:adec="http://schemas.microsoft.com/office/drawing/2017/decorative" val="1"/>
-                </a:ext>
-              </a:extLst>
-            </p:cNvPr>
-            <p:cNvSpPr/>
-            <p:nvPr>
-              <p:extLst>
-                <p:ext uri="{386F3935-93C4-4BCD-93E2-E3B085C9AB24}">
-                  <p16:designElem xmlns:p16="http://schemas.microsoft.com/office/powerpoint/2015/main" val="1"/>
-                </p:ext>
-              </p:extLst>
-            </p:nvPr>
-          </p:nvSpPr>
-          <p:spPr>
-            <a:xfrm>
-              <a:off x="10371666" y="3589867"/>
-              <a:ext cx="1817159" cy="3268133"/>
-            </a:xfrm>
-            <a:prstGeom prst="triangle">
-              <a:avLst>
-                <a:gd name="adj" fmla="val 100000"/>
-              </a:avLst>
-            </a:prstGeom>
-            <a:solidFill>
-              <a:schemeClr val="accent1">
-                <a:alpha val="80000"/>
-              </a:schemeClr>
-            </a:solidFill>
-            <a:ln>
-              <a:noFill/>
-            </a:ln>
-            <a:effectLst/>
-          </p:spPr>
-          <p:style>
-            <a:lnRef idx="1">
-              <a:schemeClr val="accent1"/>
-            </a:lnRef>
-            <a:fillRef idx="3">
-              <a:schemeClr val="accent1"/>
-            </a:fillRef>
-            <a:effectRef idx="2">
-              <a:schemeClr val="accent1"/>
-            </a:effectRef>
-            <a:fontRef idx="minor">
-              <a:schemeClr val="lt1"/>
-            </a:fontRef>
-          </p:style>
-        </p:sp>
-        <p:sp>
-          <p:nvSpPr>
-            <p:cNvPr id="19" name="Isosceles Triangle 18">
-              <a:extLst>
-                <a:ext uri="{FF2B5EF4-FFF2-40B4-BE49-F238E27FC236}">
-                  <a16:creationId xmlns:a16="http://schemas.microsoft.com/office/drawing/2014/main" id="{3E843863-7D25-4C01-9A17-E817CB6D998A}"/>
-                </a:ext>
-                <a:ext uri="{C183D7F6-B498-43B3-948B-1728B52AA6E4}">
-                  <adec:decorative xmlns:adec="http://schemas.microsoft.com/office/drawing/2017/decorative" val="1"/>
-                </a:ext>
-              </a:extLst>
-            </p:cNvPr>
-            <p:cNvSpPr/>
-            <p:nvPr>
-              <p:extLst>
-                <p:ext uri="{386F3935-93C4-4BCD-93E2-E3B085C9AB24}">
-                  <p16:designElem xmlns:p16="http://schemas.microsoft.com/office/powerpoint/2015/main" val="1"/>
-                </p:ext>
-              </p:extLst>
-            </p:nvPr>
-          </p:nvSpPr>
-          <p:spPr>
-            <a:xfrm>
-              <a:off x="0" y="4013200"/>
-              <a:ext cx="448733" cy="2844800"/>
-            </a:xfrm>
-            <a:prstGeom prst="triangle">
-              <a:avLst>
-                <a:gd name="adj" fmla="val 0"/>
-              </a:avLst>
-            </a:prstGeom>
-            <a:solidFill>
-              <a:schemeClr val="accent1">
-                <a:alpha val="85000"/>
-              </a:schemeClr>
-            </a:solidFill>
-            <a:ln>
-              <a:noFill/>
-            </a:ln>
-            <a:effectLst/>
-          </p:spPr>
-          <p:style>
-            <a:lnRef idx="1">
-              <a:schemeClr val="accent1"/>
-            </a:lnRef>
-            <a:fillRef idx="3">
-              <a:schemeClr val="accent1"/>
-            </a:fillRef>
-            <a:effectRef idx="2">
-              <a:schemeClr val="accent1"/>
-            </a:effectRef>
-            <a:fontRef idx="minor">
-              <a:schemeClr val="lt1"/>
-            </a:fontRef>
-          </p:style>
-        </p:sp>
-      </p:grpSp>
-      <p:sp>
-        <p:nvSpPr>
-          <p:cNvPr id="21" name="Rectangle 20">
-            <a:extLst>
-              <a:ext uri="{FF2B5EF4-FFF2-40B4-BE49-F238E27FC236}">
-                <a16:creationId xmlns:a16="http://schemas.microsoft.com/office/drawing/2014/main" id="{7941F9B1-B01B-4A84-89D9-B169AEB4E456}"/>
-              </a:ext>
-              <a:ext uri="{C183D7F6-B498-43B3-948B-1728B52AA6E4}">
-                <adec:decorative xmlns:adec="http://schemas.microsoft.com/office/drawing/2017/decorative" val="1"/>
-              </a:ext>
-            </a:extLst>
-          </p:cNvPr>
-          <p:cNvSpPr>
-            <a:spLocks noGrp="1" noRot="1" noChangeAspect="1" noMove="1" noResize="1" noEditPoints="1" noAdjustHandles="1" noChangeArrowheads="1" noChangeShapeType="1" noTextEdit="1"/>
-          </p:cNvSpPr>
-          <p:nvPr>
-            <p:extLst>
-              <p:ext uri="{386F3935-93C4-4BCD-93E2-E3B085C9AB24}">
-                <p16:designElem xmlns:p16="http://schemas.microsoft.com/office/powerpoint/2015/main" val="1"/>
-              </p:ext>
-            </p:extLst>
-          </p:nvPr>
-        </p:nvSpPr>
-        <p:spPr>
-          <a:xfrm>
-            <a:off x="477012" y="480060"/>
-            <a:ext cx="11237976" cy="5897880"/>
-          </a:xfrm>
-          <a:prstGeom prst="rect">
-            <a:avLst/>
-          </a:prstGeom>
-          <a:solidFill>
-            <a:srgbClr val="FFFFFF"/>
-          </a:solidFill>
-          <a:ln w="9525">
-            <a:noFill/>
-          </a:ln>
-          <a:effectLst>
-            <a:outerShdw blurRad="63500" dist="17780" dir="5400000" algn="t" rotWithShape="0">
-              <a:prstClr val="black">
-                <a:alpha val="43000"/>
-              </a:prstClr>
-            </a:outerShdw>
-          </a:effectLst>
-        </p:spPr>
-        <p:style>
-          <a:lnRef idx="2">
-            <a:schemeClr val="accent1">
-              <a:shade val="50000"/>
-            </a:schemeClr>
-          </a:lnRef>
-          <a:fillRef idx="1">
-            <a:schemeClr val="accent1"/>
-          </a:fillRef>
-          <a:effectRef idx="0">
-            <a:schemeClr val="accent1"/>
-          </a:effectRef>
-          <a:fontRef idx="minor">
-            <a:schemeClr val="lt1"/>
-          </a:fontRef>
-        </p:style>
-        <p:txBody>
-          <a:bodyPr rtlCol="0" anchor="ctr"/>
-          <a:lstStyle/>
-          <a:p>
-            <a:pPr algn="ctr"/>
-            <a:endParaRPr lang="en-US" dirty="0"/>
-          </a:p>
-        </p:txBody>
-      </p:sp>
       <p:pic>
         <p:nvPicPr>
           <p:cNvPr id="20" name="Picture 2">
@@ -24238,6 +23460,511 @@
           </a:p>
         </p:txBody>
       </p:sp>
+      <p:sp>
+        <p:nvSpPr>
+          <p:cNvPr id="2" name="TextBox 1">
+            <a:extLst>
+              <a:ext uri="{FF2B5EF4-FFF2-40B4-BE49-F238E27FC236}">
+                <a16:creationId xmlns:a16="http://schemas.microsoft.com/office/drawing/2014/main" id="{B03B74B2-2EB7-40CD-8F31-B1E6B6FFC248}"/>
+              </a:ext>
+            </a:extLst>
+          </p:cNvPr>
+          <p:cNvSpPr txBox="1"/>
+          <p:nvPr/>
+        </p:nvSpPr>
+        <p:spPr>
+          <a:xfrm>
+            <a:off x="704675" y="1770077"/>
+            <a:ext cx="9697674" cy="3970318"/>
+          </a:xfrm>
+          <a:prstGeom prst="rect">
+            <a:avLst/>
+          </a:prstGeom>
+          <a:noFill/>
+        </p:spPr>
+        <p:txBody>
+          <a:bodyPr wrap="square" rtlCol="0">
+            <a:spAutoFit/>
+          </a:bodyPr>
+          <a:lstStyle/>
+          <a:p>
+            <a:r>
+              <a:rPr lang="en-US" dirty="0"/>
+              <a:t>As </a:t>
+            </a:r>
+            <a:r>
+              <a:rPr lang="en-US" dirty="0" err="1"/>
+              <a:t>principais</a:t>
+            </a:r>
+            <a:r>
+              <a:rPr lang="en-US" dirty="0"/>
+              <a:t> </a:t>
+            </a:r>
+            <a:r>
+              <a:rPr lang="en-US" dirty="0" err="1"/>
+              <a:t>operações</a:t>
+            </a:r>
+            <a:r>
+              <a:rPr lang="en-US" dirty="0"/>
+              <a:t> da base de dados </a:t>
+            </a:r>
+            <a:r>
+              <a:rPr lang="en-US" dirty="0" err="1"/>
+              <a:t>consistem</a:t>
+            </a:r>
+            <a:r>
+              <a:rPr lang="en-US" dirty="0"/>
+              <a:t> </a:t>
+            </a:r>
+            <a:r>
+              <a:rPr lang="en-US" dirty="0" err="1"/>
+              <a:t>em</a:t>
+            </a:r>
+            <a:r>
+              <a:rPr lang="en-US" dirty="0"/>
+              <a:t>:</a:t>
+            </a:r>
+          </a:p>
+          <a:p>
+            <a:pPr marL="285750" indent="-285750">
+              <a:buFont typeface="Arial" panose="020B0604020202020204" pitchFamily="34" charset="0"/>
+              <a:buChar char="•"/>
+            </a:pPr>
+            <a:r>
+              <a:rPr lang="en-US" dirty="0" err="1"/>
+              <a:t>Registo</a:t>
+            </a:r>
+            <a:r>
+              <a:rPr lang="en-US" dirty="0"/>
+              <a:t> de </a:t>
+            </a:r>
+            <a:r>
+              <a:rPr lang="en-US" dirty="0" err="1"/>
+              <a:t>utilizadores</a:t>
+            </a:r>
+            <a:r>
+              <a:rPr lang="en-US" dirty="0"/>
+              <a:t>;</a:t>
+            </a:r>
+          </a:p>
+          <a:p>
+            <a:pPr marL="285750" indent="-285750">
+              <a:buFont typeface="Arial" panose="020B0604020202020204" pitchFamily="34" charset="0"/>
+              <a:buChar char="•"/>
+            </a:pPr>
+            <a:r>
+              <a:rPr lang="en-US" dirty="0" err="1"/>
+              <a:t>Autenticação</a:t>
+            </a:r>
+            <a:r>
+              <a:rPr lang="en-US" dirty="0"/>
+              <a:t> de </a:t>
+            </a:r>
+            <a:r>
+              <a:rPr lang="en-US" dirty="0" err="1"/>
+              <a:t>utilizadores</a:t>
+            </a:r>
+            <a:r>
+              <a:rPr lang="en-US" dirty="0"/>
+              <a:t>;</a:t>
+            </a:r>
+          </a:p>
+          <a:p>
+            <a:pPr marL="285750" indent="-285750">
+              <a:buFont typeface="Arial" panose="020B0604020202020204" pitchFamily="34" charset="0"/>
+              <a:buChar char="•"/>
+            </a:pPr>
+            <a:r>
+              <a:rPr lang="en-US" dirty="0" err="1"/>
+              <a:t>Criar</a:t>
+            </a:r>
+            <a:r>
+              <a:rPr lang="en-US" dirty="0"/>
+              <a:t> </a:t>
+            </a:r>
+            <a:r>
+              <a:rPr lang="en-US" dirty="0" err="1"/>
+              <a:t>novos</a:t>
+            </a:r>
+            <a:r>
+              <a:rPr lang="en-US" dirty="0"/>
+              <a:t> </a:t>
+            </a:r>
+            <a:r>
+              <a:rPr lang="en-US" dirty="0" err="1"/>
+              <a:t>produtos</a:t>
+            </a:r>
+            <a:r>
+              <a:rPr lang="en-US" dirty="0"/>
+              <a:t>;</a:t>
+            </a:r>
+          </a:p>
+          <a:p>
+            <a:pPr marL="285750" indent="-285750">
+              <a:buFont typeface="Arial" panose="020B0604020202020204" pitchFamily="34" charset="0"/>
+              <a:buChar char="•"/>
+            </a:pPr>
+            <a:r>
+              <a:rPr lang="en-US" dirty="0" err="1"/>
+              <a:t>Atualizar</a:t>
+            </a:r>
+            <a:r>
+              <a:rPr lang="en-US" dirty="0"/>
+              <a:t> </a:t>
+            </a:r>
+            <a:r>
+              <a:rPr lang="en-US" dirty="0" err="1"/>
+              <a:t>detalhes</a:t>
+            </a:r>
+            <a:r>
+              <a:rPr lang="en-US" dirty="0"/>
+              <a:t> de </a:t>
+            </a:r>
+            <a:r>
+              <a:rPr lang="en-US" dirty="0" err="1"/>
+              <a:t>produtos</a:t>
+            </a:r>
+            <a:r>
+              <a:rPr lang="en-US" dirty="0"/>
+              <a:t>;</a:t>
+            </a:r>
+          </a:p>
+          <a:p>
+            <a:pPr marL="285750" indent="-285750">
+              <a:buFont typeface="Arial" panose="020B0604020202020204" pitchFamily="34" charset="0"/>
+              <a:buChar char="•"/>
+            </a:pPr>
+            <a:r>
+              <a:rPr lang="en-US" dirty="0" err="1"/>
+              <a:t>Comprar</a:t>
+            </a:r>
+            <a:r>
+              <a:rPr lang="en-US" dirty="0"/>
+              <a:t> </a:t>
+            </a:r>
+            <a:r>
+              <a:rPr lang="en-US" dirty="0" err="1"/>
+              <a:t>produtos</a:t>
+            </a:r>
+            <a:r>
+              <a:rPr lang="en-US" dirty="0"/>
+              <a:t>;</a:t>
+            </a:r>
+          </a:p>
+          <a:p>
+            <a:pPr marL="285750" indent="-285750">
+              <a:buFont typeface="Arial" panose="020B0604020202020204" pitchFamily="34" charset="0"/>
+              <a:buChar char="•"/>
+            </a:pPr>
+            <a:r>
+              <a:rPr lang="en-US" dirty="0" err="1"/>
+              <a:t>Deixar</a:t>
+            </a:r>
+            <a:r>
+              <a:rPr lang="en-US" dirty="0"/>
+              <a:t> </a:t>
+            </a:r>
+            <a:r>
+              <a:rPr lang="en-US" i="1" dirty="0"/>
+              <a:t>rating</a:t>
+            </a:r>
+            <a:r>
+              <a:rPr lang="en-US" dirty="0"/>
+              <a:t> e </a:t>
+            </a:r>
+            <a:r>
+              <a:rPr lang="en-US" dirty="0" err="1"/>
+              <a:t>uma</a:t>
+            </a:r>
+            <a:r>
+              <a:rPr lang="en-US" dirty="0"/>
+              <a:t> </a:t>
+            </a:r>
+            <a:r>
+              <a:rPr lang="en-US" i="1" dirty="0"/>
+              <a:t>review </a:t>
+            </a:r>
+            <a:r>
+              <a:rPr lang="en-US" dirty="0" err="1"/>
+              <a:t>nos</a:t>
+            </a:r>
+            <a:r>
+              <a:rPr lang="en-US" dirty="0"/>
+              <a:t> </a:t>
+            </a:r>
+            <a:r>
+              <a:rPr lang="en-US" dirty="0" err="1"/>
+              <a:t>produtos</a:t>
+            </a:r>
+            <a:r>
+              <a:rPr lang="en-US" dirty="0"/>
+              <a:t>;</a:t>
+            </a:r>
+          </a:p>
+          <a:p>
+            <a:pPr marL="285750" indent="-285750">
+              <a:buFont typeface="Arial" panose="020B0604020202020204" pitchFamily="34" charset="0"/>
+              <a:buChar char="•"/>
+            </a:pPr>
+            <a:r>
+              <a:rPr lang="en-US" dirty="0"/>
+              <a:t>Fazer/responder a </a:t>
+            </a:r>
+            <a:r>
+              <a:rPr lang="en-US" dirty="0" err="1"/>
+              <a:t>perguntas</a:t>
+            </a:r>
+            <a:r>
+              <a:rPr lang="en-US" dirty="0"/>
+              <a:t> </a:t>
+            </a:r>
+            <a:r>
+              <a:rPr lang="en-US" dirty="0" err="1"/>
+              <a:t>sobre</a:t>
+            </a:r>
+            <a:r>
+              <a:rPr lang="en-US" dirty="0"/>
+              <a:t> </a:t>
+            </a:r>
+            <a:r>
+              <a:rPr lang="en-US" dirty="0" err="1"/>
+              <a:t>produtos</a:t>
+            </a:r>
+            <a:r>
+              <a:rPr lang="en-US" dirty="0"/>
+              <a:t>;</a:t>
+            </a:r>
+          </a:p>
+          <a:p>
+            <a:pPr marL="285750" indent="-285750">
+              <a:buFont typeface="Arial" panose="020B0604020202020204" pitchFamily="34" charset="0"/>
+              <a:buChar char="•"/>
+            </a:pPr>
+            <a:r>
+              <a:rPr lang="en-US" dirty="0" err="1"/>
+              <a:t>Consultar</a:t>
+            </a:r>
+            <a:r>
+              <a:rPr lang="en-US" dirty="0"/>
+              <a:t> </a:t>
+            </a:r>
+            <a:r>
+              <a:rPr lang="en-US" dirty="0" err="1"/>
+              <a:t>informações</a:t>
+            </a:r>
+            <a:r>
+              <a:rPr lang="en-US" dirty="0"/>
+              <a:t> de </a:t>
+            </a:r>
+            <a:r>
+              <a:rPr lang="en-US" dirty="0" err="1"/>
+              <a:t>produtos</a:t>
+            </a:r>
+            <a:r>
+              <a:rPr lang="en-US" dirty="0"/>
+              <a:t>;</a:t>
+            </a:r>
+          </a:p>
+          <a:p>
+            <a:pPr marL="285750" indent="-285750">
+              <a:buFont typeface="Arial" panose="020B0604020202020204" pitchFamily="34" charset="0"/>
+              <a:buChar char="•"/>
+            </a:pPr>
+            <a:r>
+              <a:rPr lang="en-US" dirty="0" err="1"/>
+              <a:t>Obter</a:t>
+            </a:r>
+            <a:r>
+              <a:rPr lang="en-US" dirty="0"/>
+              <a:t> </a:t>
+            </a:r>
+            <a:r>
+              <a:rPr lang="en-US" dirty="0" err="1"/>
+              <a:t>estatísticas</a:t>
+            </a:r>
+            <a:r>
+              <a:rPr lang="en-US" dirty="0"/>
+              <a:t> de </a:t>
+            </a:r>
+            <a:r>
+              <a:rPr lang="en-US" dirty="0" err="1"/>
+              <a:t>produtos</a:t>
+            </a:r>
+            <a:r>
+              <a:rPr lang="en-US" dirty="0"/>
+              <a:t>;</a:t>
+            </a:r>
+          </a:p>
+          <a:p>
+            <a:pPr marL="285750" indent="-285750">
+              <a:buFont typeface="Arial" panose="020B0604020202020204" pitchFamily="34" charset="0"/>
+              <a:buChar char="•"/>
+            </a:pPr>
+            <a:r>
+              <a:rPr lang="en-US" dirty="0" err="1"/>
+              <a:t>Criar</a:t>
+            </a:r>
+            <a:r>
+              <a:rPr lang="en-US" dirty="0"/>
+              <a:t> </a:t>
+            </a:r>
+            <a:r>
+              <a:rPr lang="en-US" dirty="0" err="1"/>
+              <a:t>campanhas</a:t>
+            </a:r>
+            <a:r>
+              <a:rPr lang="en-US" dirty="0"/>
+              <a:t>;</a:t>
+            </a:r>
+          </a:p>
+          <a:p>
+            <a:pPr marL="285750" indent="-285750">
+              <a:buFont typeface="Arial" panose="020B0604020202020204" pitchFamily="34" charset="0"/>
+              <a:buChar char="•"/>
+            </a:pPr>
+            <a:r>
+              <a:rPr lang="en-US" dirty="0" err="1"/>
+              <a:t>Subscrever</a:t>
+            </a:r>
+            <a:r>
+              <a:rPr lang="en-US" dirty="0"/>
+              <a:t> </a:t>
+            </a:r>
+            <a:r>
+              <a:rPr lang="en-US" dirty="0" err="1"/>
+              <a:t>campanhas</a:t>
+            </a:r>
+            <a:r>
+              <a:rPr lang="en-US" dirty="0"/>
+              <a:t> e </a:t>
+            </a:r>
+            <a:r>
+              <a:rPr lang="en-US" dirty="0" err="1"/>
+              <a:t>obter</a:t>
+            </a:r>
+            <a:r>
+              <a:rPr lang="en-US" dirty="0"/>
+              <a:t> </a:t>
+            </a:r>
+            <a:r>
+              <a:rPr lang="en-US" dirty="0" err="1"/>
+              <a:t>respetivos</a:t>
+            </a:r>
+            <a:r>
+              <a:rPr lang="en-US" dirty="0"/>
+              <a:t> </a:t>
+            </a:r>
+            <a:r>
+              <a:rPr lang="en-US" dirty="0" err="1"/>
+              <a:t>cupões</a:t>
+            </a:r>
+            <a:r>
+              <a:rPr lang="en-US" dirty="0"/>
+              <a:t>;</a:t>
+            </a:r>
+          </a:p>
+          <a:p>
+            <a:pPr marL="285750" indent="-285750">
+              <a:buFont typeface="Arial" panose="020B0604020202020204" pitchFamily="34" charset="0"/>
+              <a:buChar char="•"/>
+            </a:pPr>
+            <a:r>
+              <a:rPr lang="en-US" dirty="0" err="1"/>
+              <a:t>Obter</a:t>
+            </a:r>
+            <a:r>
+              <a:rPr lang="en-US" dirty="0"/>
+              <a:t> </a:t>
+            </a:r>
+            <a:r>
+              <a:rPr lang="en-US" dirty="0" err="1"/>
+              <a:t>estatísticas</a:t>
+            </a:r>
+            <a:r>
+              <a:rPr lang="en-US" dirty="0"/>
+              <a:t> dos </a:t>
+            </a:r>
+            <a:r>
+              <a:rPr lang="en-US" dirty="0" err="1"/>
+              <a:t>descontos</a:t>
+            </a:r>
+            <a:r>
+              <a:rPr lang="en-US" dirty="0"/>
+              <a:t> </a:t>
+            </a:r>
+            <a:r>
+              <a:rPr lang="en-US" dirty="0" err="1"/>
+              <a:t>aplicados</a:t>
+            </a:r>
+            <a:r>
+              <a:rPr lang="en-US" dirty="0"/>
+              <a:t> </a:t>
+            </a:r>
+            <a:r>
+              <a:rPr lang="en-US" dirty="0" err="1"/>
+              <a:t>nas</a:t>
+            </a:r>
+            <a:r>
+              <a:rPr lang="en-US" dirty="0"/>
+              <a:t> </a:t>
+            </a:r>
+            <a:r>
+              <a:rPr lang="en-US" dirty="0" err="1"/>
+              <a:t>campanhas</a:t>
+            </a:r>
+            <a:r>
+              <a:rPr lang="en-US" dirty="0"/>
+              <a:t>;</a:t>
+            </a:r>
+          </a:p>
+          <a:p>
+            <a:pPr marL="285750" indent="-285750">
+              <a:buFont typeface="Arial" panose="020B0604020202020204" pitchFamily="34" charset="0"/>
+              <a:buChar char="•"/>
+            </a:pPr>
+            <a:r>
+              <a:rPr lang="en-US" dirty="0" err="1"/>
+              <a:t>Receber</a:t>
+            </a:r>
+            <a:r>
+              <a:rPr lang="en-US" dirty="0"/>
+              <a:t> </a:t>
+            </a:r>
+            <a:r>
+              <a:rPr lang="en-US" dirty="0" err="1"/>
+              <a:t>notificações</a:t>
+            </a:r>
+            <a:r>
+              <a:rPr lang="en-US" dirty="0"/>
+              <a:t>??(n sei se </a:t>
+            </a:r>
+            <a:r>
+              <a:rPr lang="en-US" dirty="0" err="1"/>
+              <a:t>conta</a:t>
+            </a:r>
+            <a:r>
+              <a:rPr lang="en-US" dirty="0"/>
+              <a:t> </a:t>
+            </a:r>
+            <a:r>
+              <a:rPr lang="en-US" dirty="0" err="1"/>
+              <a:t>como</a:t>
+            </a:r>
+            <a:r>
+              <a:rPr lang="en-US" dirty="0"/>
+              <a:t> </a:t>
+            </a:r>
+            <a:r>
+              <a:rPr lang="en-US" dirty="0" err="1"/>
+              <a:t>operação</a:t>
+            </a:r>
+            <a:r>
+              <a:rPr lang="en-US" dirty="0"/>
+              <a:t>) . </a:t>
+            </a:r>
+          </a:p>
+        </p:txBody>
+      </p:sp>
     </p:spTree>
     <p:extLst>
       <p:ext uri="{BB962C8B-B14F-4D97-AF65-F5344CB8AC3E}">
@@ -24327,6 +24054,383 @@
               </a:solidFill>
               <a:latin typeface="+mj-lt"/>
             </a:endParaRPr>
+          </a:p>
+        </p:txBody>
+      </p:sp>
+      <p:sp>
+        <p:nvSpPr>
+          <p:cNvPr id="8" name="TextBox 7">
+            <a:extLst>
+              <a:ext uri="{FF2B5EF4-FFF2-40B4-BE49-F238E27FC236}">
+                <a16:creationId xmlns:a16="http://schemas.microsoft.com/office/drawing/2014/main" id="{D09D0669-0A45-43E1-B6EC-DB2815E4AF1A}"/>
+              </a:ext>
+            </a:extLst>
+          </p:cNvPr>
+          <p:cNvSpPr txBox="1"/>
+          <p:nvPr/>
+        </p:nvSpPr>
+        <p:spPr>
+          <a:xfrm>
+            <a:off x="939567" y="1669409"/>
+            <a:ext cx="9479560" cy="2031325"/>
+          </a:xfrm>
+          <a:prstGeom prst="rect">
+            <a:avLst/>
+          </a:prstGeom>
+          <a:noFill/>
+        </p:spPr>
+        <p:txBody>
+          <a:bodyPr wrap="square" rtlCol="0">
+            <a:spAutoFit/>
+          </a:bodyPr>
+          <a:lstStyle/>
+          <a:p>
+            <a:pPr marL="285750" indent="-285750">
+              <a:buFont typeface="Arial" panose="020B0604020202020204" pitchFamily="34" charset="0"/>
+              <a:buChar char="•"/>
+            </a:pPr>
+            <a:r>
+              <a:rPr lang="en-US" dirty="0"/>
+              <a:t>As </a:t>
+            </a:r>
+            <a:r>
+              <a:rPr lang="en-US" dirty="0" err="1"/>
+              <a:t>transações</a:t>
+            </a:r>
+            <a:r>
+              <a:rPr lang="en-US" dirty="0"/>
+              <a:t> que </a:t>
+            </a:r>
+            <a:r>
+              <a:rPr lang="en-US" dirty="0" err="1"/>
+              <a:t>ocorrem</a:t>
+            </a:r>
+            <a:r>
+              <a:rPr lang="en-US" dirty="0"/>
+              <a:t> </a:t>
+            </a:r>
+            <a:r>
+              <a:rPr lang="en-US" dirty="0" err="1"/>
+              <a:t>na</a:t>
+            </a:r>
+            <a:r>
+              <a:rPr lang="en-US" dirty="0"/>
+              <a:t> base de dados </a:t>
+            </a:r>
+            <a:r>
+              <a:rPr lang="en-US" dirty="0" err="1"/>
+              <a:t>consistem</a:t>
+            </a:r>
+            <a:r>
+              <a:rPr lang="en-US" dirty="0"/>
+              <a:t>, </a:t>
+            </a:r>
+            <a:r>
+              <a:rPr lang="en-US" dirty="0" err="1"/>
+              <a:t>principalmente</a:t>
+            </a:r>
+            <a:r>
+              <a:rPr lang="en-US" dirty="0"/>
+              <a:t>, </a:t>
+            </a:r>
+            <a:r>
+              <a:rPr lang="en-US" dirty="0" err="1"/>
+              <a:t>na</a:t>
+            </a:r>
+            <a:r>
+              <a:rPr lang="en-US" dirty="0"/>
+              <a:t>:</a:t>
+            </a:r>
+          </a:p>
+          <a:p>
+            <a:pPr marL="285750" indent="-285750">
+              <a:buFont typeface="Arial" panose="020B0604020202020204" pitchFamily="34" charset="0"/>
+              <a:buChar char="•"/>
+            </a:pPr>
+            <a:r>
+              <a:rPr lang="en-US" dirty="0" err="1"/>
+              <a:t>Compra</a:t>
+            </a:r>
+            <a:r>
+              <a:rPr lang="en-US" dirty="0"/>
+              <a:t>/</a:t>
+            </a:r>
+            <a:r>
+              <a:rPr lang="en-US" dirty="0" err="1"/>
+              <a:t>venda</a:t>
+            </a:r>
+            <a:r>
+              <a:rPr lang="en-US" dirty="0"/>
+              <a:t> de </a:t>
+            </a:r>
+            <a:r>
+              <a:rPr lang="en-US" dirty="0" err="1"/>
+              <a:t>produtos</a:t>
+            </a:r>
+            <a:endParaRPr lang="en-US" dirty="0"/>
+          </a:p>
+          <a:p>
+            <a:pPr marL="285750" indent="-285750">
+              <a:buFont typeface="Arial" panose="020B0604020202020204" pitchFamily="34" charset="0"/>
+              <a:buChar char="•"/>
+            </a:pPr>
+            <a:r>
+              <a:rPr lang="en-US" dirty="0" err="1"/>
+              <a:t>Obtenção</a:t>
+            </a:r>
+            <a:r>
+              <a:rPr lang="en-US" dirty="0"/>
+              <a:t> de dados </a:t>
+            </a:r>
+            <a:r>
+              <a:rPr lang="en-US" dirty="0" err="1"/>
+              <a:t>sobre</a:t>
+            </a:r>
+            <a:r>
+              <a:rPr lang="en-US" dirty="0"/>
+              <a:t> </a:t>
+            </a:r>
+            <a:r>
+              <a:rPr lang="en-US" dirty="0" err="1"/>
+              <a:t>os</a:t>
+            </a:r>
+            <a:r>
+              <a:rPr lang="en-US" dirty="0"/>
+              <a:t> </a:t>
+            </a:r>
+            <a:r>
+              <a:rPr lang="en-US" dirty="0" err="1"/>
+              <a:t>produtos</a:t>
+            </a:r>
+            <a:r>
+              <a:rPr lang="en-US" dirty="0"/>
+              <a:t> </a:t>
+            </a:r>
+            <a:r>
+              <a:rPr lang="en-US" dirty="0" err="1"/>
+              <a:t>ao</a:t>
+            </a:r>
+            <a:r>
+              <a:rPr lang="en-US" dirty="0"/>
+              <a:t> </a:t>
+            </a:r>
+            <a:r>
+              <a:rPr lang="en-US" dirty="0" err="1"/>
+              <a:t>consultar</a:t>
+            </a:r>
+            <a:r>
+              <a:rPr lang="en-US" dirty="0"/>
+              <a:t> </a:t>
+            </a:r>
+            <a:r>
+              <a:rPr lang="en-US" dirty="0" err="1"/>
+              <a:t>informação</a:t>
+            </a:r>
+            <a:r>
+              <a:rPr lang="en-US" dirty="0"/>
+              <a:t> e </a:t>
+            </a:r>
+            <a:r>
+              <a:rPr lang="en-US" dirty="0" err="1"/>
+              <a:t>estatísticas</a:t>
+            </a:r>
+            <a:r>
+              <a:rPr lang="en-US" dirty="0"/>
+              <a:t> </a:t>
+            </a:r>
+            <a:r>
+              <a:rPr lang="en-US" dirty="0" err="1"/>
+              <a:t>sobre</a:t>
+            </a:r>
+            <a:r>
+              <a:rPr lang="en-US" dirty="0"/>
+              <a:t> </a:t>
+            </a:r>
+            <a:r>
+              <a:rPr lang="en-US" dirty="0" err="1"/>
+              <a:t>este</a:t>
+            </a:r>
+            <a:r>
+              <a:rPr lang="en-US" dirty="0"/>
+              <a:t>.</a:t>
+            </a:r>
+          </a:p>
+          <a:p>
+            <a:pPr marL="285750" indent="-285750">
+              <a:buFont typeface="Arial" panose="020B0604020202020204" pitchFamily="34" charset="0"/>
+              <a:buChar char="•"/>
+            </a:pPr>
+            <a:r>
+              <a:rPr lang="en-US" dirty="0" err="1"/>
+              <a:t>Criação</a:t>
+            </a:r>
+            <a:r>
+              <a:rPr lang="en-US" dirty="0"/>
+              <a:t>/</a:t>
+            </a:r>
+            <a:r>
+              <a:rPr lang="en-US" dirty="0" err="1"/>
+              <a:t>atualização</a:t>
+            </a:r>
+            <a:r>
+              <a:rPr lang="en-US" dirty="0"/>
+              <a:t> dos dados de um </a:t>
+            </a:r>
+            <a:r>
+              <a:rPr lang="en-US" dirty="0" err="1"/>
+              <a:t>produto</a:t>
+            </a:r>
+            <a:r>
+              <a:rPr lang="en-US" dirty="0"/>
+              <a:t> </a:t>
+            </a:r>
+            <a:r>
+              <a:rPr lang="en-US" dirty="0" err="1"/>
+              <a:t>ao</a:t>
+            </a:r>
+            <a:r>
+              <a:rPr lang="en-US" dirty="0"/>
+              <a:t> </a:t>
+            </a:r>
+            <a:r>
+              <a:rPr lang="en-US" dirty="0" err="1"/>
+              <a:t>criá</a:t>
+            </a:r>
+            <a:r>
+              <a:rPr lang="en-US" dirty="0"/>
+              <a:t>-lo/</a:t>
+            </a:r>
+            <a:r>
+              <a:rPr lang="en-US" dirty="0" err="1"/>
+              <a:t>atualizá</a:t>
+            </a:r>
+            <a:r>
+              <a:rPr lang="en-US" dirty="0"/>
+              <a:t>-lo.</a:t>
+            </a:r>
+          </a:p>
+          <a:p>
+            <a:pPr marL="285750" indent="-285750">
+              <a:buFont typeface="Arial" panose="020B0604020202020204" pitchFamily="34" charset="0"/>
+              <a:buChar char="•"/>
+            </a:pPr>
+            <a:r>
+              <a:rPr lang="en-US" dirty="0" err="1"/>
+              <a:t>Obtenção</a:t>
+            </a:r>
+            <a:r>
+              <a:rPr lang="en-US" dirty="0"/>
+              <a:t> e </a:t>
+            </a:r>
+            <a:r>
+              <a:rPr lang="en-US" dirty="0" err="1"/>
+              <a:t>criação</a:t>
+            </a:r>
+            <a:r>
+              <a:rPr lang="en-US" dirty="0"/>
+              <a:t> de </a:t>
+            </a:r>
+            <a:r>
+              <a:rPr lang="en-US" i="1" dirty="0"/>
+              <a:t>threads</a:t>
+            </a:r>
+            <a:r>
+              <a:rPr lang="en-US" dirty="0"/>
+              <a:t> e </a:t>
+            </a:r>
+            <a:r>
+              <a:rPr lang="en-US" i="1" dirty="0"/>
+              <a:t>ratings/reviews</a:t>
+            </a:r>
+            <a:r>
+              <a:rPr lang="en-US" dirty="0"/>
+              <a:t> de um </a:t>
+            </a:r>
+            <a:r>
+              <a:rPr lang="en-US" dirty="0" err="1"/>
+              <a:t>produto</a:t>
+            </a:r>
+            <a:r>
+              <a:rPr lang="en-US" dirty="0"/>
+              <a:t>.</a:t>
+            </a:r>
+          </a:p>
+          <a:p>
+            <a:pPr marL="285750" indent="-285750">
+              <a:buFont typeface="Arial" panose="020B0604020202020204" pitchFamily="34" charset="0"/>
+              <a:buChar char="•"/>
+            </a:pPr>
+            <a:r>
+              <a:rPr lang="en-US" dirty="0" err="1"/>
+              <a:t>Geração</a:t>
+            </a:r>
+            <a:r>
+              <a:rPr lang="en-US" dirty="0"/>
+              <a:t> de </a:t>
+            </a:r>
+            <a:r>
+              <a:rPr lang="en-US" dirty="0" err="1"/>
+              <a:t>campanhas</a:t>
+            </a:r>
+            <a:r>
+              <a:rPr lang="en-US" dirty="0"/>
+              <a:t> e </a:t>
+            </a:r>
+            <a:r>
+              <a:rPr lang="en-US" dirty="0" err="1"/>
+              <a:t>respetivos</a:t>
+            </a:r>
+            <a:r>
+              <a:rPr lang="en-US" dirty="0"/>
+              <a:t> </a:t>
+            </a:r>
+            <a:r>
+              <a:rPr lang="en-US" dirty="0" err="1"/>
+              <a:t>cupões</a:t>
+            </a:r>
+            <a:r>
+              <a:rPr lang="en-US" dirty="0"/>
+              <a:t> e </a:t>
+            </a:r>
+            <a:r>
+              <a:rPr lang="en-US" dirty="0" err="1"/>
+              <a:t>obtenção</a:t>
+            </a:r>
+            <a:r>
+              <a:rPr lang="en-US" dirty="0"/>
+              <a:t> dos </a:t>
+            </a:r>
+            <a:r>
+              <a:rPr lang="en-US" dirty="0" err="1"/>
+              <a:t>mesmos</a:t>
+            </a:r>
+            <a:r>
+              <a:rPr lang="en-US" dirty="0"/>
+              <a:t> e </a:t>
+            </a:r>
+            <a:r>
+              <a:rPr lang="en-US" dirty="0" err="1"/>
+              <a:t>suas</a:t>
+            </a:r>
+            <a:r>
+              <a:rPr lang="en-US" dirty="0"/>
+              <a:t> </a:t>
+            </a:r>
+            <a:r>
+              <a:rPr lang="en-US" dirty="0" err="1"/>
+              <a:t>estatísticas</a:t>
+            </a:r>
+            <a:r>
+              <a:rPr lang="en-US" dirty="0"/>
+              <a:t>.</a:t>
+            </a:r>
+          </a:p>
+          <a:p>
+            <a:pPr marL="285750" indent="-285750">
+              <a:buFont typeface="Arial" panose="020B0604020202020204" pitchFamily="34" charset="0"/>
+              <a:buChar char="•"/>
+            </a:pPr>
+            <a:endParaRPr lang="en-US" dirty="0"/>
           </a:p>
         </p:txBody>
       </p:sp>
@@ -24437,7 +24541,7 @@
         <p:spPr>
           <a:xfrm>
             <a:off x="1358284" y="2166152"/>
-            <a:ext cx="8815526" cy="1200329"/>
+            <a:ext cx="8815526" cy="1477328"/>
           </a:xfrm>
           <a:prstGeom prst="rect">
             <a:avLst/>
@@ -24450,237 +24554,312 @@
           </a:bodyPr>
           <a:lstStyle/>
           <a:p>
-            <a:pPr marL="285750" indent="-285750">
-              <a:buFont typeface="Arial" panose="020B0604020202020204" pitchFamily="34" charset="0"/>
-              <a:buChar char="•"/>
-            </a:pPr>
-            <a:r>
-              <a:rPr lang="en-US" dirty="0" err="1">
-                <a:solidFill>
-                  <a:srgbClr val="FF0000"/>
-                </a:solidFill>
-              </a:rPr>
-              <a:t>Dois</a:t>
-            </a:r>
-            <a:r>
-              <a:rPr lang="en-US" dirty="0">
-                <a:solidFill>
-                  <a:srgbClr val="FF0000"/>
-                </a:solidFill>
-              </a:rPr>
+            <a:r>
+              <a:rPr lang="en-US" dirty="0" err="1"/>
+              <a:t>Os</a:t>
+            </a:r>
+            <a:r>
+              <a:rPr lang="en-US" dirty="0"/>
               <a:t> </a:t>
             </a:r>
             <a:r>
-              <a:rPr lang="en-US" dirty="0" err="1">
-                <a:solidFill>
-                  <a:srgbClr val="FF0000"/>
-                </a:solidFill>
-              </a:rPr>
-              <a:t>utilizadores</a:t>
-            </a:r>
-            <a:r>
-              <a:rPr lang="en-US" dirty="0">
-                <a:solidFill>
-                  <a:srgbClr val="FF0000"/>
-                </a:solidFill>
-              </a:rPr>
+              <a:rPr lang="en-US" dirty="0" err="1"/>
+              <a:t>pricipais</a:t>
+            </a:r>
+            <a:r>
+              <a:rPr lang="en-US" dirty="0"/>
               <a:t> </a:t>
             </a:r>
             <a:r>
-              <a:rPr lang="en-US" dirty="0" err="1">
-                <a:solidFill>
-                  <a:srgbClr val="FF0000"/>
-                </a:solidFill>
-              </a:rPr>
-              <a:t>tentam</a:t>
-            </a:r>
-            <a:r>
-              <a:rPr lang="en-US" dirty="0">
-                <a:solidFill>
-                  <a:srgbClr val="FF0000"/>
-                </a:solidFill>
-              </a:rPr>
+              <a:rPr lang="en-US" dirty="0" err="1"/>
+              <a:t>conflitos</a:t>
+            </a:r>
+            <a:r>
+              <a:rPr lang="en-US" dirty="0"/>
+              <a:t> de </a:t>
+            </a:r>
+            <a:r>
+              <a:rPr lang="en-US" dirty="0" err="1"/>
+              <a:t>concorrência</a:t>
+            </a:r>
+            <a:r>
+              <a:rPr lang="en-US" dirty="0"/>
               <a:t> </a:t>
             </a:r>
             <a:r>
-              <a:rPr lang="en-US" dirty="0" err="1">
-                <a:solidFill>
-                  <a:srgbClr val="FF0000"/>
-                </a:solidFill>
-              </a:rPr>
-              <a:t>comprar</a:t>
-            </a:r>
-            <a:r>
-              <a:rPr lang="en-US" dirty="0">
-                <a:solidFill>
-                  <a:srgbClr val="FF0000"/>
-                </a:solidFill>
-              </a:rPr>
+              <a:rPr lang="en-US" dirty="0" err="1"/>
+              <a:t>ocorrem</a:t>
+            </a:r>
+            <a:r>
+              <a:rPr lang="en-US" dirty="0"/>
               <a:t> </a:t>
             </a:r>
             <a:r>
-              <a:rPr lang="en-US" dirty="0" err="1">
-                <a:solidFill>
-                  <a:srgbClr val="FF0000"/>
-                </a:solidFill>
-              </a:rPr>
-              <a:t>quantias</a:t>
-            </a:r>
-            <a:r>
-              <a:rPr lang="en-US" dirty="0">
-                <a:solidFill>
-                  <a:srgbClr val="FF0000"/>
-                </a:solidFill>
-              </a:rPr>
-              <a:t> de um </a:t>
-            </a:r>
-            <a:r>
-              <a:rPr lang="en-US" dirty="0" err="1">
-                <a:solidFill>
-                  <a:srgbClr val="FF0000"/>
-                </a:solidFill>
-              </a:rPr>
-              <a:t>produto</a:t>
-            </a:r>
-            <a:r>
-              <a:rPr lang="en-US" dirty="0">
-                <a:solidFill>
-                  <a:srgbClr val="FF0000"/>
-                </a:solidFill>
-              </a:rPr>
-              <a:t> </a:t>
-            </a:r>
-            <a:r>
-              <a:rPr lang="en-US" dirty="0" err="1">
-                <a:solidFill>
-                  <a:srgbClr val="FF0000"/>
-                </a:solidFill>
-              </a:rPr>
-              <a:t>em</a:t>
-            </a:r>
-            <a:r>
-              <a:rPr lang="en-US" dirty="0">
-                <a:solidFill>
-                  <a:srgbClr val="FF0000"/>
-                </a:solidFill>
-              </a:rPr>
-              <a:t> </a:t>
-            </a:r>
-            <a:r>
-              <a:rPr lang="en-US" dirty="0" err="1">
-                <a:solidFill>
-                  <a:srgbClr val="FF0000"/>
-                </a:solidFill>
-              </a:rPr>
-              <a:t>simultâneo</a:t>
-            </a:r>
-            <a:r>
-              <a:rPr lang="en-US" dirty="0">
-                <a:solidFill>
-                  <a:srgbClr val="FF0000"/>
-                </a:solidFill>
-              </a:rPr>
-              <a:t>, mas </a:t>
-            </a:r>
-            <a:r>
-              <a:rPr lang="en-US" dirty="0" err="1">
-                <a:solidFill>
-                  <a:srgbClr val="FF0000"/>
-                </a:solidFill>
-              </a:rPr>
-              <a:t>não</a:t>
-            </a:r>
-            <a:r>
-              <a:rPr lang="en-US" dirty="0">
-                <a:solidFill>
-                  <a:srgbClr val="FF0000"/>
-                </a:solidFill>
-              </a:rPr>
-              <a:t> </a:t>
-            </a:r>
-            <a:r>
-              <a:rPr lang="en-US" dirty="0" err="1">
-                <a:solidFill>
-                  <a:srgbClr val="FF0000"/>
-                </a:solidFill>
-              </a:rPr>
-              <a:t>existe</a:t>
-            </a:r>
-            <a:r>
-              <a:rPr lang="en-US" dirty="0">
-                <a:solidFill>
-                  <a:srgbClr val="FF0000"/>
-                </a:solidFill>
-              </a:rPr>
-              <a:t> stock </a:t>
-            </a:r>
-            <a:r>
-              <a:rPr lang="en-US" dirty="0" err="1">
-                <a:solidFill>
-                  <a:srgbClr val="FF0000"/>
-                </a:solidFill>
-              </a:rPr>
-              <a:t>suficiente</a:t>
-            </a:r>
-            <a:r>
-              <a:rPr lang="en-US" dirty="0">
-                <a:solidFill>
-                  <a:srgbClr val="FF0000"/>
-                </a:solidFill>
-              </a:rPr>
-              <a:t> para </a:t>
-            </a:r>
-            <a:r>
-              <a:rPr lang="en-US" dirty="0" err="1">
-                <a:solidFill>
-                  <a:srgbClr val="FF0000"/>
-                </a:solidFill>
-              </a:rPr>
-              <a:t>concretizar</a:t>
-            </a:r>
-            <a:r>
-              <a:rPr lang="en-US" dirty="0">
-                <a:solidFill>
-                  <a:srgbClr val="FF0000"/>
-                </a:solidFill>
-              </a:rPr>
-              <a:t> ambas as </a:t>
-            </a:r>
-            <a:r>
-              <a:rPr lang="en-US" dirty="0" err="1">
-                <a:solidFill>
-                  <a:srgbClr val="FF0000"/>
-                </a:solidFill>
-              </a:rPr>
-              <a:t>encomendas</a:t>
-            </a:r>
-            <a:endParaRPr lang="en-US" dirty="0">
-              <a:solidFill>
-                <a:srgbClr val="FF0000"/>
-              </a:solidFill>
-            </a:endParaRPr>
+              <a:rPr lang="en-US" dirty="0" err="1"/>
+              <a:t>quando</a:t>
+            </a:r>
+            <a:r>
+              <a:rPr lang="en-US" dirty="0"/>
+              <a:t>:</a:t>
+            </a:r>
           </a:p>
           <a:p>
             <a:pPr marL="285750" indent="-285750">
               <a:buFont typeface="Arial" panose="020B0604020202020204" pitchFamily="34" charset="0"/>
               <a:buChar char="•"/>
             </a:pPr>
-            <a:endParaRPr lang="en-US" dirty="0">
-              <a:solidFill>
-                <a:srgbClr val="FF0000"/>
-              </a:solidFill>
-            </a:endParaRPr>
+            <a:r>
+              <a:rPr lang="en-US" dirty="0" err="1"/>
+              <a:t>Dois</a:t>
+            </a:r>
+            <a:r>
+              <a:rPr lang="en-US" dirty="0"/>
+              <a:t> </a:t>
+            </a:r>
+            <a:r>
+              <a:rPr lang="en-US" dirty="0" err="1"/>
+              <a:t>utilizadores</a:t>
+            </a:r>
+            <a:r>
+              <a:rPr lang="en-US" dirty="0"/>
+              <a:t> </a:t>
+            </a:r>
+            <a:r>
+              <a:rPr lang="en-US" dirty="0" err="1"/>
+              <a:t>tentam</a:t>
+            </a:r>
+            <a:r>
+              <a:rPr lang="en-US" dirty="0"/>
+              <a:t> </a:t>
+            </a:r>
+            <a:r>
+              <a:rPr lang="en-US" dirty="0" err="1"/>
+              <a:t>comprar</a:t>
+            </a:r>
+            <a:r>
+              <a:rPr lang="en-US" dirty="0"/>
+              <a:t> </a:t>
+            </a:r>
+            <a:r>
+              <a:rPr lang="en-US" dirty="0" err="1"/>
+              <a:t>quantias</a:t>
+            </a:r>
+            <a:r>
+              <a:rPr lang="en-US" dirty="0"/>
+              <a:t> de um </a:t>
+            </a:r>
+            <a:r>
+              <a:rPr lang="en-US" dirty="0" err="1"/>
+              <a:t>produto</a:t>
+            </a:r>
+            <a:r>
+              <a:rPr lang="en-US" dirty="0"/>
+              <a:t> </a:t>
+            </a:r>
+            <a:r>
+              <a:rPr lang="en-US" dirty="0" err="1"/>
+              <a:t>em</a:t>
+            </a:r>
+            <a:r>
+              <a:rPr lang="en-US" dirty="0"/>
+              <a:t> </a:t>
+            </a:r>
+            <a:r>
+              <a:rPr lang="en-US" dirty="0" err="1"/>
+              <a:t>simultâneo</a:t>
+            </a:r>
+            <a:r>
+              <a:rPr lang="en-US" dirty="0"/>
+              <a:t>, mas </a:t>
+            </a:r>
+            <a:r>
+              <a:rPr lang="en-US" dirty="0" err="1"/>
+              <a:t>não</a:t>
+            </a:r>
+            <a:r>
+              <a:rPr lang="en-US" dirty="0"/>
+              <a:t> </a:t>
+            </a:r>
+            <a:r>
+              <a:rPr lang="en-US" dirty="0" err="1"/>
+              <a:t>existe</a:t>
+            </a:r>
+            <a:r>
+              <a:rPr lang="en-US" dirty="0"/>
+              <a:t> stock </a:t>
+            </a:r>
+            <a:r>
+              <a:rPr lang="en-US" dirty="0" err="1"/>
+              <a:t>suficiente</a:t>
+            </a:r>
+            <a:r>
+              <a:rPr lang="en-US" dirty="0"/>
+              <a:t> para </a:t>
+            </a:r>
+            <a:r>
+              <a:rPr lang="en-US" dirty="0" err="1"/>
+              <a:t>concretizar</a:t>
+            </a:r>
+            <a:r>
+              <a:rPr lang="en-US" dirty="0"/>
+              <a:t> ambas as </a:t>
+            </a:r>
+            <a:r>
+              <a:rPr lang="en-US" dirty="0" err="1"/>
+              <a:t>encomendas</a:t>
+            </a:r>
+            <a:endParaRPr lang="en-US" dirty="0"/>
           </a:p>
           <a:p>
             <a:pPr marL="285750" indent="-285750">
               <a:buFont typeface="Arial" panose="020B0604020202020204" pitchFamily="34" charset="0"/>
               <a:buChar char="•"/>
             </a:pPr>
-            <a:endParaRPr lang="en-US" dirty="0">
-              <a:solidFill>
-                <a:srgbClr val="FF0000"/>
-              </a:solidFill>
-            </a:endParaRPr>
+            <a:r>
+              <a:rPr lang="en-US" dirty="0" err="1"/>
+              <a:t>Utilizador</a:t>
+            </a:r>
+            <a:r>
+              <a:rPr lang="en-US" dirty="0"/>
+              <a:t> </a:t>
+            </a:r>
+            <a:r>
+              <a:rPr lang="en-US" dirty="0" err="1"/>
+              <a:t>tenta</a:t>
+            </a:r>
+            <a:r>
+              <a:rPr lang="en-US" dirty="0"/>
+              <a:t> </a:t>
+            </a:r>
+            <a:r>
+              <a:rPr lang="en-US" dirty="0" err="1"/>
+              <a:t>obter</a:t>
+            </a:r>
+            <a:r>
+              <a:rPr lang="en-US" dirty="0"/>
+              <a:t> </a:t>
+            </a:r>
+            <a:r>
+              <a:rPr lang="en-US" dirty="0" err="1"/>
+              <a:t>informações</a:t>
+            </a:r>
+            <a:r>
+              <a:rPr lang="en-US" dirty="0"/>
+              <a:t> e </a:t>
+            </a:r>
+            <a:r>
+              <a:rPr lang="en-US" dirty="0" err="1"/>
+              <a:t>estatísticas</a:t>
+            </a:r>
+            <a:r>
+              <a:rPr lang="en-US" dirty="0"/>
+              <a:t> </a:t>
+            </a:r>
+            <a:r>
+              <a:rPr lang="en-US" dirty="0" err="1"/>
+              <a:t>ou</a:t>
+            </a:r>
+            <a:r>
+              <a:rPr lang="en-US" dirty="0"/>
+              <a:t> </a:t>
+            </a:r>
+            <a:r>
+              <a:rPr lang="en-US" dirty="0" err="1"/>
+              <a:t>comprar</a:t>
+            </a:r>
+            <a:r>
+              <a:rPr lang="en-US" dirty="0"/>
+              <a:t> um </a:t>
+            </a:r>
+            <a:r>
+              <a:rPr lang="en-US" dirty="0" err="1"/>
+              <a:t>produto</a:t>
+            </a:r>
+            <a:r>
+              <a:rPr lang="en-US" dirty="0"/>
+              <a:t> </a:t>
+            </a:r>
+            <a:r>
+              <a:rPr lang="en-US" dirty="0" err="1"/>
+              <a:t>enquanto</a:t>
+            </a:r>
+            <a:r>
+              <a:rPr lang="en-US" dirty="0"/>
+              <a:t> um </a:t>
+            </a:r>
+            <a:r>
+              <a:rPr lang="en-US" dirty="0" err="1"/>
+              <a:t>vendedor</a:t>
+            </a:r>
+            <a:r>
+              <a:rPr lang="en-US" dirty="0"/>
+              <a:t> </a:t>
+            </a:r>
+            <a:r>
+              <a:rPr lang="en-US" dirty="0" err="1"/>
+              <a:t>atualiza</a:t>
+            </a:r>
+            <a:r>
+              <a:rPr lang="en-US" dirty="0"/>
+              <a:t> </a:t>
+            </a:r>
+            <a:r>
+              <a:rPr lang="en-US" dirty="0" err="1"/>
+              <a:t>os</a:t>
+            </a:r>
+            <a:r>
+              <a:rPr lang="en-US" dirty="0"/>
+              <a:t> </a:t>
+            </a:r>
+            <a:r>
+              <a:rPr lang="en-US" dirty="0" err="1"/>
+              <a:t>seus</a:t>
+            </a:r>
+            <a:r>
+              <a:rPr lang="en-US" dirty="0"/>
+              <a:t> </a:t>
+            </a:r>
+            <a:r>
+              <a:rPr lang="en-US" dirty="0" err="1"/>
+              <a:t>detalhes</a:t>
+            </a:r>
+            <a:r>
+              <a:rPr lang="en-US" dirty="0"/>
+              <a:t> (</a:t>
+            </a:r>
+            <a:r>
+              <a:rPr lang="en-US" dirty="0" err="1"/>
+              <a:t>por</a:t>
+            </a:r>
+            <a:r>
+              <a:rPr lang="en-US" dirty="0"/>
+              <a:t> </a:t>
+            </a:r>
+            <a:r>
+              <a:rPr lang="en-US" dirty="0" err="1"/>
+              <a:t>exemplo</a:t>
+            </a:r>
+            <a:r>
+              <a:rPr lang="en-US" dirty="0"/>
+              <a:t> o </a:t>
+            </a:r>
+            <a:r>
+              <a:rPr lang="en-US" dirty="0" err="1"/>
+              <a:t>seu</a:t>
+            </a:r>
+            <a:r>
+              <a:rPr lang="en-US" dirty="0"/>
+              <a:t> </a:t>
+            </a:r>
+            <a:r>
+              <a:rPr lang="en-US" dirty="0" err="1"/>
+              <a:t>preço</a:t>
+            </a:r>
+            <a:r>
+              <a:rPr lang="en-US"/>
+              <a:t>). </a:t>
+            </a:r>
+            <a:endParaRPr lang="en-US" dirty="0"/>
           </a:p>
         </p:txBody>
       </p:sp>

</xml_diff>

<commit_message>
Update Apresentação e Cronograma
</commit_message>
<xml_diff>
--- a/Apresentação.pptx
+++ b/Apresentação.pptx
@@ -23985,57 +23985,17 @@
           <a:p>
             <a:pPr algn="just"/>
             <a:r>
-              <a:rPr lang="en-US" sz="2400" dirty="0" err="1"/>
-              <a:t>Os</a:t>
+              <a:rPr lang="pt-PT" sz="2400"/>
+              <a:t>Os principais </a:t>
             </a:r>
             <a:r>
-              <a:rPr lang="en-US" sz="2400" dirty="0"/>
-              <a:t> </a:t>
-            </a:r>
-            <a:r>
-              <a:rPr lang="en-US" sz="2400" dirty="0" err="1"/>
-              <a:t>pricipais</a:t>
-            </a:r>
-            <a:r>
-              <a:rPr lang="en-US" sz="2400" dirty="0"/>
-              <a:t> </a:t>
-            </a:r>
-            <a:r>
-              <a:rPr lang="en-US" sz="2400" dirty="0" err="1"/>
-              <a:t>conflitos</a:t>
-            </a:r>
-            <a:r>
-              <a:rPr lang="en-US" sz="2400" dirty="0"/>
-              <a:t> de </a:t>
-            </a:r>
-            <a:r>
-              <a:rPr lang="en-US" sz="2400" dirty="0" err="1"/>
-              <a:t>concorrência</a:t>
-            </a:r>
-            <a:r>
-              <a:rPr lang="en-US" sz="2400" dirty="0"/>
-              <a:t> </a:t>
-            </a:r>
-            <a:r>
-              <a:rPr lang="en-US" sz="2400" dirty="0" err="1"/>
-              <a:t>ocorrem</a:t>
-            </a:r>
-            <a:r>
-              <a:rPr lang="en-US" sz="2400" dirty="0"/>
-              <a:t> </a:t>
-            </a:r>
-            <a:r>
-              <a:rPr lang="en-US" sz="2400" dirty="0" err="1"/>
-              <a:t>quando</a:t>
-            </a:r>
-            <a:r>
-              <a:rPr lang="en-US" sz="2400" dirty="0"/>
-              <a:t>:</a:t>
+              <a:rPr lang="pt-PT" sz="2400" dirty="0"/>
+              <a:t>conflitos de concorrência ocorrem quando:</a:t>
             </a:r>
           </a:p>
           <a:p>
             <a:pPr algn="just"/>
-            <a:endParaRPr lang="en-US" sz="2400" dirty="0"/>
+            <a:endParaRPr lang="pt-PT" sz="2400" dirty="0"/>
           </a:p>
           <a:p>
             <a:pPr marL="285750" indent="-285750" algn="just">
@@ -24043,108 +24003,8 @@
               <a:buChar char="•"/>
             </a:pPr>
             <a:r>
-              <a:rPr lang="en-US" sz="2400" dirty="0" err="1"/>
-              <a:t>Dois</a:t>
-            </a:r>
-            <a:r>
-              <a:rPr lang="en-US" sz="2400" dirty="0"/>
-              <a:t> </a:t>
-            </a:r>
-            <a:r>
-              <a:rPr lang="en-US" sz="2400" dirty="0" err="1"/>
-              <a:t>utilizadores</a:t>
-            </a:r>
-            <a:r>
-              <a:rPr lang="en-US" sz="2400" dirty="0"/>
-              <a:t> </a:t>
-            </a:r>
-            <a:r>
-              <a:rPr lang="en-US" sz="2400" dirty="0" err="1"/>
-              <a:t>tentam</a:t>
-            </a:r>
-            <a:r>
-              <a:rPr lang="en-US" sz="2400" dirty="0"/>
-              <a:t> </a:t>
-            </a:r>
-            <a:r>
-              <a:rPr lang="en-US" sz="2400" dirty="0" err="1"/>
-              <a:t>comprar</a:t>
-            </a:r>
-            <a:r>
-              <a:rPr lang="en-US" sz="2400" dirty="0"/>
-              <a:t> </a:t>
-            </a:r>
-            <a:r>
-              <a:rPr lang="en-US" sz="2400" dirty="0" err="1"/>
-              <a:t>quantias</a:t>
-            </a:r>
-            <a:r>
-              <a:rPr lang="en-US" sz="2400" dirty="0"/>
-              <a:t> de um </a:t>
-            </a:r>
-            <a:r>
-              <a:rPr lang="en-US" sz="2400" dirty="0" err="1"/>
-              <a:t>produto</a:t>
-            </a:r>
-            <a:r>
-              <a:rPr lang="en-US" sz="2400" dirty="0"/>
-              <a:t> </a:t>
-            </a:r>
-            <a:r>
-              <a:rPr lang="en-US" sz="2400" dirty="0" err="1"/>
-              <a:t>em</a:t>
-            </a:r>
-            <a:r>
-              <a:rPr lang="en-US" sz="2400" dirty="0"/>
-              <a:t> </a:t>
-            </a:r>
-            <a:r>
-              <a:rPr lang="en-US" sz="2400" dirty="0" err="1"/>
-              <a:t>simultâneo</a:t>
-            </a:r>
-            <a:r>
-              <a:rPr lang="en-US" sz="2400" dirty="0"/>
-              <a:t>, mas </a:t>
-            </a:r>
-            <a:r>
-              <a:rPr lang="en-US" sz="2400" dirty="0" err="1"/>
-              <a:t>não</a:t>
-            </a:r>
-            <a:r>
-              <a:rPr lang="en-US" sz="2400" dirty="0"/>
-              <a:t> </a:t>
-            </a:r>
-            <a:r>
-              <a:rPr lang="en-US" sz="2400" dirty="0" err="1"/>
-              <a:t>existe</a:t>
-            </a:r>
-            <a:r>
-              <a:rPr lang="en-US" sz="2400" dirty="0"/>
-              <a:t> stock </a:t>
-            </a:r>
-            <a:r>
-              <a:rPr lang="en-US" sz="2400" dirty="0" err="1"/>
-              <a:t>suficiente</a:t>
-            </a:r>
-            <a:r>
-              <a:rPr lang="en-US" sz="2400" dirty="0"/>
-              <a:t> para </a:t>
-            </a:r>
-            <a:r>
-              <a:rPr lang="en-US" sz="2400" dirty="0" err="1"/>
-              <a:t>concretizar</a:t>
-            </a:r>
-            <a:r>
-              <a:rPr lang="en-US" sz="2400" dirty="0"/>
-              <a:t> ambas as </a:t>
-            </a:r>
-            <a:r>
-              <a:rPr lang="en-US" sz="2400" dirty="0" err="1"/>
-              <a:t>encomendas</a:t>
-            </a:r>
-            <a:r>
-              <a:rPr lang="en-US" sz="2400" dirty="0"/>
-              <a:t>;</a:t>
+              <a:rPr lang="pt-PT" sz="2400" dirty="0"/>
+              <a:t>Dois utilizadores tentam comprar quantias de um produto em simultâneo, mas não existe stock suficiente para concretizar ambas as encomendas;</a:t>
             </a:r>
           </a:p>
           <a:p>
@@ -24152,7 +24012,7 @@
               <a:buFont typeface="Arial" panose="020B0604020202020204" pitchFamily="34" charset="0"/>
               <a:buChar char="•"/>
             </a:pPr>
-            <a:endParaRPr lang="en-US" sz="2400" dirty="0"/>
+            <a:endParaRPr lang="pt-PT" sz="2400" dirty="0"/>
           </a:p>
           <a:p>
             <a:pPr marL="285750" indent="-285750" algn="just">
@@ -24160,120 +24020,8 @@
               <a:buChar char="•"/>
             </a:pPr>
             <a:r>
-              <a:rPr lang="en-US" sz="2400" dirty="0"/>
-              <a:t>Um </a:t>
-            </a:r>
-            <a:r>
-              <a:rPr lang="en-US" sz="2400" dirty="0" err="1"/>
-              <a:t>utilizador</a:t>
-            </a:r>
-            <a:r>
-              <a:rPr lang="en-US" sz="2400" dirty="0"/>
-              <a:t> </a:t>
-            </a:r>
-            <a:r>
-              <a:rPr lang="en-US" sz="2400" dirty="0" err="1"/>
-              <a:t>tenta</a:t>
-            </a:r>
-            <a:r>
-              <a:rPr lang="en-US" sz="2400" dirty="0"/>
-              <a:t> </a:t>
-            </a:r>
-            <a:r>
-              <a:rPr lang="en-US" sz="2400" dirty="0" err="1"/>
-              <a:t>comprar</a:t>
-            </a:r>
-            <a:r>
-              <a:rPr lang="en-US" sz="2400" dirty="0"/>
-              <a:t> </a:t>
-            </a:r>
-            <a:r>
-              <a:rPr lang="en-US" sz="2400" dirty="0" err="1"/>
-              <a:t>ou</a:t>
-            </a:r>
-            <a:r>
-              <a:rPr lang="en-US" sz="2400" dirty="0"/>
-              <a:t> </a:t>
-            </a:r>
-            <a:r>
-              <a:rPr lang="en-US" sz="2400" dirty="0" err="1"/>
-              <a:t>obter</a:t>
-            </a:r>
-            <a:r>
-              <a:rPr lang="en-US" sz="2400" dirty="0"/>
-              <a:t> </a:t>
-            </a:r>
-            <a:r>
-              <a:rPr lang="en-US" sz="2400" dirty="0" err="1"/>
-              <a:t>informações</a:t>
-            </a:r>
-            <a:r>
-              <a:rPr lang="en-US" sz="2400" dirty="0"/>
-              <a:t> </a:t>
-            </a:r>
-            <a:r>
-              <a:rPr lang="en-US" sz="2400" dirty="0" err="1"/>
-              <a:t>sobre</a:t>
-            </a:r>
-            <a:r>
-              <a:rPr lang="en-US" sz="2400" dirty="0"/>
-              <a:t> um </a:t>
-            </a:r>
-            <a:r>
-              <a:rPr lang="en-US" sz="2400" dirty="0" err="1"/>
-              <a:t>produto</a:t>
-            </a:r>
-            <a:r>
-              <a:rPr lang="en-US" sz="2400" dirty="0"/>
-              <a:t> </a:t>
-            </a:r>
-            <a:r>
-              <a:rPr lang="en-US" sz="2400" dirty="0" err="1"/>
-              <a:t>enquanto</a:t>
-            </a:r>
-            <a:r>
-              <a:rPr lang="en-US" sz="2400" dirty="0"/>
-              <a:t> um </a:t>
-            </a:r>
-            <a:r>
-              <a:rPr lang="en-US" sz="2400" dirty="0" err="1"/>
-              <a:t>vendedor</a:t>
-            </a:r>
-            <a:r>
-              <a:rPr lang="en-US" sz="2400" dirty="0"/>
-              <a:t> </a:t>
-            </a:r>
-            <a:r>
-              <a:rPr lang="en-US" sz="2400" dirty="0" err="1"/>
-              <a:t>atualiza</a:t>
-            </a:r>
-            <a:r>
-              <a:rPr lang="en-US" sz="2400" dirty="0"/>
-              <a:t> </a:t>
-            </a:r>
-            <a:r>
-              <a:rPr lang="en-US" sz="2400" dirty="0" err="1"/>
-              <a:t>os</a:t>
-            </a:r>
-            <a:r>
-              <a:rPr lang="en-US" sz="2400" dirty="0"/>
-              <a:t> </a:t>
-            </a:r>
-            <a:r>
-              <a:rPr lang="en-US" sz="2400" dirty="0" err="1"/>
-              <a:t>seus</a:t>
-            </a:r>
-            <a:r>
-              <a:rPr lang="en-US" sz="2400" dirty="0"/>
-              <a:t> </a:t>
-            </a:r>
-            <a:r>
-              <a:rPr lang="en-US" sz="2400" dirty="0" err="1"/>
-              <a:t>detalhes</a:t>
-            </a:r>
-            <a:r>
-              <a:rPr lang="en-US" sz="2400" dirty="0"/>
-              <a:t>.</a:t>
+              <a:rPr lang="pt-PT" sz="2400" dirty="0"/>
+              <a:t>Um utilizador tenta comprar ou obter informações sobre um produto enquanto um vendedor atualiza os seus detalhes.</a:t>
             </a:r>
           </a:p>
         </p:txBody>

</xml_diff>